<commit_message>
Deployed 23b0367 with MkDocs version: 1.0.4
</commit_message>
<xml_diff>
--- a/diagrams.pptx
+++ b/diagrams.pptx
@@ -6,14 +6,15 @@
     <p:sldMasterId id="2147484308" r:id="rId2"/>
   </p:sldMasterIdLst>
   <p:notesMasterIdLst>
-    <p:notesMasterId r:id="rId8"/>
+    <p:notesMasterId r:id="rId9"/>
   </p:notesMasterIdLst>
   <p:sldIdLst>
     <p:sldId id="141168470" r:id="rId3"/>
-    <p:sldId id="2783" r:id="rId4"/>
-    <p:sldId id="2801" r:id="rId5"/>
-    <p:sldId id="2799" r:id="rId6"/>
-    <p:sldId id="2800" r:id="rId7"/>
+    <p:sldId id="141168471" r:id="rId4"/>
+    <p:sldId id="2783" r:id="rId5"/>
+    <p:sldId id="2801" r:id="rId6"/>
+    <p:sldId id="2799" r:id="rId7"/>
+    <p:sldId id="2800" r:id="rId8"/>
   </p:sldIdLst>
   <p:sldSz cx="12192000" cy="6858000"/>
   <p:notesSz cx="7086600" cy="9372600"/>
@@ -276,7 +277,7 @@
               <a:pPr>
                 <a:defRPr/>
               </a:pPr>
-              <a:t>11/5/19</a:t>
+              <a:t>11/13/19</a:t>
             </a:fld>
             <a:endParaRPr lang="en-US" dirty="0"/>
           </a:p>
@@ -725,7 +726,7 @@
                 <a:tabLst/>
                 <a:defRPr/>
               </a:pPr>
-              <a:t>2</a:t>
+              <a:t>3</a:t>
             </a:fld>
             <a:endParaRPr kumimoji="0" lang="en-US" sz="1200" b="0" i="0" u="none" strike="noStrike" kern="1200" cap="none" spc="0" normalizeH="0" baseline="0" noProof="0">
               <a:ln>
@@ -837,7 +838,7 @@
               <a:pPr>
                 <a:defRPr/>
               </a:pPr>
-              <a:t>3</a:t>
+              <a:t>4</a:t>
             </a:fld>
             <a:endParaRPr lang="en-US" altLang="en-US" dirty="0"/>
           </a:p>
@@ -8512,6 +8513,792 @@
           <p:cNvPr id="2" name="Title 1">
             <a:extLst>
               <a:ext uri="{FF2B5EF4-FFF2-40B4-BE49-F238E27FC236}">
+                <a16:creationId xmlns:a16="http://schemas.microsoft.com/office/drawing/2014/main" id="{D315EF5C-228B-5845-84E6-0CFA2693B2CE}"/>
+              </a:ext>
+            </a:extLst>
+          </p:cNvPr>
+          <p:cNvSpPr>
+            <a:spLocks noGrp="1"/>
+          </p:cNvSpPr>
+          <p:nvPr>
+            <p:ph type="title"/>
+          </p:nvPr>
+        </p:nvSpPr>
+        <p:spPr/>
+        <p:txBody>
+          <a:bodyPr/>
+          <a:lstStyle/>
+          <a:p>
+            <a:r>
+              <a:rPr lang="en-US" dirty="0"/>
+              <a:t>Cloud Pak Solution</a:t>
+            </a:r>
+          </a:p>
+        </p:txBody>
+      </p:sp>
+      <p:sp>
+        <p:nvSpPr>
+          <p:cNvPr id="4" name="Slide Number Placeholder 3">
+            <a:extLst>
+              <a:ext uri="{FF2B5EF4-FFF2-40B4-BE49-F238E27FC236}">
+                <a16:creationId xmlns:a16="http://schemas.microsoft.com/office/drawing/2014/main" id="{FB3FF1DE-439B-5D41-A9C1-2BC36D573C38}"/>
+              </a:ext>
+            </a:extLst>
+          </p:cNvPr>
+          <p:cNvSpPr>
+            <a:spLocks noGrp="1"/>
+          </p:cNvSpPr>
+          <p:nvPr>
+            <p:ph type="sldNum" sz="quarter" idx="2"/>
+          </p:nvPr>
+        </p:nvSpPr>
+        <p:spPr/>
+        <p:txBody>
+          <a:bodyPr/>
+          <a:lstStyle/>
+          <a:p>
+            <a:fld id="{86CB4B4D-7CA3-9044-876B-883B54F8677D}" type="slidenum">
+              <a:rPr lang="en-US" smtClean="0"/>
+              <a:pPr/>
+              <a:t>2</a:t>
+            </a:fld>
+            <a:endParaRPr lang="en-US"/>
+          </a:p>
+        </p:txBody>
+      </p:sp>
+      <p:sp>
+        <p:nvSpPr>
+          <p:cNvPr id="5" name="AutoShape 4">
+            <a:extLst>
+              <a:ext uri="{FF2B5EF4-FFF2-40B4-BE49-F238E27FC236}">
+                <a16:creationId xmlns:a16="http://schemas.microsoft.com/office/drawing/2014/main" id="{684E09B8-BBC1-064E-8FF3-CD8302D16690}"/>
+              </a:ext>
+            </a:extLst>
+          </p:cNvPr>
+          <p:cNvSpPr>
+            <a:spLocks noChangeArrowheads="1"/>
+          </p:cNvSpPr>
+          <p:nvPr/>
+        </p:nvSpPr>
+        <p:spPr bwMode="auto">
+          <a:xfrm>
+            <a:off x="2871371" y="5150367"/>
+            <a:ext cx="4545428" cy="680686"/>
+          </a:xfrm>
+          <a:prstGeom prst="roundRect">
+            <a:avLst>
+              <a:gd name="adj" fmla="val 7117"/>
+            </a:avLst>
+          </a:prstGeom>
+          <a:noFill/>
+          <a:ln w="12700">
+            <a:solidFill>
+              <a:srgbClr val="5596E6">
+                <a:lumMod val="50000"/>
+              </a:srgbClr>
+            </a:solidFill>
+            <a:prstDash val="dash"/>
+            <a:round/>
+            <a:headEnd/>
+            <a:tailEnd/>
+          </a:ln>
+        </p:spPr>
+        <p:txBody>
+          <a:bodyPr lIns="0" tIns="0" rIns="0" bIns="0" anchor="b" anchorCtr="1"/>
+          <a:lstStyle/>
+          <a:p>
+            <a:pPr algn="ctr" defTabSz="1219170" eaLnBrk="1" fontAlgn="auto" hangingPunct="1">
+              <a:spcBef>
+                <a:spcPts val="0"/>
+              </a:spcBef>
+              <a:spcAft>
+                <a:spcPts val="0"/>
+              </a:spcAft>
+              <a:defRPr/>
+            </a:pPr>
+            <a:r>
+              <a:rPr lang="en-US" sz="1333" kern="0" dirty="0">
+                <a:solidFill>
+                  <a:srgbClr val="6D7777"/>
+                </a:solidFill>
+              </a:rPr>
+              <a:t>Infrastructure</a:t>
+            </a:r>
+          </a:p>
+        </p:txBody>
+      </p:sp>
+      <p:pic>
+        <p:nvPicPr>
+          <p:cNvPr id="6" name="Picture 5">
+            <a:extLst>
+              <a:ext uri="{FF2B5EF4-FFF2-40B4-BE49-F238E27FC236}">
+                <a16:creationId xmlns:a16="http://schemas.microsoft.com/office/drawing/2014/main" id="{07AC0BFF-594E-D943-9423-6F5BB0B092D4}"/>
+              </a:ext>
+            </a:extLst>
+          </p:cNvPr>
+          <p:cNvPicPr>
+            <a:picLocks noChangeAspect="1"/>
+          </p:cNvPicPr>
+          <p:nvPr/>
+        </p:nvPicPr>
+        <p:blipFill>
+          <a:blip r:embed="rId2"/>
+          <a:stretch>
+            <a:fillRect/>
+          </a:stretch>
+        </p:blipFill>
+        <p:spPr>
+          <a:xfrm>
+            <a:off x="4030042" y="5259975"/>
+            <a:ext cx="388273" cy="354992"/>
+          </a:xfrm>
+          <a:prstGeom prst="rect">
+            <a:avLst/>
+          </a:prstGeom>
+        </p:spPr>
+      </p:pic>
+      <p:pic>
+        <p:nvPicPr>
+          <p:cNvPr id="7" name="Picture 6">
+            <a:extLst>
+              <a:ext uri="{FF2B5EF4-FFF2-40B4-BE49-F238E27FC236}">
+                <a16:creationId xmlns:a16="http://schemas.microsoft.com/office/drawing/2014/main" id="{34E902ED-15BC-414A-8ABD-63DB888CC4B7}"/>
+              </a:ext>
+            </a:extLst>
+          </p:cNvPr>
+          <p:cNvPicPr>
+            <a:picLocks noChangeAspect="1"/>
+          </p:cNvPicPr>
+          <p:nvPr/>
+        </p:nvPicPr>
+        <p:blipFill>
+          <a:blip r:embed="rId3"/>
+          <a:stretch>
+            <a:fillRect/>
+          </a:stretch>
+        </p:blipFill>
+        <p:spPr>
+          <a:xfrm>
+            <a:off x="5688009" y="5259975"/>
+            <a:ext cx="459096" cy="393976"/>
+          </a:xfrm>
+          <a:prstGeom prst="rect">
+            <a:avLst/>
+          </a:prstGeom>
+        </p:spPr>
+      </p:pic>
+      <p:sp>
+        <p:nvSpPr>
+          <p:cNvPr id="11" name="AutoShape 4">
+            <a:extLst>
+              <a:ext uri="{FF2B5EF4-FFF2-40B4-BE49-F238E27FC236}">
+                <a16:creationId xmlns:a16="http://schemas.microsoft.com/office/drawing/2014/main" id="{C64ABD7E-5043-7340-8CC0-841277EF50A1}"/>
+              </a:ext>
+            </a:extLst>
+          </p:cNvPr>
+          <p:cNvSpPr>
+            <a:spLocks noChangeArrowheads="1"/>
+          </p:cNvSpPr>
+          <p:nvPr/>
+        </p:nvSpPr>
+        <p:spPr bwMode="auto">
+          <a:xfrm>
+            <a:off x="2871370" y="3448935"/>
+            <a:ext cx="4545429" cy="1396809"/>
+          </a:xfrm>
+          <a:prstGeom prst="roundRect">
+            <a:avLst>
+              <a:gd name="adj" fmla="val 7117"/>
+            </a:avLst>
+          </a:prstGeom>
+          <a:noFill/>
+          <a:ln w="12700">
+            <a:solidFill>
+              <a:srgbClr val="5596E6">
+                <a:lumMod val="50000"/>
+              </a:srgbClr>
+            </a:solidFill>
+            <a:prstDash val="dash"/>
+            <a:round/>
+            <a:headEnd/>
+            <a:tailEnd/>
+          </a:ln>
+        </p:spPr>
+        <p:txBody>
+          <a:bodyPr lIns="0" tIns="0" rIns="0" bIns="0" anchor="b" anchorCtr="1"/>
+          <a:lstStyle/>
+          <a:p>
+            <a:pPr algn="ctr" defTabSz="1219170" eaLnBrk="1" fontAlgn="auto" hangingPunct="1">
+              <a:spcBef>
+                <a:spcPts val="0"/>
+              </a:spcBef>
+              <a:spcAft>
+                <a:spcPts val="0"/>
+              </a:spcAft>
+              <a:defRPr/>
+            </a:pPr>
+            <a:r>
+              <a:rPr lang="en-US" sz="1333" kern="0" dirty="0">
+                <a:solidFill>
+                  <a:srgbClr val="6D7777"/>
+                </a:solidFill>
+              </a:rPr>
+              <a:t>Cloud Pak</a:t>
+            </a:r>
+          </a:p>
+        </p:txBody>
+      </p:sp>
+      <p:pic>
+        <p:nvPicPr>
+          <p:cNvPr id="12" name="Picture 11">
+            <a:extLst>
+              <a:ext uri="{FF2B5EF4-FFF2-40B4-BE49-F238E27FC236}">
+                <a16:creationId xmlns:a16="http://schemas.microsoft.com/office/drawing/2014/main" id="{284F2826-9DD2-6844-A9BB-E8BD4E975704}"/>
+              </a:ext>
+            </a:extLst>
+          </p:cNvPr>
+          <p:cNvPicPr>
+            <a:picLocks noChangeAspect="1"/>
+          </p:cNvPicPr>
+          <p:nvPr/>
+        </p:nvPicPr>
+        <p:blipFill>
+          <a:blip r:embed="rId4"/>
+          <a:stretch>
+            <a:fillRect/>
+          </a:stretch>
+        </p:blipFill>
+        <p:spPr>
+          <a:xfrm>
+            <a:off x="4081744" y="3679244"/>
+            <a:ext cx="673143" cy="879207"/>
+          </a:xfrm>
+          <a:prstGeom prst="rect">
+            <a:avLst/>
+          </a:prstGeom>
+        </p:spPr>
+      </p:pic>
+      <p:pic>
+        <p:nvPicPr>
+          <p:cNvPr id="13" name="Picture 12">
+            <a:extLst>
+              <a:ext uri="{FF2B5EF4-FFF2-40B4-BE49-F238E27FC236}">
+                <a16:creationId xmlns:a16="http://schemas.microsoft.com/office/drawing/2014/main" id="{2A7B4D3D-90CA-AA4F-8F1C-0D90C3E86276}"/>
+              </a:ext>
+            </a:extLst>
+          </p:cNvPr>
+          <p:cNvPicPr>
+            <a:picLocks noChangeAspect="1"/>
+          </p:cNvPicPr>
+          <p:nvPr/>
+        </p:nvPicPr>
+        <p:blipFill>
+          <a:blip r:embed="rId5"/>
+          <a:stretch>
+            <a:fillRect/>
+          </a:stretch>
+        </p:blipFill>
+        <p:spPr>
+          <a:xfrm>
+            <a:off x="3088358" y="3679245"/>
+            <a:ext cx="790605" cy="879207"/>
+          </a:xfrm>
+          <a:prstGeom prst="rect">
+            <a:avLst/>
+          </a:prstGeom>
+        </p:spPr>
+      </p:pic>
+      <p:sp>
+        <p:nvSpPr>
+          <p:cNvPr id="14" name="Rectangle 13">
+            <a:extLst>
+              <a:ext uri="{FF2B5EF4-FFF2-40B4-BE49-F238E27FC236}">
+                <a16:creationId xmlns:a16="http://schemas.microsoft.com/office/drawing/2014/main" id="{283526CE-4AF1-0D4C-AFB2-25875AF70D6E}"/>
+              </a:ext>
+            </a:extLst>
+          </p:cNvPr>
+          <p:cNvSpPr/>
+          <p:nvPr/>
+        </p:nvSpPr>
+        <p:spPr>
+          <a:xfrm>
+            <a:off x="4803212" y="2189569"/>
+            <a:ext cx="1176988" cy="493916"/>
+          </a:xfrm>
+          <a:prstGeom prst="rect">
+            <a:avLst/>
+          </a:prstGeom>
+          <a:solidFill>
+            <a:schemeClr val="bg1">
+              <a:lumMod val="65000"/>
+            </a:schemeClr>
+          </a:solidFill>
+          <a:ln>
+            <a:noFill/>
+          </a:ln>
+          <a:effectLst>
+            <a:outerShdw blurRad="50800" dist="38100" dir="5400000" algn="t" rotWithShape="0">
+              <a:prstClr val="black">
+                <a:alpha val="40000"/>
+              </a:prstClr>
+            </a:outerShdw>
+          </a:effectLst>
+        </p:spPr>
+        <p:style>
+          <a:lnRef idx="2">
+            <a:schemeClr val="accent1">
+              <a:shade val="50000"/>
+            </a:schemeClr>
+          </a:lnRef>
+          <a:fillRef idx="1">
+            <a:schemeClr val="accent1"/>
+          </a:fillRef>
+          <a:effectRef idx="0">
+            <a:schemeClr val="accent1"/>
+          </a:effectRef>
+          <a:fontRef idx="minor">
+            <a:schemeClr val="lt1"/>
+          </a:fontRef>
+        </p:style>
+        <p:txBody>
+          <a:bodyPr rtlCol="0" anchor="ctr"/>
+          <a:lstStyle/>
+          <a:p>
+            <a:pPr algn="ctr" defTabSz="914377" eaLnBrk="1" fontAlgn="auto" hangingPunct="1">
+              <a:spcBef>
+                <a:spcPts val="0"/>
+              </a:spcBef>
+              <a:spcAft>
+                <a:spcPts val="0"/>
+              </a:spcAft>
+            </a:pPr>
+            <a:r>
+              <a:rPr lang="en-US" sz="1100" dirty="0">
+                <a:solidFill>
+                  <a:schemeClr val="bg1"/>
+                </a:solidFill>
+                <a:latin typeface="Arial"/>
+              </a:rPr>
+              <a:t>BPM app</a:t>
+            </a:r>
+          </a:p>
+        </p:txBody>
+      </p:sp>
+      <p:sp>
+        <p:nvSpPr>
+          <p:cNvPr id="15" name="AutoShape 4">
+            <a:extLst>
+              <a:ext uri="{FF2B5EF4-FFF2-40B4-BE49-F238E27FC236}">
+                <a16:creationId xmlns:a16="http://schemas.microsoft.com/office/drawing/2014/main" id="{A74B6BBF-B7A7-804F-AA37-AA6548F50D71}"/>
+              </a:ext>
+            </a:extLst>
+          </p:cNvPr>
+          <p:cNvSpPr>
+            <a:spLocks noChangeArrowheads="1"/>
+          </p:cNvSpPr>
+          <p:nvPr/>
+        </p:nvSpPr>
+        <p:spPr bwMode="auto">
+          <a:xfrm>
+            <a:off x="2590800" y="1738123"/>
+            <a:ext cx="4825999" cy="1396809"/>
+          </a:xfrm>
+          <a:prstGeom prst="roundRect">
+            <a:avLst>
+              <a:gd name="adj" fmla="val 7117"/>
+            </a:avLst>
+          </a:prstGeom>
+          <a:noFill/>
+          <a:ln w="12700">
+            <a:solidFill>
+              <a:srgbClr val="5596E6">
+                <a:lumMod val="50000"/>
+              </a:srgbClr>
+            </a:solidFill>
+            <a:prstDash val="dash"/>
+            <a:round/>
+            <a:headEnd/>
+            <a:tailEnd/>
+          </a:ln>
+        </p:spPr>
+        <p:txBody>
+          <a:bodyPr lIns="0" tIns="0" rIns="0" bIns="0" anchor="b" anchorCtr="1"/>
+          <a:lstStyle/>
+          <a:p>
+            <a:pPr algn="ctr" defTabSz="1219170" eaLnBrk="1" fontAlgn="auto" hangingPunct="1">
+              <a:spcBef>
+                <a:spcPts val="0"/>
+              </a:spcBef>
+              <a:spcAft>
+                <a:spcPts val="0"/>
+              </a:spcAft>
+              <a:defRPr/>
+            </a:pPr>
+            <a:r>
+              <a:rPr lang="en-US" sz="1333" kern="0" dirty="0">
+                <a:solidFill>
+                  <a:srgbClr val="6D7777"/>
+                </a:solidFill>
+              </a:rPr>
+              <a:t>Application</a:t>
+            </a:r>
+          </a:p>
+        </p:txBody>
+      </p:sp>
+      <p:pic>
+        <p:nvPicPr>
+          <p:cNvPr id="16" name="Picture 15">
+            <a:extLst>
+              <a:ext uri="{FF2B5EF4-FFF2-40B4-BE49-F238E27FC236}">
+                <a16:creationId xmlns:a16="http://schemas.microsoft.com/office/drawing/2014/main" id="{E69F41A8-F3D6-584C-82B4-CB399C23B4A1}"/>
+              </a:ext>
+            </a:extLst>
+          </p:cNvPr>
+          <p:cNvPicPr>
+            <a:picLocks noChangeAspect="1"/>
+          </p:cNvPicPr>
+          <p:nvPr/>
+        </p:nvPicPr>
+        <p:blipFill>
+          <a:blip r:embed="rId6"/>
+          <a:stretch>
+            <a:fillRect/>
+          </a:stretch>
+        </p:blipFill>
+        <p:spPr>
+          <a:xfrm flipV="1">
+            <a:off x="988010" y="1886314"/>
+            <a:ext cx="1344689" cy="880532"/>
+          </a:xfrm>
+          <a:prstGeom prst="rect">
+            <a:avLst/>
+          </a:prstGeom>
+        </p:spPr>
+      </p:pic>
+      <p:pic>
+        <p:nvPicPr>
+          <p:cNvPr id="17" name="Picture 16">
+            <a:extLst>
+              <a:ext uri="{FF2B5EF4-FFF2-40B4-BE49-F238E27FC236}">
+                <a16:creationId xmlns:a16="http://schemas.microsoft.com/office/drawing/2014/main" id="{9DDF994C-5DE9-2A45-B3A5-92F9C720F89A}"/>
+              </a:ext>
+            </a:extLst>
+          </p:cNvPr>
+          <p:cNvPicPr>
+            <a:picLocks noChangeAspect="1"/>
+          </p:cNvPicPr>
+          <p:nvPr/>
+        </p:nvPicPr>
+        <p:blipFill>
+          <a:blip r:embed="rId7"/>
+          <a:stretch>
+            <a:fillRect/>
+          </a:stretch>
+        </p:blipFill>
+        <p:spPr>
+          <a:xfrm>
+            <a:off x="4955677" y="3679244"/>
+            <a:ext cx="872059" cy="879207"/>
+          </a:xfrm>
+          <a:prstGeom prst="rect">
+            <a:avLst/>
+          </a:prstGeom>
+        </p:spPr>
+      </p:pic>
+      <p:sp>
+        <p:nvSpPr>
+          <p:cNvPr id="19" name="Rectangle 18">
+            <a:extLst>
+              <a:ext uri="{FF2B5EF4-FFF2-40B4-BE49-F238E27FC236}">
+                <a16:creationId xmlns:a16="http://schemas.microsoft.com/office/drawing/2014/main" id="{D4819155-2316-6B42-9EA8-E0B6095A1869}"/>
+              </a:ext>
+            </a:extLst>
+          </p:cNvPr>
+          <p:cNvSpPr/>
+          <p:nvPr/>
+        </p:nvSpPr>
+        <p:spPr>
+          <a:xfrm>
+            <a:off x="6096000" y="2179222"/>
+            <a:ext cx="1176988" cy="493916"/>
+          </a:xfrm>
+          <a:prstGeom prst="rect">
+            <a:avLst/>
+          </a:prstGeom>
+          <a:solidFill>
+            <a:schemeClr val="bg1">
+              <a:lumMod val="65000"/>
+            </a:schemeClr>
+          </a:solidFill>
+          <a:ln>
+            <a:noFill/>
+          </a:ln>
+          <a:effectLst>
+            <a:outerShdw blurRad="50800" dist="38100" dir="5400000" algn="t" rotWithShape="0">
+              <a:prstClr val="black">
+                <a:alpha val="40000"/>
+              </a:prstClr>
+            </a:outerShdw>
+          </a:effectLst>
+        </p:spPr>
+        <p:style>
+          <a:lnRef idx="2">
+            <a:schemeClr val="accent1">
+              <a:shade val="50000"/>
+            </a:schemeClr>
+          </a:lnRef>
+          <a:fillRef idx="1">
+            <a:schemeClr val="accent1"/>
+          </a:fillRef>
+          <a:effectRef idx="0">
+            <a:schemeClr val="accent1"/>
+          </a:effectRef>
+          <a:fontRef idx="minor">
+            <a:schemeClr val="lt1"/>
+          </a:fontRef>
+        </p:style>
+        <p:txBody>
+          <a:bodyPr rtlCol="0" anchor="ctr"/>
+          <a:lstStyle/>
+          <a:p>
+            <a:pPr algn="ctr" defTabSz="914377" eaLnBrk="1" fontAlgn="auto" hangingPunct="1">
+              <a:spcBef>
+                <a:spcPts val="0"/>
+              </a:spcBef>
+              <a:spcAft>
+                <a:spcPts val="0"/>
+              </a:spcAft>
+            </a:pPr>
+            <a:r>
+              <a:rPr lang="en-US" sz="1100" dirty="0">
+                <a:solidFill>
+                  <a:schemeClr val="bg1"/>
+                </a:solidFill>
+                <a:latin typeface="Arial"/>
+              </a:rPr>
+              <a:t>Container MS</a:t>
+            </a:r>
+          </a:p>
+        </p:txBody>
+      </p:sp>
+      <p:sp>
+        <p:nvSpPr>
+          <p:cNvPr id="20" name="Rectangle 19">
+            <a:extLst>
+              <a:ext uri="{FF2B5EF4-FFF2-40B4-BE49-F238E27FC236}">
+                <a16:creationId xmlns:a16="http://schemas.microsoft.com/office/drawing/2014/main" id="{0548C9A6-D4D7-3B41-A314-52FC7BECD26B}"/>
+              </a:ext>
+            </a:extLst>
+          </p:cNvPr>
+          <p:cNvSpPr/>
+          <p:nvPr/>
+        </p:nvSpPr>
+        <p:spPr>
+          <a:xfrm>
+            <a:off x="3483660" y="2179222"/>
+            <a:ext cx="1176988" cy="493916"/>
+          </a:xfrm>
+          <a:prstGeom prst="rect">
+            <a:avLst/>
+          </a:prstGeom>
+          <a:solidFill>
+            <a:schemeClr val="bg1">
+              <a:lumMod val="65000"/>
+            </a:schemeClr>
+          </a:solidFill>
+          <a:ln>
+            <a:noFill/>
+          </a:ln>
+          <a:effectLst>
+            <a:outerShdw blurRad="50800" dist="38100" dir="5400000" algn="t" rotWithShape="0">
+              <a:prstClr val="black">
+                <a:alpha val="40000"/>
+              </a:prstClr>
+            </a:outerShdw>
+          </a:effectLst>
+        </p:spPr>
+        <p:style>
+          <a:lnRef idx="2">
+            <a:schemeClr val="accent1">
+              <a:shade val="50000"/>
+            </a:schemeClr>
+          </a:lnRef>
+          <a:fillRef idx="1">
+            <a:schemeClr val="accent1"/>
+          </a:fillRef>
+          <a:effectRef idx="0">
+            <a:schemeClr val="accent1"/>
+          </a:effectRef>
+          <a:fontRef idx="minor">
+            <a:schemeClr val="lt1"/>
+          </a:fontRef>
+        </p:style>
+        <p:txBody>
+          <a:bodyPr rtlCol="0" anchor="ctr"/>
+          <a:lstStyle/>
+          <a:p>
+            <a:pPr algn="ctr" defTabSz="914377" eaLnBrk="1" fontAlgn="auto" hangingPunct="1">
+              <a:spcBef>
+                <a:spcPts val="0"/>
+              </a:spcBef>
+              <a:spcAft>
+                <a:spcPts val="0"/>
+              </a:spcAft>
+            </a:pPr>
+            <a:r>
+              <a:rPr lang="en-US" sz="1100" dirty="0">
+                <a:solidFill>
+                  <a:schemeClr val="bg1"/>
+                </a:solidFill>
+                <a:latin typeface="Arial"/>
+              </a:rPr>
+              <a:t>Scoring MS</a:t>
+            </a:r>
+          </a:p>
+        </p:txBody>
+      </p:sp>
+      <p:sp>
+        <p:nvSpPr>
+          <p:cNvPr id="21" name="Rectangle 20">
+            <a:extLst>
+              <a:ext uri="{FF2B5EF4-FFF2-40B4-BE49-F238E27FC236}">
+                <a16:creationId xmlns:a16="http://schemas.microsoft.com/office/drawing/2014/main" id="{B6B125CD-26F1-0C46-A1C6-964C84F02100}"/>
+              </a:ext>
+            </a:extLst>
+          </p:cNvPr>
+          <p:cNvSpPr/>
+          <p:nvPr/>
+        </p:nvSpPr>
+        <p:spPr>
+          <a:xfrm>
+            <a:off x="2645950" y="1818852"/>
+            <a:ext cx="789271" cy="1214657"/>
+          </a:xfrm>
+          <a:prstGeom prst="rect">
+            <a:avLst/>
+          </a:prstGeom>
+          <a:solidFill>
+            <a:schemeClr val="bg1">
+              <a:lumMod val="65000"/>
+            </a:schemeClr>
+          </a:solidFill>
+          <a:ln>
+            <a:noFill/>
+          </a:ln>
+          <a:effectLst>
+            <a:outerShdw blurRad="50800" dist="38100" dir="5400000" algn="t" rotWithShape="0">
+              <a:prstClr val="black">
+                <a:alpha val="40000"/>
+              </a:prstClr>
+            </a:outerShdw>
+          </a:effectLst>
+        </p:spPr>
+        <p:style>
+          <a:lnRef idx="2">
+            <a:schemeClr val="accent1">
+              <a:shade val="50000"/>
+            </a:schemeClr>
+          </a:lnRef>
+          <a:fillRef idx="1">
+            <a:schemeClr val="accent1"/>
+          </a:fillRef>
+          <a:effectRef idx="0">
+            <a:schemeClr val="accent1"/>
+          </a:effectRef>
+          <a:fontRef idx="minor">
+            <a:schemeClr val="lt1"/>
+          </a:fontRef>
+        </p:style>
+        <p:txBody>
+          <a:bodyPr rtlCol="0" anchor="ctr"/>
+          <a:lstStyle/>
+          <a:p>
+            <a:pPr algn="ctr" defTabSz="914377" eaLnBrk="1" fontAlgn="auto" hangingPunct="1">
+              <a:spcBef>
+                <a:spcPts val="0"/>
+              </a:spcBef>
+              <a:spcAft>
+                <a:spcPts val="0"/>
+              </a:spcAft>
+            </a:pPr>
+            <a:r>
+              <a:rPr lang="en-US" sz="1100" dirty="0">
+                <a:solidFill>
+                  <a:schemeClr val="bg1"/>
+                </a:solidFill>
+                <a:latin typeface="Arial"/>
+              </a:rPr>
+              <a:t>Reefer Simulator</a:t>
+            </a:r>
+          </a:p>
+        </p:txBody>
+      </p:sp>
+      <p:pic>
+        <p:nvPicPr>
+          <p:cNvPr id="22" name="Picture 21">
+            <a:extLst>
+              <a:ext uri="{FF2B5EF4-FFF2-40B4-BE49-F238E27FC236}">
+                <a16:creationId xmlns:a16="http://schemas.microsoft.com/office/drawing/2014/main" id="{6180B364-6A99-BB4D-AF7A-6B99AED8C89F}"/>
+              </a:ext>
+            </a:extLst>
+          </p:cNvPr>
+          <p:cNvPicPr>
+            <a:picLocks noChangeAspect="1"/>
+          </p:cNvPicPr>
+          <p:nvPr/>
+        </p:nvPicPr>
+        <p:blipFill>
+          <a:blip r:embed="rId8"/>
+          <a:stretch>
+            <a:fillRect/>
+          </a:stretch>
+        </p:blipFill>
+        <p:spPr>
+          <a:xfrm>
+            <a:off x="5973911" y="3679244"/>
+            <a:ext cx="940075" cy="879207"/>
+          </a:xfrm>
+          <a:prstGeom prst="rect">
+            <a:avLst/>
+          </a:prstGeom>
+        </p:spPr>
+      </p:pic>
+    </p:spTree>
+    <p:extLst>
+      <p:ext uri="{BB962C8B-B14F-4D97-AF65-F5344CB8AC3E}">
+        <p14:creationId xmlns:p14="http://schemas.microsoft.com/office/powerpoint/2010/main" val="2821260101"/>
+      </p:ext>
+    </p:extLst>
+  </p:cSld>
+  <p:clrMapOvr>
+    <a:masterClrMapping/>
+  </p:clrMapOvr>
+  <p:transition spd="med"/>
+</p:sld>
+</file>
+
+<file path=ppt/slides/slide3.xml><?xml version="1.0" encoding="utf-8"?>
+<p:sld xmlns:a="http://schemas.openxmlformats.org/drawingml/2006/main" xmlns:r="http://schemas.openxmlformats.org/officeDocument/2006/relationships" xmlns:p="http://schemas.openxmlformats.org/presentationml/2006/main">
+  <p:cSld>
+    <p:spTree>
+      <p:nvGrpSpPr>
+        <p:cNvPr id="1" name=""/>
+        <p:cNvGrpSpPr/>
+        <p:nvPr/>
+      </p:nvGrpSpPr>
+      <p:grpSpPr>
+        <a:xfrm>
+          <a:off x="0" y="0"/>
+          <a:ext cx="0" cy="0"/>
+          <a:chOff x="0" y="0"/>
+          <a:chExt cx="0" cy="0"/>
+        </a:xfrm>
+      </p:grpSpPr>
+      <p:sp>
+        <p:nvSpPr>
+          <p:cNvPr id="2" name="Title 1">
+            <a:extLst>
+              <a:ext uri="{FF2B5EF4-FFF2-40B4-BE49-F238E27FC236}">
                 <a16:creationId xmlns:a16="http://schemas.microsoft.com/office/drawing/2014/main" id="{4F4FC843-CBA3-204A-9087-239C7E4B548E}"/>
               </a:ext>
             </a:extLst>
@@ -13397,7 +14184,7 @@
                 <a:ea typeface="+mn-ea"/>
                 <a:cs typeface="+mn-cs"/>
               </a:rPr>
-              <a:t>Predictive scoring</a:t>
+              <a:t>Anomaly detection scoring</a:t>
             </a:r>
           </a:p>
         </p:txBody>
@@ -13415,7 +14202,7 @@
 </p:sld>
 </file>
 
-<file path=ppt/slides/slide3.xml><?xml version="1.0" encoding="utf-8"?>
+<file path=ppt/slides/slide4.xml><?xml version="1.0" encoding="utf-8"?>
 <p:sld xmlns:a="http://schemas.openxmlformats.org/drawingml/2006/main" xmlns:r="http://schemas.openxmlformats.org/officeDocument/2006/relationships" xmlns:p="http://schemas.openxmlformats.org/presentationml/2006/main">
   <p:cSld>
     <p:spTree>
@@ -13434,10 +14221,10 @@
       </p:grpSpPr>
       <p:sp>
         <p:nvSpPr>
-          <p:cNvPr id="55" name="Rounded Rectangle 54">
+          <p:cNvPr id="40" name="Rounded Rectangle 39">
             <a:extLst>
               <a:ext uri="{FF2B5EF4-FFF2-40B4-BE49-F238E27FC236}">
-                <a16:creationId xmlns:a16="http://schemas.microsoft.com/office/drawing/2014/main" id="{BCDB838F-03AA-0041-B23E-D4E797C3F296}"/>
+                <a16:creationId xmlns:a16="http://schemas.microsoft.com/office/drawing/2014/main" id="{16369D00-A072-DB43-B943-B71BA51E5E95}"/>
               </a:ext>
             </a:extLst>
           </p:cNvPr>
@@ -13446,89 +14233,8 @@
         </p:nvSpPr>
         <p:spPr>
           <a:xfrm>
-            <a:off x="6631706" y="1596898"/>
-            <a:ext cx="2478145" cy="2045537"/>
-          </a:xfrm>
-          <a:prstGeom prst="roundRect">
-            <a:avLst>
-              <a:gd name="adj" fmla="val 3460"/>
-            </a:avLst>
-          </a:prstGeom>
-          <a:ln>
-            <a:noFill/>
-          </a:ln>
-        </p:spPr>
-        <p:style>
-          <a:lnRef idx="2">
-            <a:schemeClr val="accent1">
-              <a:shade val="50000"/>
-            </a:schemeClr>
-          </a:lnRef>
-          <a:fillRef idx="1">
-            <a:schemeClr val="accent1"/>
-          </a:fillRef>
-          <a:effectRef idx="0">
-            <a:schemeClr val="accent1"/>
-          </a:effectRef>
-          <a:fontRef idx="minor">
-            <a:schemeClr val="lt1"/>
-          </a:fontRef>
-        </p:style>
-        <p:txBody>
-          <a:bodyPr rtlCol="0" anchor="ctr"/>
-          <a:lstStyle/>
-          <a:p>
-            <a:pPr algn="ctr"/>
-            <a:endParaRPr lang="en-US"/>
-          </a:p>
-        </p:txBody>
-      </p:sp>
-      <p:pic>
-        <p:nvPicPr>
-          <p:cNvPr id="57" name="Picture 56">
-            <a:extLst>
-              <a:ext uri="{FF2B5EF4-FFF2-40B4-BE49-F238E27FC236}">
-                <a16:creationId xmlns:a16="http://schemas.microsoft.com/office/drawing/2014/main" id="{8E1A8EFC-A075-DB4B-B16F-8A2770920E88}"/>
-              </a:ext>
-            </a:extLst>
-          </p:cNvPr>
-          <p:cNvPicPr>
-            <a:picLocks noChangeAspect="1"/>
-          </p:cNvPicPr>
-          <p:nvPr/>
-        </p:nvPicPr>
-        <p:blipFill>
-          <a:blip r:embed="rId3"/>
-          <a:stretch>
-            <a:fillRect/>
-          </a:stretch>
-        </p:blipFill>
-        <p:spPr>
-          <a:xfrm>
-            <a:off x="7779916" y="2940407"/>
-            <a:ext cx="1302236" cy="544571"/>
-          </a:xfrm>
-          <a:prstGeom prst="rect">
-            <a:avLst/>
-          </a:prstGeom>
-        </p:spPr>
-      </p:pic>
-      <p:sp>
-        <p:nvSpPr>
-          <p:cNvPr id="40" name="Rounded Rectangle 39">
-            <a:extLst>
-              <a:ext uri="{FF2B5EF4-FFF2-40B4-BE49-F238E27FC236}">
-                <a16:creationId xmlns:a16="http://schemas.microsoft.com/office/drawing/2014/main" id="{16369D00-A072-DB43-B943-B71BA51E5E95}"/>
-              </a:ext>
-            </a:extLst>
-          </p:cNvPr>
-          <p:cNvSpPr/>
-          <p:nvPr/>
-        </p:nvSpPr>
-        <p:spPr>
-          <a:xfrm>
-            <a:off x="176981" y="1959428"/>
-            <a:ext cx="2889651" cy="3360513"/>
+            <a:off x="176981" y="1959429"/>
+            <a:ext cx="2889651" cy="2055360"/>
           </a:xfrm>
           <a:prstGeom prst="roundRect">
             <a:avLst>
@@ -13726,7 +14432,7 @@
                 </a:solidFill>
               </a:rPr>
               <a:pPr/>
-              <a:t>3</a:t>
+              <a:t>4</a:t>
             </a:fld>
             <a:endParaRPr lang="en-US">
               <a:solidFill>
@@ -14353,12 +15059,12 @@
           <p:nvPr/>
         </p:nvPicPr>
         <p:blipFill>
-          <a:blip r:embed="rId4">
+          <a:blip r:embed="rId3">
             <a:biLevel thresh="75000"/>
             <a:extLst>
               <a:ext uri="{BEBA8EAE-BF5A-486C-A8C5-ECC9F3942E4B}">
                 <a14:imgProps xmlns:a14="http://schemas.microsoft.com/office/drawing/2010/main">
-                  <a14:imgLayer r:embed="rId5">
+                  <a14:imgLayer r:embed="rId4">
                     <a14:imgEffect>
                       <a14:artisticPhotocopy/>
                     </a14:imgEffect>
@@ -14376,8 +15082,8 @@
         </p:blipFill>
         <p:spPr>
           <a:xfrm>
-            <a:off x="5492103" y="4910005"/>
-            <a:ext cx="959343" cy="504271"/>
+            <a:off x="5687974" y="5310617"/>
+            <a:ext cx="676845" cy="355778"/>
           </a:xfrm>
           <a:prstGeom prst="rect">
             <a:avLst/>
@@ -14399,7 +15105,7 @@
         <p:spPr>
           <a:xfrm>
             <a:off x="3539874" y="3260390"/>
-            <a:ext cx="1454244" cy="300210"/>
+            <a:ext cx="1540806" cy="300210"/>
           </a:xfrm>
           <a:prstGeom prst="rect">
             <a:avLst/>
@@ -14429,7 +15135,7 @@
                   </a:srgbClr>
                 </a:solidFill>
               </a:rPr>
-              <a:t>containerMetrics</a:t>
+              <a:t>reeferTelemetries</a:t>
             </a:r>
           </a:p>
         </p:txBody>
@@ -15157,75 +15863,6 @@
           </a:fontRef>
         </p:style>
       </p:cxnSp>
-      <p:sp>
-        <p:nvSpPr>
-          <p:cNvPr id="36" name="Rectangle 35">
-            <a:extLst>
-              <a:ext uri="{FF2B5EF4-FFF2-40B4-BE49-F238E27FC236}">
-                <a16:creationId xmlns:a16="http://schemas.microsoft.com/office/drawing/2014/main" id="{1BCD2DAC-822C-EE4B-B97A-7FDAC9C7D1AD}"/>
-              </a:ext>
-            </a:extLst>
-          </p:cNvPr>
-          <p:cNvSpPr/>
-          <p:nvPr/>
-        </p:nvSpPr>
-        <p:spPr>
-          <a:xfrm>
-            <a:off x="609600" y="3688831"/>
-            <a:ext cx="2338282" cy="615667"/>
-          </a:xfrm>
-          <a:prstGeom prst="rect">
-            <a:avLst/>
-          </a:prstGeom>
-          <a:solidFill>
-            <a:schemeClr val="accent5">
-              <a:lumMod val="75000"/>
-            </a:schemeClr>
-          </a:solidFill>
-          <a:ln>
-            <a:noFill/>
-          </a:ln>
-        </p:spPr>
-        <p:style>
-          <a:lnRef idx="2">
-            <a:schemeClr val="accent1">
-              <a:shade val="50000"/>
-            </a:schemeClr>
-          </a:lnRef>
-          <a:fillRef idx="1">
-            <a:schemeClr val="accent1"/>
-          </a:fillRef>
-          <a:effectRef idx="0">
-            <a:schemeClr val="accent1"/>
-          </a:effectRef>
-          <a:fontRef idx="minor">
-            <a:schemeClr val="lt1"/>
-          </a:fontRef>
-        </p:style>
-        <p:txBody>
-          <a:bodyPr rtlCol="0" anchor="t"/>
-          <a:lstStyle/>
-          <a:p>
-            <a:pPr defTabSz="914377" eaLnBrk="1" fontAlgn="auto" hangingPunct="1">
-              <a:spcBef>
-                <a:spcPts val="0"/>
-              </a:spcBef>
-              <a:spcAft>
-                <a:spcPts val="0"/>
-              </a:spcAft>
-            </a:pPr>
-            <a:r>
-              <a:rPr lang="en-US" sz="1333" dirty="0">
-                <a:solidFill>
-                  <a:prstClr val="white"/>
-                </a:solidFill>
-                <a:latin typeface="Arial"/>
-              </a:rPr>
-              <a:t>Python Flask</a:t>
-            </a:r>
-          </a:p>
-        </p:txBody>
-      </p:sp>
       <p:pic>
         <p:nvPicPr>
           <p:cNvPr id="27" name="Picture 40">
@@ -15241,7 +15878,7 @@
           <p:nvPr/>
         </p:nvPicPr>
         <p:blipFill>
-          <a:blip r:embed="rId6">
+          <a:blip r:embed="rId5">
             <a:extLst>
               <a:ext uri="{28A0092B-C50C-407E-A947-70E740481C1C}">
                 <a14:useLocalDpi xmlns:a14="http://schemas.microsoft.com/office/drawing/2010/main" val="0"/>
@@ -15255,8 +15892,8 @@
         </p:blipFill>
         <p:spPr bwMode="auto">
           <a:xfrm>
-            <a:off x="-99239" y="4067225"/>
-            <a:ext cx="1414200" cy="524101"/>
+            <a:off x="128519" y="3483208"/>
+            <a:ext cx="1032463" cy="382630"/>
           </a:xfrm>
           <a:prstGeom prst="rect">
             <a:avLst/>
@@ -15301,15 +15938,15 @@
           <p:nvPr/>
         </p:nvPicPr>
         <p:blipFill>
-          <a:blip r:embed="rId7"/>
+          <a:blip r:embed="rId6"/>
           <a:stretch>
             <a:fillRect/>
           </a:stretch>
         </p:blipFill>
         <p:spPr>
           <a:xfrm>
-            <a:off x="1784980" y="3749132"/>
-            <a:ext cx="1162902" cy="465643"/>
+            <a:off x="2083809" y="3470687"/>
+            <a:ext cx="806955" cy="323116"/>
           </a:xfrm>
           <a:prstGeom prst="rect">
             <a:avLst/>
@@ -15331,7 +15968,7 @@
           <p:nvPr/>
         </p:nvPicPr>
         <p:blipFill>
-          <a:blip r:embed="rId8">
+          <a:blip r:embed="rId7">
             <a:extLst>
               <a:ext uri="{28A0092B-C50C-407E-A947-70E740481C1C}">
                 <a14:useLocalDpi xmlns:a14="http://schemas.microsoft.com/office/drawing/2010/main" val="0"/>
@@ -15374,8 +16011,8 @@
         </p:nvSpPr>
         <p:spPr>
           <a:xfrm>
-            <a:off x="7706436" y="5457620"/>
-            <a:ext cx="2519724" cy="914400"/>
+            <a:off x="7706436" y="5398962"/>
+            <a:ext cx="1688865" cy="973058"/>
           </a:xfrm>
           <a:prstGeom prst="rect">
             <a:avLst/>
@@ -15411,7 +16048,7 @@
           <a:p>
             <a:pPr algn="ctr"/>
             <a:r>
-              <a:rPr lang="en-US" dirty="0"/>
+              <a:rPr lang="en-US" sz="1600" dirty="0"/>
               <a:t>Container Consumer</a:t>
             </a:r>
           </a:p>
@@ -15435,8 +16072,8 @@
         </p:nvCxnSpPr>
         <p:spPr>
           <a:xfrm rot="16200000" flipH="1">
-            <a:off x="6563419" y="3054740"/>
-            <a:ext cx="305389" cy="4500370"/>
+            <a:off x="6452765" y="3300857"/>
+            <a:ext cx="111267" cy="4084941"/>
           </a:xfrm>
           <a:prstGeom prst="bentConnector3">
             <a:avLst>
@@ -15466,36 +16103,6 @@
           </a:fontRef>
         </p:style>
       </p:cxnSp>
-      <p:pic>
-        <p:nvPicPr>
-          <p:cNvPr id="45" name="Picture 44">
-            <a:extLst>
-              <a:ext uri="{FF2B5EF4-FFF2-40B4-BE49-F238E27FC236}">
-                <a16:creationId xmlns:a16="http://schemas.microsoft.com/office/drawing/2014/main" id="{84C29AEF-3CB4-4343-8D50-C59B663B2F81}"/>
-              </a:ext>
-            </a:extLst>
-          </p:cNvPr>
-          <p:cNvPicPr>
-            <a:picLocks noChangeAspect="1"/>
-          </p:cNvPicPr>
-          <p:nvPr/>
-        </p:nvPicPr>
-        <p:blipFill>
-          <a:blip r:embed="rId3"/>
-          <a:stretch>
-            <a:fillRect/>
-          </a:stretch>
-        </p:blipFill>
-        <p:spPr>
-          <a:xfrm>
-            <a:off x="857261" y="4715074"/>
-            <a:ext cx="1302236" cy="544571"/>
-          </a:xfrm>
-          <a:prstGeom prst="rect">
-            <a:avLst/>
-          </a:prstGeom>
-        </p:spPr>
-      </p:pic>
       <p:sp>
         <p:nvSpPr>
           <p:cNvPr id="31" name="Oval 30">
@@ -15742,7 +16349,7 @@
         </p:nvSpPr>
         <p:spPr bwMode="auto">
           <a:xfrm>
-            <a:off x="3609911" y="4420719"/>
+            <a:off x="3609911" y="4556183"/>
             <a:ext cx="245561" cy="731512"/>
           </a:xfrm>
           <a:prstGeom prst="roundRect">
@@ -15810,7 +16417,7 @@
         </p:nvSpPr>
         <p:spPr bwMode="auto">
           <a:xfrm>
-            <a:off x="3853748" y="4420719"/>
+            <a:off x="3853748" y="4556183"/>
             <a:ext cx="245561" cy="731512"/>
           </a:xfrm>
           <a:prstGeom prst="roundRect">
@@ -15878,7 +16485,7 @@
         </p:nvSpPr>
         <p:spPr bwMode="auto">
           <a:xfrm>
-            <a:off x="4099310" y="4420719"/>
+            <a:off x="4099310" y="4556183"/>
             <a:ext cx="245561" cy="731512"/>
           </a:xfrm>
           <a:prstGeom prst="roundRect">
@@ -15946,7 +16553,7 @@
         </p:nvSpPr>
         <p:spPr bwMode="auto">
           <a:xfrm>
-            <a:off x="4343147" y="4420719"/>
+            <a:off x="4343147" y="4556183"/>
             <a:ext cx="245561" cy="731512"/>
           </a:xfrm>
           <a:prstGeom prst="roundRect">
@@ -16014,7 +16621,7 @@
         </p:nvSpPr>
         <p:spPr bwMode="auto">
           <a:xfrm>
-            <a:off x="4588708" y="4420719"/>
+            <a:off x="4588708" y="4556183"/>
             <a:ext cx="245561" cy="731512"/>
           </a:xfrm>
           <a:prstGeom prst="roundRect">
@@ -16082,8 +16689,8 @@
         </p:nvSpPr>
         <p:spPr>
           <a:xfrm>
-            <a:off x="6864192" y="1772888"/>
-            <a:ext cx="2037645" cy="877732"/>
+            <a:off x="6864192" y="1605896"/>
+            <a:ext cx="2037645" cy="1044724"/>
           </a:xfrm>
           <a:prstGeom prst="rect">
             <a:avLst/>
@@ -16119,8 +16726,8 @@
           <a:p>
             <a:pPr algn="ctr"/>
             <a:r>
-              <a:rPr lang="en-US" dirty="0"/>
-              <a:t>Predictive Scoring</a:t>
+              <a:rPr lang="en-US" sz="1600" dirty="0"/>
+              <a:t>Anomaly Detection Scoring</a:t>
             </a:r>
           </a:p>
         </p:txBody>
@@ -16143,8 +16750,8 @@
         </p:nvCxnSpPr>
         <p:spPr>
           <a:xfrm rot="5400000" flipH="1" flipV="1">
-            <a:off x="5232964" y="1944672"/>
-            <a:ext cx="1364145" cy="1898311"/>
+            <a:off x="5191216" y="1902924"/>
+            <a:ext cx="1447641" cy="1898311"/>
           </a:xfrm>
           <a:prstGeom prst="bentConnector2">
             <a:avLst/>
@@ -16190,12 +16797,12 @@
         </p:nvCxnSpPr>
         <p:spPr>
           <a:xfrm rot="5400000">
-            <a:off x="5412203" y="1949906"/>
-            <a:ext cx="1770099" cy="3171526"/>
+            <a:off x="5344471" y="2017638"/>
+            <a:ext cx="1905563" cy="3171526"/>
           </a:xfrm>
           <a:prstGeom prst="bentConnector3">
             <a:avLst>
-              <a:gd name="adj1" fmla="val 95918"/>
+              <a:gd name="adj1" fmla="val 89988"/>
             </a:avLst>
           </a:prstGeom>
           <a:ln w="25400">
@@ -16292,7 +16899,7 @@
         </p:nvSpPr>
         <p:spPr>
           <a:xfrm>
-            <a:off x="4836868" y="4763387"/>
+            <a:off x="4836868" y="4898851"/>
             <a:ext cx="493464" cy="493464"/>
           </a:xfrm>
           <a:prstGeom prst="ellipse">
@@ -16349,7 +16956,7 @@
         </p:nvSpPr>
         <p:spPr>
           <a:xfrm>
-            <a:off x="9248572" y="4905498"/>
+            <a:off x="8863119" y="4905497"/>
             <a:ext cx="493464" cy="493464"/>
           </a:xfrm>
           <a:prstGeom prst="ellipse">
@@ -16406,7 +17013,7 @@
         </p:nvSpPr>
         <p:spPr>
           <a:xfrm>
-            <a:off x="3353609" y="5139992"/>
+            <a:off x="3353609" y="5275456"/>
             <a:ext cx="982961" cy="300210"/>
           </a:xfrm>
           <a:prstGeom prst="rect">
@@ -16506,7 +17113,7 @@
           <p:nvPr/>
         </p:nvPicPr>
         <p:blipFill>
-          <a:blip r:embed="rId6">
+          <a:blip r:embed="rId5">
             <a:extLst>
               <a:ext uri="{28A0092B-C50C-407E-A947-70E740481C1C}">
                 <a14:useLocalDpi xmlns:a14="http://schemas.microsoft.com/office/drawing/2010/main" val="0"/>
@@ -16520,8 +17127,8 @@
         </p:blipFill>
         <p:spPr bwMode="auto">
           <a:xfrm>
-            <a:off x="6185507" y="2436123"/>
-            <a:ext cx="1414200" cy="524101"/>
+            <a:off x="6453135" y="2436124"/>
+            <a:ext cx="904093" cy="335056"/>
           </a:xfrm>
           <a:prstGeom prst="rect">
             <a:avLst/>
@@ -16551,106 +17158,12 @@
           </a:extLst>
         </p:spPr>
       </p:pic>
-    </p:spTree>
-    <p:extLst>
-      <p:ext uri="{BB962C8B-B14F-4D97-AF65-F5344CB8AC3E}">
-        <p14:creationId xmlns:p14="http://schemas.microsoft.com/office/powerpoint/2010/main" val="2217531431"/>
-      </p:ext>
-    </p:extLst>
-  </p:cSld>
-  <p:clrMapOvr>
-    <a:masterClrMapping/>
-  </p:clrMapOvr>
-</p:sld>
-</file>
-
-<file path=ppt/slides/slide4.xml><?xml version="1.0" encoding="utf-8"?>
-<p:sld xmlns:a="http://schemas.openxmlformats.org/drawingml/2006/main" xmlns:r="http://schemas.openxmlformats.org/officeDocument/2006/relationships" xmlns:p="http://schemas.openxmlformats.org/presentationml/2006/main">
-  <p:cSld>
-    <p:spTree>
-      <p:nvGrpSpPr>
-        <p:cNvPr id="1" name=""/>
-        <p:cNvGrpSpPr/>
-        <p:nvPr/>
-      </p:nvGrpSpPr>
-      <p:grpSpPr>
-        <a:xfrm>
-          <a:off x="0" y="0"/>
-          <a:ext cx="0" cy="0"/>
-          <a:chOff x="0" y="0"/>
-          <a:chExt cx="0" cy="0"/>
-        </a:xfrm>
-      </p:grpSpPr>
       <p:sp>
         <p:nvSpPr>
-          <p:cNvPr id="2" name="Title 1">
+          <p:cNvPr id="61" name="Rectangle 60">
             <a:extLst>
               <a:ext uri="{FF2B5EF4-FFF2-40B4-BE49-F238E27FC236}">
-                <a16:creationId xmlns:a16="http://schemas.microsoft.com/office/drawing/2014/main" id="{83D72B5A-D2BF-0F41-AB02-0E3504265F76}"/>
-              </a:ext>
-            </a:extLst>
-          </p:cNvPr>
-          <p:cNvSpPr>
-            <a:spLocks noGrp="1"/>
-          </p:cNvSpPr>
-          <p:nvPr>
-            <p:ph type="title"/>
-          </p:nvPr>
-        </p:nvSpPr>
-        <p:spPr>
-          <a:xfrm>
-            <a:off x="288633" y="208582"/>
-            <a:ext cx="10515600" cy="521140"/>
-          </a:xfrm>
-        </p:spPr>
-        <p:txBody>
-          <a:bodyPr>
-            <a:normAutofit/>
-          </a:bodyPr>
-          <a:lstStyle/>
-          <a:p>
-            <a:r>
-              <a:rPr lang="en-US" sz="2400" dirty="0"/>
-              <a:t>Event Stream As Event Store for ML</a:t>
-            </a:r>
-          </a:p>
-        </p:txBody>
-      </p:sp>
-      <p:sp>
-        <p:nvSpPr>
-          <p:cNvPr id="4" name="Slide Number Placeholder 3">
-            <a:extLst>
-              <a:ext uri="{FF2B5EF4-FFF2-40B4-BE49-F238E27FC236}">
-                <a16:creationId xmlns:a16="http://schemas.microsoft.com/office/drawing/2014/main" id="{B1D66A27-027F-EA4A-B9BD-D02849496229}"/>
-              </a:ext>
-            </a:extLst>
-          </p:cNvPr>
-          <p:cNvSpPr>
-            <a:spLocks noGrp="1"/>
-          </p:cNvSpPr>
-          <p:nvPr>
-            <p:ph type="sldNum" sz="quarter" idx="12"/>
-          </p:nvPr>
-        </p:nvSpPr>
-        <p:spPr/>
-        <p:txBody>
-          <a:bodyPr/>
-          <a:lstStyle/>
-          <a:p>
-            <a:fld id="{C565C23E-6D76-459C-BC14-A9049E4EE889}" type="slidenum">
-              <a:rPr lang="en-US" smtClean="0"/>
-              <a:t>4</a:t>
-            </a:fld>
-            <a:endParaRPr lang="en-US"/>
-          </a:p>
-        </p:txBody>
-      </p:sp>
-      <p:sp>
-        <p:nvSpPr>
-          <p:cNvPr id="6" name="Rectangle 5">
-            <a:extLst>
-              <a:ext uri="{FF2B5EF4-FFF2-40B4-BE49-F238E27FC236}">
-                <a16:creationId xmlns:a16="http://schemas.microsoft.com/office/drawing/2014/main" id="{B53C0033-8D9E-604C-9B28-5FDD36C6C800}"/>
+                <a16:creationId xmlns:a16="http://schemas.microsoft.com/office/drawing/2014/main" id="{D5050CA6-AE2F-FD4D-9A51-EACC6C5B2016}"/>
               </a:ext>
             </a:extLst>
           </p:cNvPr>
@@ -16659,134 +17172,20 @@
         </p:nvSpPr>
         <p:spPr>
           <a:xfrm>
-            <a:off x="6118016" y="1616526"/>
-            <a:ext cx="3066325" cy="1525409"/>
-          </a:xfrm>
-          <a:prstGeom prst="rect">
-            <a:avLst/>
-          </a:prstGeom>
-          <a:noFill/>
-          <a:ln>
-            <a:prstDash val="dash"/>
-          </a:ln>
-        </p:spPr>
-        <p:style>
-          <a:lnRef idx="2">
-            <a:schemeClr val="accent1">
-              <a:shade val="50000"/>
-            </a:schemeClr>
-          </a:lnRef>
-          <a:fillRef idx="1">
-            <a:schemeClr val="accent1"/>
-          </a:fillRef>
-          <a:effectRef idx="0">
-            <a:schemeClr val="accent1"/>
-          </a:effectRef>
-          <a:fontRef idx="minor">
-            <a:schemeClr val="lt1"/>
-          </a:fontRef>
-        </p:style>
-        <p:txBody>
-          <a:bodyPr rtlCol="0" anchor="b"/>
-          <a:lstStyle/>
-          <a:p>
-            <a:pPr algn="ctr"/>
-            <a:r>
-              <a:rPr lang="en-US" sz="1200" dirty="0">
-                <a:solidFill>
-                  <a:schemeClr val="tx1"/>
-                </a:solidFill>
-              </a:rPr>
-              <a:t>ML Environment</a:t>
-            </a:r>
-          </a:p>
-        </p:txBody>
-      </p:sp>
-      <p:sp>
-        <p:nvSpPr>
-          <p:cNvPr id="8" name="Rectangle 7">
-            <a:extLst>
-              <a:ext uri="{FF2B5EF4-FFF2-40B4-BE49-F238E27FC236}">
-                <a16:creationId xmlns:a16="http://schemas.microsoft.com/office/drawing/2014/main" id="{FB63688E-FF28-D746-AC3D-3D2EFBDE0655}"/>
-              </a:ext>
-            </a:extLst>
-          </p:cNvPr>
-          <p:cNvSpPr/>
-          <p:nvPr/>
-        </p:nvSpPr>
-        <p:spPr>
-          <a:xfrm>
-            <a:off x="642258" y="1282632"/>
-            <a:ext cx="2008413" cy="1655634"/>
-          </a:xfrm>
-          <a:prstGeom prst="rect">
-            <a:avLst/>
-          </a:prstGeom>
-          <a:noFill/>
-          <a:ln>
-            <a:solidFill>
-              <a:schemeClr val="accent3"/>
-            </a:solidFill>
-            <a:prstDash val="dash"/>
-          </a:ln>
-        </p:spPr>
-        <p:style>
-          <a:lnRef idx="2">
-            <a:schemeClr val="accent1">
-              <a:shade val="50000"/>
-            </a:schemeClr>
-          </a:lnRef>
-          <a:fillRef idx="1">
-            <a:schemeClr val="accent1"/>
-          </a:fillRef>
-          <a:effectRef idx="0">
-            <a:schemeClr val="accent1"/>
-          </a:effectRef>
-          <a:fontRef idx="minor">
-            <a:schemeClr val="lt1"/>
-          </a:fontRef>
-        </p:style>
-        <p:txBody>
-          <a:bodyPr rtlCol="0" anchor="b"/>
-          <a:lstStyle/>
-          <a:p>
-            <a:pPr algn="ctr"/>
-            <a:r>
-              <a:rPr lang="en-US" sz="1200" dirty="0">
-                <a:solidFill>
-                  <a:schemeClr val="tx1"/>
-                </a:solidFill>
-              </a:rPr>
-              <a:t>Python</a:t>
-            </a:r>
-          </a:p>
-        </p:txBody>
-      </p:sp>
-      <p:sp>
-        <p:nvSpPr>
-          <p:cNvPr id="9" name="Rectangle 8">
-            <a:extLst>
-              <a:ext uri="{FF2B5EF4-FFF2-40B4-BE49-F238E27FC236}">
-                <a16:creationId xmlns:a16="http://schemas.microsoft.com/office/drawing/2014/main" id="{F1EEF6CD-0322-394A-87BF-5379FE8EE999}"/>
-              </a:ext>
-            </a:extLst>
-          </p:cNvPr>
-          <p:cNvSpPr/>
-          <p:nvPr/>
-        </p:nvSpPr>
-        <p:spPr>
-          <a:xfrm>
-            <a:off x="762000" y="1616527"/>
-            <a:ext cx="1703614" cy="914400"/>
+            <a:off x="10118109" y="5328548"/>
+            <a:ext cx="1688865" cy="1047432"/>
           </a:xfrm>
           <a:prstGeom prst="rect">
             <a:avLst/>
           </a:prstGeom>
           <a:solidFill>
-            <a:schemeClr val="accent5">
+            <a:schemeClr val="bg2">
               <a:lumMod val="75000"/>
             </a:schemeClr>
           </a:solidFill>
+          <a:ln>
+            <a:noFill/>
+          </a:ln>
         </p:spPr>
         <p:style>
           <a:lnRef idx="2">
@@ -16810,161 +17209,54 @@
           <a:p>
             <a:pPr algn="ctr"/>
             <a:r>
-              <a:rPr lang="en-US" sz="1400" dirty="0"/>
-              <a:t>Simulator</a:t>
+              <a:rPr lang="en-US" sz="1600" dirty="0"/>
+              <a:t>Reefer Maintenance Business Process</a:t>
             </a:r>
           </a:p>
         </p:txBody>
       </p:sp>
-      <p:pic>
-        <p:nvPicPr>
-          <p:cNvPr id="25" name="Picture 40">
-            <a:extLst>
-              <a:ext uri="{FF2B5EF4-FFF2-40B4-BE49-F238E27FC236}">
-                <a16:creationId xmlns:a16="http://schemas.microsoft.com/office/drawing/2014/main" id="{6CF0C2DA-CD62-0F4A-B6D7-15B98EF785FA}"/>
-              </a:ext>
-            </a:extLst>
-          </p:cNvPr>
-          <p:cNvPicPr>
-            <a:picLocks noChangeAspect="1"/>
-          </p:cNvPicPr>
-          <p:nvPr/>
-        </p:nvPicPr>
-        <p:blipFill>
-          <a:blip r:embed="rId2">
-            <a:extLst>
-              <a:ext uri="{28A0092B-C50C-407E-A947-70E740481C1C}">
-                <a14:useLocalDpi xmlns:a14="http://schemas.microsoft.com/office/drawing/2010/main" val="0"/>
-              </a:ext>
-            </a:extLst>
-          </a:blip>
-          <a:srcRect/>
-          <a:stretch>
-            <a:fillRect/>
-          </a:stretch>
-        </p:blipFill>
-        <p:spPr bwMode="auto">
-          <a:xfrm>
-            <a:off x="116601" y="2734597"/>
-            <a:ext cx="1099134" cy="407338"/>
-          </a:xfrm>
-          <a:prstGeom prst="rect">
-            <a:avLst/>
-          </a:prstGeom>
-          <a:noFill/>
-          <a:ln>
-            <a:noFill/>
-          </a:ln>
-          <a:extLst>
-            <a:ext uri="{909E8E84-426E-40DD-AFC4-6F175D3DCCD1}">
-              <a14:hiddenFill xmlns:a14="http://schemas.microsoft.com/office/drawing/2010/main">
-                <a:solidFill>
-                  <a:srgbClr val="FFFFFF"/>
-                </a:solidFill>
-              </a14:hiddenFill>
-            </a:ext>
-            <a:ext uri="{91240B29-F687-4F45-9708-019B960494DF}">
-              <a14:hiddenLine xmlns:a14="http://schemas.microsoft.com/office/drawing/2010/main" w="9525">
-                <a:solidFill>
-                  <a:srgbClr val="000000"/>
-                </a:solidFill>
-                <a:miter lim="800000"/>
-                <a:headEnd/>
-                <a:tailEnd/>
-              </a14:hiddenLine>
-            </a:ext>
-          </a:extLst>
-        </p:spPr>
-      </p:pic>
       <p:cxnSp>
         <p:nvCxnSpPr>
-          <p:cNvPr id="46" name="Elbow Connector 45">
+          <p:cNvPr id="62" name="Elbow Connector 61">
             <a:extLst>
               <a:ext uri="{FF2B5EF4-FFF2-40B4-BE49-F238E27FC236}">
-                <a16:creationId xmlns:a16="http://schemas.microsoft.com/office/drawing/2014/main" id="{B815F1F6-8EC9-A547-951A-6A6BA26A1B3E}"/>
+                <a16:creationId xmlns:a16="http://schemas.microsoft.com/office/drawing/2014/main" id="{36EFE182-9BB6-A145-A214-232557BE7242}"/>
               </a:ext>
             </a:extLst>
           </p:cNvPr>
           <p:cNvCxnSpPr>
             <a:cxnSpLocks/>
-            <a:stCxn id="9" idx="3"/>
-            <a:endCxn id="59" idx="1"/>
+            <a:stCxn id="41" idx="3"/>
+            <a:endCxn id="61" idx="1"/>
           </p:cNvCxnSpPr>
           <p:nvPr/>
         </p:nvCxnSpPr>
         <p:spPr>
-          <a:xfrm>
-            <a:off x="2465614" y="2073727"/>
-            <a:ext cx="2093194" cy="516747"/>
-          </a:xfrm>
-          <a:prstGeom prst="bentConnector2">
-            <a:avLst/>
+          <a:xfrm flipV="1">
+            <a:off x="9395301" y="5852264"/>
+            <a:ext cx="722808" cy="33227"/>
+          </a:xfrm>
+          <a:prstGeom prst="bentConnector3">
+            <a:avLst>
+              <a:gd name="adj1" fmla="val 50000"/>
+            </a:avLst>
           </a:prstGeom>
-          <a:ln>
+          <a:ln w="25400">
             <a:solidFill>
-              <a:schemeClr val="accent6"/>
+              <a:srgbClr val="7030A0"/>
             </a:solidFill>
+            <a:prstDash val="solid"/>
             <a:tailEnd type="triangle"/>
           </a:ln>
-          <a:effectLst/>
         </p:spPr>
         <p:style>
-          <a:lnRef idx="2">
+          <a:lnRef idx="1">
             <a:schemeClr val="accent1"/>
           </a:lnRef>
           <a:fillRef idx="0">
             <a:schemeClr val="accent1"/>
           </a:fillRef>
-          <a:effectRef idx="1">
-            <a:schemeClr val="accent1"/>
-          </a:effectRef>
-          <a:fontRef idx="minor">
-            <a:schemeClr val="tx1"/>
-          </a:fontRef>
-        </p:style>
-      </p:cxnSp>
-      <p:cxnSp>
-        <p:nvCxnSpPr>
-          <p:cNvPr id="71" name="Elbow Connector 70">
-            <a:extLst>
-              <a:ext uri="{FF2B5EF4-FFF2-40B4-BE49-F238E27FC236}">
-                <a16:creationId xmlns:a16="http://schemas.microsoft.com/office/drawing/2014/main" id="{9B3950A4-1025-DB48-B886-5945ADD35206}"/>
-              </a:ext>
-            </a:extLst>
-          </p:cNvPr>
-          <p:cNvCxnSpPr>
-            <a:cxnSpLocks/>
-            <a:stCxn id="45" idx="1"/>
-            <a:endCxn id="59" idx="4"/>
-          </p:cNvCxnSpPr>
-          <p:nvPr/>
-        </p:nvCxnSpPr>
-        <p:spPr>
-          <a:xfrm rot="10800000" flipV="1">
-            <a:off x="5157329" y="2100404"/>
-            <a:ext cx="1320870" cy="837862"/>
-          </a:xfrm>
-          <a:prstGeom prst="bentConnector3">
-            <a:avLst>
-              <a:gd name="adj1" fmla="val 50000"/>
-            </a:avLst>
-          </a:prstGeom>
-          <a:ln>
-            <a:solidFill>
-              <a:srgbClr val="7030A0"/>
-            </a:solidFill>
-            <a:tailEnd type="triangle"/>
-          </a:ln>
-          <a:effectLst/>
-        </p:spPr>
-        <p:style>
-          <a:lnRef idx="2">
-            <a:schemeClr val="accent1"/>
-          </a:lnRef>
-          <a:fillRef idx="0">
-            <a:schemeClr val="accent1"/>
-          </a:fillRef>
-          <a:effectRef idx="1">
+          <a:effectRef idx="0">
             <a:schemeClr val="accent1"/>
           </a:effectRef>
           <a:fontRef idx="minor">
@@ -16974,10 +17266,10 @@
       </p:cxnSp>
       <p:sp>
         <p:nvSpPr>
-          <p:cNvPr id="45" name="Rounded Rectangle 44">
+          <p:cNvPr id="64" name="Oval 63">
             <a:extLst>
               <a:ext uri="{FF2B5EF4-FFF2-40B4-BE49-F238E27FC236}">
-                <a16:creationId xmlns:a16="http://schemas.microsoft.com/office/drawing/2014/main" id="{F495E1A9-5EC6-5446-ACF5-3911A287BB83}"/>
+                <a16:creationId xmlns:a16="http://schemas.microsoft.com/office/drawing/2014/main" id="{B9A41D53-F4C6-064E-94AF-30C02D9F7034}"/>
               </a:ext>
             </a:extLst>
           </p:cNvPr>
@@ -16986,112 +17278,14 @@
         </p:nvSpPr>
         <p:spPr>
           <a:xfrm>
-            <a:off x="6478199" y="1913633"/>
-            <a:ext cx="1749097" cy="373542"/>
-          </a:xfrm>
-          <a:prstGeom prst="roundRect">
-            <a:avLst>
-              <a:gd name="adj" fmla="val 9717"/>
-            </a:avLst>
-          </a:prstGeom>
-          <a:noFill/>
-          <a:ln w="12700">
-            <a:solidFill>
-              <a:schemeClr val="tx2">
-                <a:lumMod val="50000"/>
-              </a:schemeClr>
-            </a:solidFill>
-          </a:ln>
-          <a:effectLst/>
-        </p:spPr>
-        <p:style>
-          <a:lnRef idx="1">
-            <a:schemeClr val="dk1"/>
-          </a:lnRef>
-          <a:fillRef idx="2">
-            <a:schemeClr val="dk1"/>
-          </a:fillRef>
-          <a:effectRef idx="1">
-            <a:schemeClr val="dk1"/>
-          </a:effectRef>
-          <a:fontRef idx="minor">
-            <a:schemeClr val="dk1"/>
-          </a:fontRef>
-        </p:style>
-        <p:txBody>
-          <a:bodyPr rot="0" spcFirstLastPara="0" vertOverflow="overflow" horzOverflow="overflow" vert="horz" wrap="square" lIns="0" tIns="0" rIns="0" bIns="0" numCol="1" spcCol="0" rtlCol="0" fromWordArt="0" anchor="t" anchorCtr="0" forceAA="0" compatLnSpc="1">
-            <a:prstTxWarp prst="textNoShape">
-              <a:avLst/>
-            </a:prstTxWarp>
-            <a:noAutofit/>
-          </a:bodyPr>
-          <a:lstStyle/>
-          <a:p>
-            <a:r>
-              <a:rPr lang="en-US" sz="1200" baseline="0" dirty="0">
-                <a:solidFill>
-                  <a:schemeClr val="tx1"/>
-                </a:solidFill>
-                <a:latin typeface="IBM Plex Sans" panose="020B0503050203000203" pitchFamily="34" charset="77"/>
-                <a:cs typeface="Arial"/>
-              </a:rPr>
-              <a:t>Pandas DF</a:t>
-            </a:r>
-          </a:p>
-        </p:txBody>
-      </p:sp>
-      <p:pic>
-        <p:nvPicPr>
-          <p:cNvPr id="13" name="Picture 12">
-            <a:extLst>
-              <a:ext uri="{FF2B5EF4-FFF2-40B4-BE49-F238E27FC236}">
-                <a16:creationId xmlns:a16="http://schemas.microsoft.com/office/drawing/2014/main" id="{B81AAF60-BF23-E149-AC44-3DFB94494F2F}"/>
-              </a:ext>
-            </a:extLst>
-          </p:cNvPr>
-          <p:cNvPicPr>
-            <a:picLocks noChangeAspect="1"/>
-          </p:cNvPicPr>
-          <p:nvPr/>
-        </p:nvPicPr>
-        <p:blipFill>
-          <a:blip r:embed="rId3"/>
-          <a:stretch>
-            <a:fillRect/>
-          </a:stretch>
-        </p:blipFill>
-        <p:spPr>
-          <a:xfrm>
-            <a:off x="3492393" y="3041219"/>
-            <a:ext cx="638156" cy="680700"/>
-          </a:xfrm>
-          <a:prstGeom prst="rect">
-            <a:avLst/>
-          </a:prstGeom>
-        </p:spPr>
-      </p:pic>
-      <p:sp>
-        <p:nvSpPr>
-          <p:cNvPr id="59" name="Can 58">
-            <a:extLst>
-              <a:ext uri="{FF2B5EF4-FFF2-40B4-BE49-F238E27FC236}">
-                <a16:creationId xmlns:a16="http://schemas.microsoft.com/office/drawing/2014/main" id="{BF8D5F17-7886-6A49-A326-AB3283F367DA}"/>
-              </a:ext>
-            </a:extLst>
-          </p:cNvPr>
-          <p:cNvSpPr/>
-          <p:nvPr/>
-        </p:nvSpPr>
-        <p:spPr>
-          <a:xfrm>
-            <a:off x="3960287" y="2590474"/>
-            <a:ext cx="1197042" cy="695584"/>
-          </a:xfrm>
-          <a:prstGeom prst="can">
+            <a:off x="11446485" y="4901783"/>
+            <a:ext cx="493464" cy="493464"/>
+          </a:xfrm>
+          <a:prstGeom prst="ellipse">
             <a:avLst/>
           </a:prstGeom>
           <a:solidFill>
-            <a:schemeClr val="accent5">
+            <a:schemeClr val="tx2">
               <a:lumMod val="75000"/>
             </a:schemeClr>
           </a:solidFill>
@@ -17121,16 +17315,196 @@
           <a:p>
             <a:pPr algn="ctr"/>
             <a:r>
-              <a:rPr lang="en-US" sz="1000" dirty="0"/>
-              <a:t>Reefer telemetries</a:t>
+              <a:rPr lang="en-US" sz="1400" dirty="0"/>
+              <a:t>7</a:t>
             </a:r>
           </a:p>
         </p:txBody>
       </p:sp>
+      <p:pic>
+        <p:nvPicPr>
+          <p:cNvPr id="65" name="Picture 64">
+            <a:extLst>
+              <a:ext uri="{FF2B5EF4-FFF2-40B4-BE49-F238E27FC236}">
+                <a16:creationId xmlns:a16="http://schemas.microsoft.com/office/drawing/2014/main" id="{FDDB9C6D-D2CF-384E-997C-471676C2C05F}"/>
+              </a:ext>
+            </a:extLst>
+          </p:cNvPr>
+          <p:cNvPicPr>
+            <a:picLocks noChangeAspect="1"/>
+          </p:cNvPicPr>
+          <p:nvPr/>
+        </p:nvPicPr>
+        <p:blipFill>
+          <a:blip r:embed="rId8"/>
+          <a:stretch>
+            <a:fillRect/>
+          </a:stretch>
+        </p:blipFill>
+        <p:spPr>
+          <a:xfrm>
+            <a:off x="83518" y="3848118"/>
+            <a:ext cx="280628" cy="256574"/>
+          </a:xfrm>
+          <a:prstGeom prst="rect">
+            <a:avLst/>
+          </a:prstGeom>
+        </p:spPr>
+      </p:pic>
+      <p:pic>
+        <p:nvPicPr>
+          <p:cNvPr id="66" name="Picture 65">
+            <a:extLst>
+              <a:ext uri="{FF2B5EF4-FFF2-40B4-BE49-F238E27FC236}">
+                <a16:creationId xmlns:a16="http://schemas.microsoft.com/office/drawing/2014/main" id="{C1A7F551-9939-0B40-AA4F-AC94036B5EA2}"/>
+              </a:ext>
+            </a:extLst>
+          </p:cNvPr>
+          <p:cNvPicPr>
+            <a:picLocks noChangeAspect="1"/>
+          </p:cNvPicPr>
+          <p:nvPr/>
+        </p:nvPicPr>
+        <p:blipFill>
+          <a:blip r:embed="rId8"/>
+          <a:stretch>
+            <a:fillRect/>
+          </a:stretch>
+        </p:blipFill>
+        <p:spPr>
+          <a:xfrm>
+            <a:off x="8704168" y="2450668"/>
+            <a:ext cx="280628" cy="256574"/>
+          </a:xfrm>
+          <a:prstGeom prst="rect">
+            <a:avLst/>
+          </a:prstGeom>
+        </p:spPr>
+      </p:pic>
+      <p:pic>
+        <p:nvPicPr>
+          <p:cNvPr id="70" name="Picture 69">
+            <a:extLst>
+              <a:ext uri="{FF2B5EF4-FFF2-40B4-BE49-F238E27FC236}">
+                <a16:creationId xmlns:a16="http://schemas.microsoft.com/office/drawing/2014/main" id="{2372E1AB-BAD1-F640-9665-3226BECA96C6}"/>
+              </a:ext>
+            </a:extLst>
+          </p:cNvPr>
+          <p:cNvPicPr>
+            <a:picLocks noChangeAspect="1"/>
+          </p:cNvPicPr>
+          <p:nvPr/>
+        </p:nvPicPr>
+        <p:blipFill>
+          <a:blip r:embed="rId8"/>
+          <a:stretch>
+            <a:fillRect/>
+          </a:stretch>
+        </p:blipFill>
+        <p:spPr>
+          <a:xfrm>
+            <a:off x="7591730" y="6243733"/>
+            <a:ext cx="280628" cy="256574"/>
+          </a:xfrm>
+          <a:prstGeom prst="rect">
+            <a:avLst/>
+          </a:prstGeom>
+        </p:spPr>
+      </p:pic>
+      <p:pic>
+        <p:nvPicPr>
+          <p:cNvPr id="71" name="Picture 70">
+            <a:extLst>
+              <a:ext uri="{FF2B5EF4-FFF2-40B4-BE49-F238E27FC236}">
+                <a16:creationId xmlns:a16="http://schemas.microsoft.com/office/drawing/2014/main" id="{BCB3DBEB-364D-124D-BB12-D4D28D96D356}"/>
+              </a:ext>
+            </a:extLst>
+          </p:cNvPr>
+          <p:cNvPicPr>
+            <a:picLocks noChangeAspect="1"/>
+          </p:cNvPicPr>
+          <p:nvPr/>
+        </p:nvPicPr>
+        <p:blipFill>
+          <a:blip r:embed="rId9"/>
+          <a:stretch>
+            <a:fillRect/>
+          </a:stretch>
+        </p:blipFill>
+        <p:spPr>
+          <a:xfrm>
+            <a:off x="9067394" y="6117486"/>
+            <a:ext cx="442613" cy="442613"/>
+          </a:xfrm>
+          <a:prstGeom prst="rect">
+            <a:avLst/>
+          </a:prstGeom>
+        </p:spPr>
+      </p:pic>
+      <p:pic>
+        <p:nvPicPr>
+          <p:cNvPr id="37" name="Picture 36">
+            <a:extLst>
+              <a:ext uri="{FF2B5EF4-FFF2-40B4-BE49-F238E27FC236}">
+                <a16:creationId xmlns:a16="http://schemas.microsoft.com/office/drawing/2014/main" id="{FEF2F464-669F-F441-9649-9249CE160C59}"/>
+              </a:ext>
+            </a:extLst>
+          </p:cNvPr>
+          <p:cNvPicPr>
+            <a:picLocks noChangeAspect="1"/>
+          </p:cNvPicPr>
+          <p:nvPr/>
+        </p:nvPicPr>
+        <p:blipFill>
+          <a:blip r:embed="rId10"/>
+          <a:stretch>
+            <a:fillRect/>
+          </a:stretch>
+        </p:blipFill>
+        <p:spPr>
+          <a:xfrm>
+            <a:off x="11446485" y="6121893"/>
+            <a:ext cx="539648" cy="539648"/>
+          </a:xfrm>
+          <a:prstGeom prst="rect">
+            <a:avLst/>
+          </a:prstGeom>
+        </p:spPr>
+      </p:pic>
+      <p:pic>
+        <p:nvPicPr>
+          <p:cNvPr id="74" name="Picture 73">
+            <a:extLst>
+              <a:ext uri="{FF2B5EF4-FFF2-40B4-BE49-F238E27FC236}">
+                <a16:creationId xmlns:a16="http://schemas.microsoft.com/office/drawing/2014/main" id="{858EDC7C-8111-2E41-8EF6-139882BC04DE}"/>
+              </a:ext>
+            </a:extLst>
+          </p:cNvPr>
+          <p:cNvPicPr>
+            <a:picLocks noChangeAspect="1"/>
+          </p:cNvPicPr>
+          <p:nvPr/>
+        </p:nvPicPr>
+        <p:blipFill>
+          <a:blip r:embed="rId6"/>
+          <a:stretch>
+            <a:fillRect/>
+          </a:stretch>
+        </p:blipFill>
+        <p:spPr>
+          <a:xfrm>
+            <a:off x="7899573" y="2450782"/>
+            <a:ext cx="806955" cy="323116"/>
+          </a:xfrm>
+          <a:prstGeom prst="rect">
+            <a:avLst/>
+          </a:prstGeom>
+        </p:spPr>
+      </p:pic>
     </p:spTree>
     <p:extLst>
       <p:ext uri="{BB962C8B-B14F-4D97-AF65-F5344CB8AC3E}">
-        <p14:creationId xmlns:p14="http://schemas.microsoft.com/office/powerpoint/2010/main" val="3696044975"/>
+        <p14:creationId xmlns:p14="http://schemas.microsoft.com/office/powerpoint/2010/main" val="2217531431"/>
       </p:ext>
     </p:extLst>
   </p:cSld>
@@ -17235,6 +17609,582 @@
         </p:nvSpPr>
         <p:spPr>
           <a:xfrm>
+            <a:off x="6118016" y="1616526"/>
+            <a:ext cx="3066325" cy="1525409"/>
+          </a:xfrm>
+          <a:prstGeom prst="rect">
+            <a:avLst/>
+          </a:prstGeom>
+          <a:noFill/>
+          <a:ln>
+            <a:prstDash val="dash"/>
+          </a:ln>
+        </p:spPr>
+        <p:style>
+          <a:lnRef idx="2">
+            <a:schemeClr val="accent1">
+              <a:shade val="50000"/>
+            </a:schemeClr>
+          </a:lnRef>
+          <a:fillRef idx="1">
+            <a:schemeClr val="accent1"/>
+          </a:fillRef>
+          <a:effectRef idx="0">
+            <a:schemeClr val="accent1"/>
+          </a:effectRef>
+          <a:fontRef idx="minor">
+            <a:schemeClr val="lt1"/>
+          </a:fontRef>
+        </p:style>
+        <p:txBody>
+          <a:bodyPr rtlCol="0" anchor="b"/>
+          <a:lstStyle/>
+          <a:p>
+            <a:pPr algn="ctr"/>
+            <a:r>
+              <a:rPr lang="en-US" sz="1200" dirty="0">
+                <a:solidFill>
+                  <a:schemeClr val="tx1"/>
+                </a:solidFill>
+              </a:rPr>
+              <a:t>ML Environment</a:t>
+            </a:r>
+          </a:p>
+        </p:txBody>
+      </p:sp>
+      <p:sp>
+        <p:nvSpPr>
+          <p:cNvPr id="8" name="Rectangle 7">
+            <a:extLst>
+              <a:ext uri="{FF2B5EF4-FFF2-40B4-BE49-F238E27FC236}">
+                <a16:creationId xmlns:a16="http://schemas.microsoft.com/office/drawing/2014/main" id="{FB63688E-FF28-D746-AC3D-3D2EFBDE0655}"/>
+              </a:ext>
+            </a:extLst>
+          </p:cNvPr>
+          <p:cNvSpPr/>
+          <p:nvPr/>
+        </p:nvSpPr>
+        <p:spPr>
+          <a:xfrm>
+            <a:off x="642258" y="1282632"/>
+            <a:ext cx="2008413" cy="1655634"/>
+          </a:xfrm>
+          <a:prstGeom prst="rect">
+            <a:avLst/>
+          </a:prstGeom>
+          <a:noFill/>
+          <a:ln>
+            <a:solidFill>
+              <a:schemeClr val="accent3"/>
+            </a:solidFill>
+            <a:prstDash val="dash"/>
+          </a:ln>
+        </p:spPr>
+        <p:style>
+          <a:lnRef idx="2">
+            <a:schemeClr val="accent1">
+              <a:shade val="50000"/>
+            </a:schemeClr>
+          </a:lnRef>
+          <a:fillRef idx="1">
+            <a:schemeClr val="accent1"/>
+          </a:fillRef>
+          <a:effectRef idx="0">
+            <a:schemeClr val="accent1"/>
+          </a:effectRef>
+          <a:fontRef idx="minor">
+            <a:schemeClr val="lt1"/>
+          </a:fontRef>
+        </p:style>
+        <p:txBody>
+          <a:bodyPr rtlCol="0" anchor="b"/>
+          <a:lstStyle/>
+          <a:p>
+            <a:pPr algn="ctr"/>
+            <a:r>
+              <a:rPr lang="en-US" sz="1200" dirty="0">
+                <a:solidFill>
+                  <a:schemeClr val="tx1"/>
+                </a:solidFill>
+              </a:rPr>
+              <a:t>Python</a:t>
+            </a:r>
+          </a:p>
+        </p:txBody>
+      </p:sp>
+      <p:sp>
+        <p:nvSpPr>
+          <p:cNvPr id="9" name="Rectangle 8">
+            <a:extLst>
+              <a:ext uri="{FF2B5EF4-FFF2-40B4-BE49-F238E27FC236}">
+                <a16:creationId xmlns:a16="http://schemas.microsoft.com/office/drawing/2014/main" id="{F1EEF6CD-0322-394A-87BF-5379FE8EE999}"/>
+              </a:ext>
+            </a:extLst>
+          </p:cNvPr>
+          <p:cNvSpPr/>
+          <p:nvPr/>
+        </p:nvSpPr>
+        <p:spPr>
+          <a:xfrm>
+            <a:off x="762000" y="1616527"/>
+            <a:ext cx="1703614" cy="914400"/>
+          </a:xfrm>
+          <a:prstGeom prst="rect">
+            <a:avLst/>
+          </a:prstGeom>
+          <a:solidFill>
+            <a:schemeClr val="accent5">
+              <a:lumMod val="75000"/>
+            </a:schemeClr>
+          </a:solidFill>
+        </p:spPr>
+        <p:style>
+          <a:lnRef idx="2">
+            <a:schemeClr val="accent1">
+              <a:shade val="50000"/>
+            </a:schemeClr>
+          </a:lnRef>
+          <a:fillRef idx="1">
+            <a:schemeClr val="accent1"/>
+          </a:fillRef>
+          <a:effectRef idx="0">
+            <a:schemeClr val="accent1"/>
+          </a:effectRef>
+          <a:fontRef idx="minor">
+            <a:schemeClr val="lt1"/>
+          </a:fontRef>
+        </p:style>
+        <p:txBody>
+          <a:bodyPr rtlCol="0" anchor="ctr"/>
+          <a:lstStyle/>
+          <a:p>
+            <a:pPr algn="ctr"/>
+            <a:r>
+              <a:rPr lang="en-US" sz="1400" dirty="0"/>
+              <a:t>Simulator</a:t>
+            </a:r>
+          </a:p>
+        </p:txBody>
+      </p:sp>
+      <p:pic>
+        <p:nvPicPr>
+          <p:cNvPr id="25" name="Picture 40">
+            <a:extLst>
+              <a:ext uri="{FF2B5EF4-FFF2-40B4-BE49-F238E27FC236}">
+                <a16:creationId xmlns:a16="http://schemas.microsoft.com/office/drawing/2014/main" id="{6CF0C2DA-CD62-0F4A-B6D7-15B98EF785FA}"/>
+              </a:ext>
+            </a:extLst>
+          </p:cNvPr>
+          <p:cNvPicPr>
+            <a:picLocks noChangeAspect="1"/>
+          </p:cNvPicPr>
+          <p:nvPr/>
+        </p:nvPicPr>
+        <p:blipFill>
+          <a:blip r:embed="rId2">
+            <a:extLst>
+              <a:ext uri="{28A0092B-C50C-407E-A947-70E740481C1C}">
+                <a14:useLocalDpi xmlns:a14="http://schemas.microsoft.com/office/drawing/2010/main" val="0"/>
+              </a:ext>
+            </a:extLst>
+          </a:blip>
+          <a:srcRect/>
+          <a:stretch>
+            <a:fillRect/>
+          </a:stretch>
+        </p:blipFill>
+        <p:spPr bwMode="auto">
+          <a:xfrm>
+            <a:off x="116601" y="2734597"/>
+            <a:ext cx="1099134" cy="407338"/>
+          </a:xfrm>
+          <a:prstGeom prst="rect">
+            <a:avLst/>
+          </a:prstGeom>
+          <a:noFill/>
+          <a:ln>
+            <a:noFill/>
+          </a:ln>
+          <a:extLst>
+            <a:ext uri="{909E8E84-426E-40DD-AFC4-6F175D3DCCD1}">
+              <a14:hiddenFill xmlns:a14="http://schemas.microsoft.com/office/drawing/2010/main">
+                <a:solidFill>
+                  <a:srgbClr val="FFFFFF"/>
+                </a:solidFill>
+              </a14:hiddenFill>
+            </a:ext>
+            <a:ext uri="{91240B29-F687-4F45-9708-019B960494DF}">
+              <a14:hiddenLine xmlns:a14="http://schemas.microsoft.com/office/drawing/2010/main" w="9525">
+                <a:solidFill>
+                  <a:srgbClr val="000000"/>
+                </a:solidFill>
+                <a:miter lim="800000"/>
+                <a:headEnd/>
+                <a:tailEnd/>
+              </a14:hiddenLine>
+            </a:ext>
+          </a:extLst>
+        </p:spPr>
+      </p:pic>
+      <p:cxnSp>
+        <p:nvCxnSpPr>
+          <p:cNvPr id="46" name="Elbow Connector 45">
+            <a:extLst>
+              <a:ext uri="{FF2B5EF4-FFF2-40B4-BE49-F238E27FC236}">
+                <a16:creationId xmlns:a16="http://schemas.microsoft.com/office/drawing/2014/main" id="{B815F1F6-8EC9-A547-951A-6A6BA26A1B3E}"/>
+              </a:ext>
+            </a:extLst>
+          </p:cNvPr>
+          <p:cNvCxnSpPr>
+            <a:cxnSpLocks/>
+            <a:stCxn id="9" idx="3"/>
+            <a:endCxn id="59" idx="1"/>
+          </p:cNvCxnSpPr>
+          <p:nvPr/>
+        </p:nvCxnSpPr>
+        <p:spPr>
+          <a:xfrm>
+            <a:off x="2465614" y="2073727"/>
+            <a:ext cx="2093194" cy="516747"/>
+          </a:xfrm>
+          <a:prstGeom prst="bentConnector2">
+            <a:avLst/>
+          </a:prstGeom>
+          <a:ln>
+            <a:solidFill>
+              <a:schemeClr val="accent6"/>
+            </a:solidFill>
+            <a:tailEnd type="triangle"/>
+          </a:ln>
+          <a:effectLst/>
+        </p:spPr>
+        <p:style>
+          <a:lnRef idx="2">
+            <a:schemeClr val="accent1"/>
+          </a:lnRef>
+          <a:fillRef idx="0">
+            <a:schemeClr val="accent1"/>
+          </a:fillRef>
+          <a:effectRef idx="1">
+            <a:schemeClr val="accent1"/>
+          </a:effectRef>
+          <a:fontRef idx="minor">
+            <a:schemeClr val="tx1"/>
+          </a:fontRef>
+        </p:style>
+      </p:cxnSp>
+      <p:cxnSp>
+        <p:nvCxnSpPr>
+          <p:cNvPr id="71" name="Elbow Connector 70">
+            <a:extLst>
+              <a:ext uri="{FF2B5EF4-FFF2-40B4-BE49-F238E27FC236}">
+                <a16:creationId xmlns:a16="http://schemas.microsoft.com/office/drawing/2014/main" id="{9B3950A4-1025-DB48-B886-5945ADD35206}"/>
+              </a:ext>
+            </a:extLst>
+          </p:cNvPr>
+          <p:cNvCxnSpPr>
+            <a:cxnSpLocks/>
+            <a:stCxn id="45" idx="1"/>
+            <a:endCxn id="59" idx="4"/>
+          </p:cNvCxnSpPr>
+          <p:nvPr/>
+        </p:nvCxnSpPr>
+        <p:spPr>
+          <a:xfrm rot="10800000" flipV="1">
+            <a:off x="5157329" y="2100404"/>
+            <a:ext cx="1320870" cy="837862"/>
+          </a:xfrm>
+          <a:prstGeom prst="bentConnector3">
+            <a:avLst>
+              <a:gd name="adj1" fmla="val 50000"/>
+            </a:avLst>
+          </a:prstGeom>
+          <a:ln>
+            <a:solidFill>
+              <a:srgbClr val="7030A0"/>
+            </a:solidFill>
+            <a:tailEnd type="triangle"/>
+          </a:ln>
+          <a:effectLst/>
+        </p:spPr>
+        <p:style>
+          <a:lnRef idx="2">
+            <a:schemeClr val="accent1"/>
+          </a:lnRef>
+          <a:fillRef idx="0">
+            <a:schemeClr val="accent1"/>
+          </a:fillRef>
+          <a:effectRef idx="1">
+            <a:schemeClr val="accent1"/>
+          </a:effectRef>
+          <a:fontRef idx="minor">
+            <a:schemeClr val="tx1"/>
+          </a:fontRef>
+        </p:style>
+      </p:cxnSp>
+      <p:sp>
+        <p:nvSpPr>
+          <p:cNvPr id="45" name="Rounded Rectangle 44">
+            <a:extLst>
+              <a:ext uri="{FF2B5EF4-FFF2-40B4-BE49-F238E27FC236}">
+                <a16:creationId xmlns:a16="http://schemas.microsoft.com/office/drawing/2014/main" id="{F495E1A9-5EC6-5446-ACF5-3911A287BB83}"/>
+              </a:ext>
+            </a:extLst>
+          </p:cNvPr>
+          <p:cNvSpPr/>
+          <p:nvPr/>
+        </p:nvSpPr>
+        <p:spPr>
+          <a:xfrm>
+            <a:off x="6478199" y="1913633"/>
+            <a:ext cx="1749097" cy="373542"/>
+          </a:xfrm>
+          <a:prstGeom prst="roundRect">
+            <a:avLst>
+              <a:gd name="adj" fmla="val 9717"/>
+            </a:avLst>
+          </a:prstGeom>
+          <a:noFill/>
+          <a:ln w="12700">
+            <a:solidFill>
+              <a:schemeClr val="tx2">
+                <a:lumMod val="50000"/>
+              </a:schemeClr>
+            </a:solidFill>
+          </a:ln>
+          <a:effectLst/>
+        </p:spPr>
+        <p:style>
+          <a:lnRef idx="1">
+            <a:schemeClr val="dk1"/>
+          </a:lnRef>
+          <a:fillRef idx="2">
+            <a:schemeClr val="dk1"/>
+          </a:fillRef>
+          <a:effectRef idx="1">
+            <a:schemeClr val="dk1"/>
+          </a:effectRef>
+          <a:fontRef idx="minor">
+            <a:schemeClr val="dk1"/>
+          </a:fontRef>
+        </p:style>
+        <p:txBody>
+          <a:bodyPr rot="0" spcFirstLastPara="0" vertOverflow="overflow" horzOverflow="overflow" vert="horz" wrap="square" lIns="0" tIns="0" rIns="0" bIns="0" numCol="1" spcCol="0" rtlCol="0" fromWordArt="0" anchor="t" anchorCtr="0" forceAA="0" compatLnSpc="1">
+            <a:prstTxWarp prst="textNoShape">
+              <a:avLst/>
+            </a:prstTxWarp>
+            <a:noAutofit/>
+          </a:bodyPr>
+          <a:lstStyle/>
+          <a:p>
+            <a:r>
+              <a:rPr lang="en-US" sz="1200" baseline="0" dirty="0">
+                <a:solidFill>
+                  <a:schemeClr val="tx1"/>
+                </a:solidFill>
+                <a:latin typeface="IBM Plex Sans" panose="020B0503050203000203" pitchFamily="34" charset="77"/>
+                <a:cs typeface="Arial"/>
+              </a:rPr>
+              <a:t>Pandas DF</a:t>
+            </a:r>
+          </a:p>
+        </p:txBody>
+      </p:sp>
+      <p:pic>
+        <p:nvPicPr>
+          <p:cNvPr id="13" name="Picture 12">
+            <a:extLst>
+              <a:ext uri="{FF2B5EF4-FFF2-40B4-BE49-F238E27FC236}">
+                <a16:creationId xmlns:a16="http://schemas.microsoft.com/office/drawing/2014/main" id="{B81AAF60-BF23-E149-AC44-3DFB94494F2F}"/>
+              </a:ext>
+            </a:extLst>
+          </p:cNvPr>
+          <p:cNvPicPr>
+            <a:picLocks noChangeAspect="1"/>
+          </p:cNvPicPr>
+          <p:nvPr/>
+        </p:nvPicPr>
+        <p:blipFill>
+          <a:blip r:embed="rId3"/>
+          <a:stretch>
+            <a:fillRect/>
+          </a:stretch>
+        </p:blipFill>
+        <p:spPr>
+          <a:xfrm>
+            <a:off x="3492393" y="3041219"/>
+            <a:ext cx="638156" cy="680700"/>
+          </a:xfrm>
+          <a:prstGeom prst="rect">
+            <a:avLst/>
+          </a:prstGeom>
+        </p:spPr>
+      </p:pic>
+      <p:sp>
+        <p:nvSpPr>
+          <p:cNvPr id="59" name="Can 58">
+            <a:extLst>
+              <a:ext uri="{FF2B5EF4-FFF2-40B4-BE49-F238E27FC236}">
+                <a16:creationId xmlns:a16="http://schemas.microsoft.com/office/drawing/2014/main" id="{BF8D5F17-7886-6A49-A326-AB3283F367DA}"/>
+              </a:ext>
+            </a:extLst>
+          </p:cNvPr>
+          <p:cNvSpPr/>
+          <p:nvPr/>
+        </p:nvSpPr>
+        <p:spPr>
+          <a:xfrm>
+            <a:off x="3960287" y="2590474"/>
+            <a:ext cx="1197042" cy="695584"/>
+          </a:xfrm>
+          <a:prstGeom prst="can">
+            <a:avLst/>
+          </a:prstGeom>
+          <a:solidFill>
+            <a:schemeClr val="accent5">
+              <a:lumMod val="75000"/>
+            </a:schemeClr>
+          </a:solidFill>
+          <a:ln>
+            <a:noFill/>
+          </a:ln>
+        </p:spPr>
+        <p:style>
+          <a:lnRef idx="2">
+            <a:schemeClr val="accent1">
+              <a:shade val="50000"/>
+            </a:schemeClr>
+          </a:lnRef>
+          <a:fillRef idx="1">
+            <a:schemeClr val="accent1"/>
+          </a:fillRef>
+          <a:effectRef idx="0">
+            <a:schemeClr val="accent1"/>
+          </a:effectRef>
+          <a:fontRef idx="minor">
+            <a:schemeClr val="lt1"/>
+          </a:fontRef>
+        </p:style>
+        <p:txBody>
+          <a:bodyPr rtlCol="0" anchor="ctr"/>
+          <a:lstStyle/>
+          <a:p>
+            <a:pPr algn="ctr"/>
+            <a:r>
+              <a:rPr lang="en-US" sz="1000" dirty="0"/>
+              <a:t>Reefer telemetries</a:t>
+            </a:r>
+          </a:p>
+        </p:txBody>
+      </p:sp>
+    </p:spTree>
+    <p:extLst>
+      <p:ext uri="{BB962C8B-B14F-4D97-AF65-F5344CB8AC3E}">
+        <p14:creationId xmlns:p14="http://schemas.microsoft.com/office/powerpoint/2010/main" val="3696044975"/>
+      </p:ext>
+    </p:extLst>
+  </p:cSld>
+  <p:clrMapOvr>
+    <a:masterClrMapping/>
+  </p:clrMapOvr>
+</p:sld>
+</file>
+
+<file path=ppt/slides/slide6.xml><?xml version="1.0" encoding="utf-8"?>
+<p:sld xmlns:a="http://schemas.openxmlformats.org/drawingml/2006/main" xmlns:r="http://schemas.openxmlformats.org/officeDocument/2006/relationships" xmlns:p="http://schemas.openxmlformats.org/presentationml/2006/main">
+  <p:cSld>
+    <p:spTree>
+      <p:nvGrpSpPr>
+        <p:cNvPr id="1" name=""/>
+        <p:cNvGrpSpPr/>
+        <p:nvPr/>
+      </p:nvGrpSpPr>
+      <p:grpSpPr>
+        <a:xfrm>
+          <a:off x="0" y="0"/>
+          <a:ext cx="0" cy="0"/>
+          <a:chOff x="0" y="0"/>
+          <a:chExt cx="0" cy="0"/>
+        </a:xfrm>
+      </p:grpSpPr>
+      <p:sp>
+        <p:nvSpPr>
+          <p:cNvPr id="2" name="Title 1">
+            <a:extLst>
+              <a:ext uri="{FF2B5EF4-FFF2-40B4-BE49-F238E27FC236}">
+                <a16:creationId xmlns:a16="http://schemas.microsoft.com/office/drawing/2014/main" id="{83D72B5A-D2BF-0F41-AB02-0E3504265F76}"/>
+              </a:ext>
+            </a:extLst>
+          </p:cNvPr>
+          <p:cNvSpPr>
+            <a:spLocks noGrp="1"/>
+          </p:cNvSpPr>
+          <p:nvPr>
+            <p:ph type="title"/>
+          </p:nvPr>
+        </p:nvSpPr>
+        <p:spPr>
+          <a:xfrm>
+            <a:off x="288633" y="208582"/>
+            <a:ext cx="10515600" cy="521140"/>
+          </a:xfrm>
+        </p:spPr>
+        <p:txBody>
+          <a:bodyPr>
+            <a:normAutofit/>
+          </a:bodyPr>
+          <a:lstStyle/>
+          <a:p>
+            <a:r>
+              <a:rPr lang="en-US" sz="2400" dirty="0"/>
+              <a:t>Event Stream As Event Store for ML</a:t>
+            </a:r>
+          </a:p>
+        </p:txBody>
+      </p:sp>
+      <p:sp>
+        <p:nvSpPr>
+          <p:cNvPr id="4" name="Slide Number Placeholder 3">
+            <a:extLst>
+              <a:ext uri="{FF2B5EF4-FFF2-40B4-BE49-F238E27FC236}">
+                <a16:creationId xmlns:a16="http://schemas.microsoft.com/office/drawing/2014/main" id="{B1D66A27-027F-EA4A-B9BD-D02849496229}"/>
+              </a:ext>
+            </a:extLst>
+          </p:cNvPr>
+          <p:cNvSpPr>
+            <a:spLocks noGrp="1"/>
+          </p:cNvSpPr>
+          <p:nvPr>
+            <p:ph type="sldNum" sz="quarter" idx="12"/>
+          </p:nvPr>
+        </p:nvSpPr>
+        <p:spPr/>
+        <p:txBody>
+          <a:bodyPr/>
+          <a:lstStyle/>
+          <a:p>
+            <a:fld id="{C565C23E-6D76-459C-BC14-A9049E4EE889}" type="slidenum">
+              <a:rPr lang="en-US" smtClean="0"/>
+              <a:t>6</a:t>
+            </a:fld>
+            <a:endParaRPr lang="en-US"/>
+          </a:p>
+        </p:txBody>
+      </p:sp>
+      <p:sp>
+        <p:nvSpPr>
+          <p:cNvPr id="6" name="Rectangle 5">
+            <a:extLst>
+              <a:ext uri="{FF2B5EF4-FFF2-40B4-BE49-F238E27FC236}">
+                <a16:creationId xmlns:a16="http://schemas.microsoft.com/office/drawing/2014/main" id="{B53C0033-8D9E-604C-9B28-5FDD36C6C800}"/>
+              </a:ext>
+            </a:extLst>
+          </p:cNvPr>
+          <p:cNvSpPr/>
+          <p:nvPr/>
+        </p:nvSpPr>
+        <p:spPr>
+          <a:xfrm>
             <a:off x="6118016" y="1168380"/>
             <a:ext cx="3362160" cy="1973555"/>
           </a:xfrm>
@@ -17963,7 +18913,7 @@
           <a:lstStyle/>
           <a:p>
             <a:r>
-              <a:rPr lang="en-US" dirty="0" err="1">
+              <a:rPr lang="en-US" dirty="0">
                 <a:solidFill>
                   <a:schemeClr val="accent1">
                     <a:lumMod val="25000"/>
@@ -17972,13 +18922,6 @@
               </a:rPr>
               <a:t>reeferTelemetries</a:t>
             </a:r>
-            <a:endParaRPr lang="en-US" dirty="0">
-              <a:solidFill>
-                <a:schemeClr val="accent1">
-                  <a:lumMod val="25000"/>
-                </a:schemeClr>
-              </a:solidFill>
-            </a:endParaRPr>
           </a:p>
         </p:txBody>
       </p:sp>

</xml_diff>

<commit_message>
Deployed 5dd679f with MkDocs version: 1.0.4
</commit_message>
<xml_diff>
--- a/diagrams.pptx
+++ b/diagrams.pptx
@@ -277,7 +277,7 @@
               <a:pPr>
                 <a:defRPr/>
               </a:pPr>
-              <a:t>11/13/19</a:t>
+              <a:t>11/26/19</a:t>
             </a:fld>
             <a:endParaRPr lang="en-US" dirty="0"/>
           </a:p>
@@ -10453,7 +10453,7 @@
             <a:effectLst/>
             <a:extLst>
               <a:ext uri="{C572A759-6A51-4108-AA02-DFA0A04FC94B}">
-                <ma14:wrappingTextBoxFlag xmlns:ma14="http://schemas.microsoft.com/office/mac/drawingml/2011/main" xmlns="" val="1"/>
+                <ma14:wrappingTextBoxFlag xmlns="" xmlns:ma14="http://schemas.microsoft.com/office/mac/drawingml/2011/main" val="1"/>
               </a:ext>
             </a:extLst>
           </p:spPr>
@@ -12583,7 +12583,7 @@
             <a:effectLst/>
             <a:extLst>
               <a:ext uri="{C572A759-6A51-4108-AA02-DFA0A04FC94B}">
-                <ma14:wrappingTextBoxFlag xmlns:ma14="http://schemas.microsoft.com/office/mac/drawingml/2011/main" xmlns="" val="1"/>
+                <ma14:wrappingTextBoxFlag xmlns="" xmlns:ma14="http://schemas.microsoft.com/office/mac/drawingml/2011/main" val="1"/>
               </a:ext>
             </a:extLst>
           </p:spPr>
@@ -17561,7 +17561,7 @@
           <a:p>
             <a:r>
               <a:rPr lang="en-US" sz="2400" dirty="0"/>
-              <a:t>Event Stream As Event Store for ML</a:t>
+              <a:t>Event Stream to long term Event Store for ML</a:t>
             </a:r>
           </a:p>
         </p:txBody>
@@ -17647,7 +17647,7 @@
                   <a:schemeClr val="tx1"/>
                 </a:solidFill>
               </a:rPr>
-              <a:t>ML Environment</a:t>
+              <a:t>Machine Learning Environment</a:t>
             </a:r>
           </a:p>
         </p:txBody>
@@ -17737,6 +17737,16 @@
               <a:lumMod val="75000"/>
             </a:schemeClr>
           </a:solidFill>
+          <a:ln>
+            <a:noFill/>
+          </a:ln>
+          <a:effectLst>
+            <a:outerShdw blurRad="50800" dist="38100" dir="5400000" algn="t" rotWithShape="0">
+              <a:prstClr val="black">
+                <a:alpha val="40000"/>
+              </a:prstClr>
+            </a:outerShdw>
+          </a:effectLst>
         </p:spPr>
         <p:style>
           <a:lnRef idx="2">
@@ -17761,17 +17771,237 @@
             <a:pPr algn="ctr"/>
             <a:r>
               <a:rPr lang="en-US" sz="1400" dirty="0"/>
-              <a:t>Simulator</a:t>
+              <a:t>SimulatorTool</a:t>
+            </a:r>
+          </a:p>
+        </p:txBody>
+      </p:sp>
+      <p:cxnSp>
+        <p:nvCxnSpPr>
+          <p:cNvPr id="46" name="Elbow Connector 45">
+            <a:extLst>
+              <a:ext uri="{FF2B5EF4-FFF2-40B4-BE49-F238E27FC236}">
+                <a16:creationId xmlns:a16="http://schemas.microsoft.com/office/drawing/2014/main" id="{B815F1F6-8EC9-A547-951A-6A6BA26A1B3E}"/>
+              </a:ext>
+            </a:extLst>
+          </p:cNvPr>
+          <p:cNvCxnSpPr>
+            <a:cxnSpLocks/>
+            <a:stCxn id="9" idx="3"/>
+            <a:endCxn id="59" idx="1"/>
+          </p:cNvCxnSpPr>
+          <p:nvPr/>
+        </p:nvCxnSpPr>
+        <p:spPr>
+          <a:xfrm>
+            <a:off x="2465614" y="2073727"/>
+            <a:ext cx="2093194" cy="516747"/>
+          </a:xfrm>
+          <a:prstGeom prst="bentConnector2">
+            <a:avLst/>
+          </a:prstGeom>
+          <a:ln w="12700">
+            <a:solidFill>
+              <a:schemeClr val="accent6"/>
+            </a:solidFill>
+            <a:tailEnd type="triangle"/>
+          </a:ln>
+          <a:effectLst/>
+        </p:spPr>
+        <p:style>
+          <a:lnRef idx="2">
+            <a:schemeClr val="accent1"/>
+          </a:lnRef>
+          <a:fillRef idx="0">
+            <a:schemeClr val="accent1"/>
+          </a:fillRef>
+          <a:effectRef idx="1">
+            <a:schemeClr val="accent1"/>
+          </a:effectRef>
+          <a:fontRef idx="minor">
+            <a:schemeClr val="tx1"/>
+          </a:fontRef>
+        </p:style>
+      </p:cxnSp>
+      <p:cxnSp>
+        <p:nvCxnSpPr>
+          <p:cNvPr id="71" name="Elbow Connector 70">
+            <a:extLst>
+              <a:ext uri="{FF2B5EF4-FFF2-40B4-BE49-F238E27FC236}">
+                <a16:creationId xmlns:a16="http://schemas.microsoft.com/office/drawing/2014/main" id="{9B3950A4-1025-DB48-B886-5945ADD35206}"/>
+              </a:ext>
+            </a:extLst>
+          </p:cNvPr>
+          <p:cNvCxnSpPr>
+            <a:cxnSpLocks/>
+            <a:stCxn id="45" idx="1"/>
+            <a:endCxn id="59" idx="4"/>
+          </p:cNvCxnSpPr>
+          <p:nvPr/>
+        </p:nvCxnSpPr>
+        <p:spPr>
+          <a:xfrm rot="10800000" flipV="1">
+            <a:off x="5157329" y="2100404"/>
+            <a:ext cx="1320870" cy="837862"/>
+          </a:xfrm>
+          <a:prstGeom prst="bentConnector3">
+            <a:avLst>
+              <a:gd name="adj1" fmla="val 50000"/>
+            </a:avLst>
+          </a:prstGeom>
+          <a:ln w="12700">
+            <a:solidFill>
+              <a:srgbClr val="7030A0"/>
+            </a:solidFill>
+            <a:headEnd type="triangle"/>
+            <a:tailEnd type="none"/>
+          </a:ln>
+          <a:effectLst/>
+        </p:spPr>
+        <p:style>
+          <a:lnRef idx="2">
+            <a:schemeClr val="accent1"/>
+          </a:lnRef>
+          <a:fillRef idx="0">
+            <a:schemeClr val="accent1"/>
+          </a:fillRef>
+          <a:effectRef idx="1">
+            <a:schemeClr val="accent1"/>
+          </a:effectRef>
+          <a:fontRef idx="minor">
+            <a:schemeClr val="tx1"/>
+          </a:fontRef>
+        </p:style>
+      </p:cxnSp>
+      <p:sp>
+        <p:nvSpPr>
+          <p:cNvPr id="45" name="Rounded Rectangle 44">
+            <a:extLst>
+              <a:ext uri="{FF2B5EF4-FFF2-40B4-BE49-F238E27FC236}">
+                <a16:creationId xmlns:a16="http://schemas.microsoft.com/office/drawing/2014/main" id="{F495E1A9-5EC6-5446-ACF5-3911A287BB83}"/>
+              </a:ext>
+            </a:extLst>
+          </p:cNvPr>
+          <p:cNvSpPr/>
+          <p:nvPr/>
+        </p:nvSpPr>
+        <p:spPr>
+          <a:xfrm>
+            <a:off x="6478199" y="1913633"/>
+            <a:ext cx="1749097" cy="373542"/>
+          </a:xfrm>
+          <a:prstGeom prst="roundRect">
+            <a:avLst>
+              <a:gd name="adj" fmla="val 9717"/>
+            </a:avLst>
+          </a:prstGeom>
+          <a:noFill/>
+          <a:ln w="12700">
+            <a:solidFill>
+              <a:schemeClr val="tx2">
+                <a:lumMod val="50000"/>
+              </a:schemeClr>
+            </a:solidFill>
+          </a:ln>
+          <a:effectLst/>
+        </p:spPr>
+        <p:style>
+          <a:lnRef idx="1">
+            <a:schemeClr val="dk1"/>
+          </a:lnRef>
+          <a:fillRef idx="2">
+            <a:schemeClr val="dk1"/>
+          </a:fillRef>
+          <a:effectRef idx="1">
+            <a:schemeClr val="dk1"/>
+          </a:effectRef>
+          <a:fontRef idx="minor">
+            <a:schemeClr val="dk1"/>
+          </a:fontRef>
+        </p:style>
+        <p:txBody>
+          <a:bodyPr rot="0" spcFirstLastPara="0" vertOverflow="overflow" horzOverflow="overflow" vert="horz" wrap="square" lIns="0" tIns="0" rIns="0" bIns="0" numCol="1" spcCol="0" rtlCol="0" fromWordArt="0" anchor="t" anchorCtr="0" forceAA="0" compatLnSpc="1">
+            <a:prstTxWarp prst="textNoShape">
+              <a:avLst/>
+            </a:prstTxWarp>
+            <a:noAutofit/>
+          </a:bodyPr>
+          <a:lstStyle/>
+          <a:p>
+            <a:r>
+              <a:rPr lang="en-US" sz="1200" baseline="0" dirty="0">
+                <a:solidFill>
+                  <a:schemeClr val="tx1"/>
+                </a:solidFill>
+                <a:latin typeface="IBM Plex Sans" panose="020B0503050203000203" pitchFamily="34" charset="77"/>
+                <a:cs typeface="Arial"/>
+              </a:rPr>
+              <a:t>Pandas DF</a:t>
+            </a:r>
+          </a:p>
+        </p:txBody>
+      </p:sp>
+      <p:sp>
+        <p:nvSpPr>
+          <p:cNvPr id="59" name="Can 58">
+            <a:extLst>
+              <a:ext uri="{FF2B5EF4-FFF2-40B4-BE49-F238E27FC236}">
+                <a16:creationId xmlns:a16="http://schemas.microsoft.com/office/drawing/2014/main" id="{BF8D5F17-7886-6A49-A326-AB3283F367DA}"/>
+              </a:ext>
+            </a:extLst>
+          </p:cNvPr>
+          <p:cNvSpPr/>
+          <p:nvPr/>
+        </p:nvSpPr>
+        <p:spPr>
+          <a:xfrm>
+            <a:off x="3960287" y="2590474"/>
+            <a:ext cx="1197042" cy="695584"/>
+          </a:xfrm>
+          <a:prstGeom prst="can">
+            <a:avLst/>
+          </a:prstGeom>
+          <a:solidFill>
+            <a:srgbClr val="009643"/>
+          </a:solidFill>
+          <a:ln>
+            <a:noFill/>
+          </a:ln>
+        </p:spPr>
+        <p:style>
+          <a:lnRef idx="2">
+            <a:schemeClr val="accent1">
+              <a:shade val="50000"/>
+            </a:schemeClr>
+          </a:lnRef>
+          <a:fillRef idx="1">
+            <a:schemeClr val="accent1"/>
+          </a:fillRef>
+          <a:effectRef idx="0">
+            <a:schemeClr val="accent1"/>
+          </a:effectRef>
+          <a:fontRef idx="minor">
+            <a:schemeClr val="lt1"/>
+          </a:fontRef>
+        </p:style>
+        <p:txBody>
+          <a:bodyPr rtlCol="0" anchor="ctr"/>
+          <a:lstStyle/>
+          <a:p>
+            <a:pPr algn="ctr"/>
+            <a:r>
+              <a:rPr lang="en-US" sz="1000" dirty="0"/>
+              <a:t>Reefer telemetries</a:t>
             </a:r>
           </a:p>
         </p:txBody>
       </p:sp>
       <p:pic>
         <p:nvPicPr>
-          <p:cNvPr id="25" name="Picture 40">
+          <p:cNvPr id="3" name="Picture 2">
             <a:extLst>
               <a:ext uri="{FF2B5EF4-FFF2-40B4-BE49-F238E27FC236}">
-                <a16:creationId xmlns:a16="http://schemas.microsoft.com/office/drawing/2014/main" id="{6CF0C2DA-CD62-0F4A-B6D7-15B98EF785FA}"/>
+                <a16:creationId xmlns:a16="http://schemas.microsoft.com/office/drawing/2014/main" id="{528193D1-A620-354F-B6D2-B217C3C404BA}"/>
               </a:ext>
             </a:extLst>
           </p:cNvPr>
@@ -17781,7 +18011,780 @@
           <p:nvPr/>
         </p:nvPicPr>
         <p:blipFill>
-          <a:blip r:embed="rId2">
+          <a:blip r:embed="rId2"/>
+          <a:stretch>
+            <a:fillRect/>
+          </a:stretch>
+        </p:blipFill>
+        <p:spPr>
+          <a:xfrm>
+            <a:off x="3707408" y="2785869"/>
+            <a:ext cx="296333" cy="643355"/>
+          </a:xfrm>
+          <a:prstGeom prst="rect">
+            <a:avLst/>
+          </a:prstGeom>
+        </p:spPr>
+      </p:pic>
+      <p:sp>
+        <p:nvSpPr>
+          <p:cNvPr id="14" name="Rectangle 13">
+            <a:extLst>
+              <a:ext uri="{FF2B5EF4-FFF2-40B4-BE49-F238E27FC236}">
+                <a16:creationId xmlns:a16="http://schemas.microsoft.com/office/drawing/2014/main" id="{FF73E72E-4933-814D-B024-C5BBC14F304D}"/>
+              </a:ext>
+            </a:extLst>
+          </p:cNvPr>
+          <p:cNvSpPr/>
+          <p:nvPr/>
+        </p:nvSpPr>
+        <p:spPr>
+          <a:xfrm>
+            <a:off x="523723" y="3653298"/>
+            <a:ext cx="2008413" cy="1655634"/>
+          </a:xfrm>
+          <a:prstGeom prst="rect">
+            <a:avLst/>
+          </a:prstGeom>
+          <a:noFill/>
+          <a:ln>
+            <a:solidFill>
+              <a:schemeClr val="accent3"/>
+            </a:solidFill>
+            <a:prstDash val="dash"/>
+          </a:ln>
+        </p:spPr>
+        <p:style>
+          <a:lnRef idx="2">
+            <a:schemeClr val="accent1">
+              <a:shade val="50000"/>
+            </a:schemeClr>
+          </a:lnRef>
+          <a:fillRef idx="1">
+            <a:schemeClr val="accent1"/>
+          </a:fillRef>
+          <a:effectRef idx="0">
+            <a:schemeClr val="accent1"/>
+          </a:effectRef>
+          <a:fontRef idx="minor">
+            <a:schemeClr val="lt1"/>
+          </a:fontRef>
+        </p:style>
+        <p:txBody>
+          <a:bodyPr rtlCol="0" anchor="b"/>
+          <a:lstStyle/>
+          <a:p>
+            <a:pPr algn="ctr"/>
+            <a:r>
+              <a:rPr lang="en-US" sz="1200" dirty="0">
+                <a:solidFill>
+                  <a:schemeClr val="tx1"/>
+                </a:solidFill>
+              </a:rPr>
+              <a:t>Python</a:t>
+            </a:r>
+          </a:p>
+        </p:txBody>
+      </p:sp>
+      <p:sp>
+        <p:nvSpPr>
+          <p:cNvPr id="15" name="Rectangle 14">
+            <a:extLst>
+              <a:ext uri="{FF2B5EF4-FFF2-40B4-BE49-F238E27FC236}">
+                <a16:creationId xmlns:a16="http://schemas.microsoft.com/office/drawing/2014/main" id="{8990AB5A-91EB-9947-B9EF-04353E549FFC}"/>
+              </a:ext>
+            </a:extLst>
+          </p:cNvPr>
+          <p:cNvSpPr/>
+          <p:nvPr/>
+        </p:nvSpPr>
+        <p:spPr>
+          <a:xfrm>
+            <a:off x="643465" y="3987193"/>
+            <a:ext cx="1703614" cy="914400"/>
+          </a:xfrm>
+          <a:prstGeom prst="rect">
+            <a:avLst/>
+          </a:prstGeom>
+          <a:solidFill>
+            <a:schemeClr val="accent5">
+              <a:lumMod val="75000"/>
+            </a:schemeClr>
+          </a:solidFill>
+          <a:ln>
+            <a:noFill/>
+          </a:ln>
+          <a:effectLst>
+            <a:outerShdw blurRad="50800" dist="38100" dir="5400000" algn="t" rotWithShape="0">
+              <a:prstClr val="black">
+                <a:alpha val="40000"/>
+              </a:prstClr>
+            </a:outerShdw>
+          </a:effectLst>
+        </p:spPr>
+        <p:style>
+          <a:lnRef idx="2">
+            <a:schemeClr val="accent1">
+              <a:shade val="50000"/>
+            </a:schemeClr>
+          </a:lnRef>
+          <a:fillRef idx="1">
+            <a:schemeClr val="accent1"/>
+          </a:fillRef>
+          <a:effectRef idx="0">
+            <a:schemeClr val="accent1"/>
+          </a:effectRef>
+          <a:fontRef idx="minor">
+            <a:schemeClr val="lt1"/>
+          </a:fontRef>
+        </p:style>
+        <p:txBody>
+          <a:bodyPr rtlCol="0" anchor="ctr"/>
+          <a:lstStyle/>
+          <a:p>
+            <a:pPr algn="ctr"/>
+            <a:r>
+              <a:rPr lang="en-US" sz="1400" dirty="0"/>
+              <a:t>SimulatorApp</a:t>
+            </a:r>
+          </a:p>
+        </p:txBody>
+      </p:sp>
+      <p:sp>
+        <p:nvSpPr>
+          <p:cNvPr id="16" name="Rounded Rectangle 15">
+            <a:extLst>
+              <a:ext uri="{FF2B5EF4-FFF2-40B4-BE49-F238E27FC236}">
+                <a16:creationId xmlns:a16="http://schemas.microsoft.com/office/drawing/2014/main" id="{604B1EAE-7B06-B644-84B2-A465850BFF11}"/>
+              </a:ext>
+            </a:extLst>
+          </p:cNvPr>
+          <p:cNvSpPr/>
+          <p:nvPr/>
+        </p:nvSpPr>
+        <p:spPr bwMode="auto">
+          <a:xfrm>
+            <a:off x="3749127" y="4437992"/>
+            <a:ext cx="245561" cy="731512"/>
+          </a:xfrm>
+          <a:prstGeom prst="roundRect">
+            <a:avLst/>
+          </a:prstGeom>
+          <a:solidFill>
+            <a:schemeClr val="bg2"/>
+          </a:solidFill>
+          <a:ln>
+            <a:solidFill>
+              <a:schemeClr val="bg1"/>
+            </a:solidFill>
+            <a:prstDash val="solid"/>
+            <a:headEnd type="none" w="med" len="med"/>
+            <a:tailEnd type="none" w="med" len="med"/>
+          </a:ln>
+          <a:effectLst/>
+        </p:spPr>
+        <p:style>
+          <a:lnRef idx="1">
+            <a:schemeClr val="accent5"/>
+          </a:lnRef>
+          <a:fillRef idx="3">
+            <a:schemeClr val="accent5"/>
+          </a:fillRef>
+          <a:effectRef idx="2">
+            <a:schemeClr val="accent5"/>
+          </a:effectRef>
+          <a:fontRef idx="minor">
+            <a:schemeClr val="lt1"/>
+          </a:fontRef>
+        </p:style>
+        <p:txBody>
+          <a:bodyPr vert="horz" wrap="square" lIns="0" tIns="0" rIns="0" bIns="0" numCol="1" rtlCol="0" anchor="ctr" anchorCtr="0" compatLnSpc="1">
+            <a:prstTxWarp prst="textNoShape">
+              <a:avLst/>
+            </a:prstTxWarp>
+            <a:noAutofit/>
+          </a:bodyPr>
+          <a:lstStyle/>
+          <a:p>
+            <a:pPr algn="ctr" defTabSz="1219170" fontAlgn="base">
+              <a:lnSpc>
+                <a:spcPct val="90000"/>
+              </a:lnSpc>
+              <a:spcBef>
+                <a:spcPct val="0"/>
+              </a:spcBef>
+              <a:spcAft>
+                <a:spcPct val="0"/>
+              </a:spcAft>
+            </a:pPr>
+            <a:r>
+              <a:rPr lang="en-US" sz="1200" dirty="0">
+                <a:solidFill>
+                  <a:schemeClr val="bg1"/>
+                </a:solidFill>
+              </a:rPr>
+              <a:t>0</a:t>
+            </a:r>
+            <a:endParaRPr lang="en-US" sz="667" dirty="0">
+              <a:solidFill>
+                <a:schemeClr val="bg1"/>
+              </a:solidFill>
+            </a:endParaRPr>
+          </a:p>
+        </p:txBody>
+      </p:sp>
+      <p:sp>
+        <p:nvSpPr>
+          <p:cNvPr id="17" name="Rounded Rectangle 16">
+            <a:extLst>
+              <a:ext uri="{FF2B5EF4-FFF2-40B4-BE49-F238E27FC236}">
+                <a16:creationId xmlns:a16="http://schemas.microsoft.com/office/drawing/2014/main" id="{BF94AF6A-6ED9-F648-AF73-AD2F2BF0087D}"/>
+              </a:ext>
+            </a:extLst>
+          </p:cNvPr>
+          <p:cNvSpPr/>
+          <p:nvPr/>
+        </p:nvSpPr>
+        <p:spPr bwMode="auto">
+          <a:xfrm>
+            <a:off x="3992964" y="4437992"/>
+            <a:ext cx="245561" cy="731512"/>
+          </a:xfrm>
+          <a:prstGeom prst="roundRect">
+            <a:avLst/>
+          </a:prstGeom>
+          <a:solidFill>
+            <a:schemeClr val="bg2"/>
+          </a:solidFill>
+          <a:ln>
+            <a:solidFill>
+              <a:schemeClr val="bg1"/>
+            </a:solidFill>
+            <a:prstDash val="solid"/>
+            <a:headEnd type="none" w="med" len="med"/>
+            <a:tailEnd type="none" w="med" len="med"/>
+          </a:ln>
+          <a:effectLst/>
+        </p:spPr>
+        <p:style>
+          <a:lnRef idx="1">
+            <a:schemeClr val="accent5"/>
+          </a:lnRef>
+          <a:fillRef idx="3">
+            <a:schemeClr val="accent5"/>
+          </a:fillRef>
+          <a:effectRef idx="2">
+            <a:schemeClr val="accent5"/>
+          </a:effectRef>
+          <a:fontRef idx="minor">
+            <a:schemeClr val="lt1"/>
+          </a:fontRef>
+        </p:style>
+        <p:txBody>
+          <a:bodyPr vert="horz" wrap="square" lIns="0" tIns="0" rIns="0" bIns="0" numCol="1" rtlCol="0" anchor="ctr" anchorCtr="0" compatLnSpc="1">
+            <a:prstTxWarp prst="textNoShape">
+              <a:avLst/>
+            </a:prstTxWarp>
+            <a:noAutofit/>
+          </a:bodyPr>
+          <a:lstStyle/>
+          <a:p>
+            <a:pPr algn="ctr" defTabSz="1219170" fontAlgn="base">
+              <a:lnSpc>
+                <a:spcPct val="90000"/>
+              </a:lnSpc>
+              <a:spcBef>
+                <a:spcPct val="0"/>
+              </a:spcBef>
+              <a:spcAft>
+                <a:spcPct val="0"/>
+              </a:spcAft>
+            </a:pPr>
+            <a:r>
+              <a:rPr lang="en-US" sz="1200" dirty="0">
+                <a:solidFill>
+                  <a:schemeClr val="bg1"/>
+                </a:solidFill>
+              </a:rPr>
+              <a:t>1</a:t>
+            </a:r>
+            <a:endParaRPr lang="en-US" sz="667" dirty="0">
+              <a:solidFill>
+                <a:schemeClr val="bg1"/>
+              </a:solidFill>
+            </a:endParaRPr>
+          </a:p>
+        </p:txBody>
+      </p:sp>
+      <p:sp>
+        <p:nvSpPr>
+          <p:cNvPr id="18" name="Rounded Rectangle 17">
+            <a:extLst>
+              <a:ext uri="{FF2B5EF4-FFF2-40B4-BE49-F238E27FC236}">
+                <a16:creationId xmlns:a16="http://schemas.microsoft.com/office/drawing/2014/main" id="{574D615E-85EA-C844-A2A9-FE6056949B8A}"/>
+              </a:ext>
+            </a:extLst>
+          </p:cNvPr>
+          <p:cNvSpPr/>
+          <p:nvPr/>
+        </p:nvSpPr>
+        <p:spPr bwMode="auto">
+          <a:xfrm>
+            <a:off x="4238526" y="4437992"/>
+            <a:ext cx="245561" cy="731512"/>
+          </a:xfrm>
+          <a:prstGeom prst="roundRect">
+            <a:avLst/>
+          </a:prstGeom>
+          <a:solidFill>
+            <a:schemeClr val="bg2"/>
+          </a:solidFill>
+          <a:ln>
+            <a:solidFill>
+              <a:schemeClr val="bg1"/>
+            </a:solidFill>
+            <a:prstDash val="solid"/>
+            <a:headEnd type="none" w="med" len="med"/>
+            <a:tailEnd type="none" w="med" len="med"/>
+          </a:ln>
+          <a:effectLst/>
+        </p:spPr>
+        <p:style>
+          <a:lnRef idx="1">
+            <a:schemeClr val="accent5"/>
+          </a:lnRef>
+          <a:fillRef idx="3">
+            <a:schemeClr val="accent5"/>
+          </a:fillRef>
+          <a:effectRef idx="2">
+            <a:schemeClr val="accent5"/>
+          </a:effectRef>
+          <a:fontRef idx="minor">
+            <a:schemeClr val="lt1"/>
+          </a:fontRef>
+        </p:style>
+        <p:txBody>
+          <a:bodyPr vert="horz" wrap="square" lIns="0" tIns="0" rIns="0" bIns="0" numCol="1" rtlCol="0" anchor="ctr" anchorCtr="0" compatLnSpc="1">
+            <a:prstTxWarp prst="textNoShape">
+              <a:avLst/>
+            </a:prstTxWarp>
+            <a:noAutofit/>
+          </a:bodyPr>
+          <a:lstStyle/>
+          <a:p>
+            <a:pPr algn="ctr" defTabSz="1219170" fontAlgn="base">
+              <a:lnSpc>
+                <a:spcPct val="90000"/>
+              </a:lnSpc>
+              <a:spcBef>
+                <a:spcPct val="0"/>
+              </a:spcBef>
+              <a:spcAft>
+                <a:spcPct val="0"/>
+              </a:spcAft>
+            </a:pPr>
+            <a:r>
+              <a:rPr lang="en-US" sz="1200" dirty="0">
+                <a:solidFill>
+                  <a:schemeClr val="bg1"/>
+                </a:solidFill>
+              </a:rPr>
+              <a:t>2</a:t>
+            </a:r>
+            <a:endParaRPr lang="en-US" sz="667" dirty="0">
+              <a:solidFill>
+                <a:schemeClr val="bg1"/>
+              </a:solidFill>
+            </a:endParaRPr>
+          </a:p>
+        </p:txBody>
+      </p:sp>
+      <p:sp>
+        <p:nvSpPr>
+          <p:cNvPr id="19" name="Rounded Rectangle 18">
+            <a:extLst>
+              <a:ext uri="{FF2B5EF4-FFF2-40B4-BE49-F238E27FC236}">
+                <a16:creationId xmlns:a16="http://schemas.microsoft.com/office/drawing/2014/main" id="{C7A32DE1-AA62-0542-95A5-93C4C6EFD0D3}"/>
+              </a:ext>
+            </a:extLst>
+          </p:cNvPr>
+          <p:cNvSpPr/>
+          <p:nvPr/>
+        </p:nvSpPr>
+        <p:spPr bwMode="auto">
+          <a:xfrm>
+            <a:off x="4482363" y="4437992"/>
+            <a:ext cx="245561" cy="731512"/>
+          </a:xfrm>
+          <a:prstGeom prst="roundRect">
+            <a:avLst/>
+          </a:prstGeom>
+          <a:solidFill>
+            <a:schemeClr val="bg2"/>
+          </a:solidFill>
+          <a:ln>
+            <a:solidFill>
+              <a:schemeClr val="bg1"/>
+            </a:solidFill>
+            <a:prstDash val="solid"/>
+            <a:headEnd type="none" w="med" len="med"/>
+            <a:tailEnd type="none" w="med" len="med"/>
+          </a:ln>
+          <a:effectLst/>
+        </p:spPr>
+        <p:style>
+          <a:lnRef idx="1">
+            <a:schemeClr val="accent5"/>
+          </a:lnRef>
+          <a:fillRef idx="3">
+            <a:schemeClr val="accent5"/>
+          </a:fillRef>
+          <a:effectRef idx="2">
+            <a:schemeClr val="accent5"/>
+          </a:effectRef>
+          <a:fontRef idx="minor">
+            <a:schemeClr val="lt1"/>
+          </a:fontRef>
+        </p:style>
+        <p:txBody>
+          <a:bodyPr vert="horz" wrap="square" lIns="0" tIns="0" rIns="0" bIns="0" numCol="1" rtlCol="0" anchor="ctr" anchorCtr="0" compatLnSpc="1">
+            <a:prstTxWarp prst="textNoShape">
+              <a:avLst/>
+            </a:prstTxWarp>
+            <a:noAutofit/>
+          </a:bodyPr>
+          <a:lstStyle/>
+          <a:p>
+            <a:pPr algn="ctr" defTabSz="1219170" fontAlgn="base">
+              <a:lnSpc>
+                <a:spcPct val="90000"/>
+              </a:lnSpc>
+              <a:spcBef>
+                <a:spcPct val="0"/>
+              </a:spcBef>
+              <a:spcAft>
+                <a:spcPct val="0"/>
+              </a:spcAft>
+            </a:pPr>
+            <a:r>
+              <a:rPr lang="en-US" sz="1200" dirty="0">
+                <a:solidFill>
+                  <a:schemeClr val="bg1"/>
+                </a:solidFill>
+              </a:rPr>
+              <a:t>3</a:t>
+            </a:r>
+            <a:endParaRPr lang="en-US" sz="667" dirty="0">
+              <a:solidFill>
+                <a:schemeClr val="bg1"/>
+              </a:solidFill>
+            </a:endParaRPr>
+          </a:p>
+        </p:txBody>
+      </p:sp>
+      <p:sp>
+        <p:nvSpPr>
+          <p:cNvPr id="20" name="Rounded Rectangle 19">
+            <a:extLst>
+              <a:ext uri="{FF2B5EF4-FFF2-40B4-BE49-F238E27FC236}">
+                <a16:creationId xmlns:a16="http://schemas.microsoft.com/office/drawing/2014/main" id="{65250C98-3EF7-D84C-9241-0ACC98F9DB15}"/>
+              </a:ext>
+            </a:extLst>
+          </p:cNvPr>
+          <p:cNvSpPr/>
+          <p:nvPr/>
+        </p:nvSpPr>
+        <p:spPr bwMode="auto">
+          <a:xfrm>
+            <a:off x="4727924" y="4437992"/>
+            <a:ext cx="245561" cy="731512"/>
+          </a:xfrm>
+          <a:prstGeom prst="roundRect">
+            <a:avLst/>
+          </a:prstGeom>
+          <a:solidFill>
+            <a:schemeClr val="bg2"/>
+          </a:solidFill>
+          <a:ln>
+            <a:solidFill>
+              <a:schemeClr val="bg1"/>
+            </a:solidFill>
+            <a:prstDash val="solid"/>
+            <a:headEnd type="none" w="med" len="med"/>
+            <a:tailEnd type="none" w="med" len="med"/>
+          </a:ln>
+          <a:effectLst/>
+        </p:spPr>
+        <p:style>
+          <a:lnRef idx="1">
+            <a:schemeClr val="accent5"/>
+          </a:lnRef>
+          <a:fillRef idx="3">
+            <a:schemeClr val="accent5"/>
+          </a:fillRef>
+          <a:effectRef idx="2">
+            <a:schemeClr val="accent5"/>
+          </a:effectRef>
+          <a:fontRef idx="minor">
+            <a:schemeClr val="lt1"/>
+          </a:fontRef>
+        </p:style>
+        <p:txBody>
+          <a:bodyPr vert="horz" wrap="square" lIns="0" tIns="0" rIns="0" bIns="0" numCol="1" rtlCol="0" anchor="ctr" anchorCtr="0" compatLnSpc="1">
+            <a:prstTxWarp prst="textNoShape">
+              <a:avLst/>
+            </a:prstTxWarp>
+            <a:noAutofit/>
+          </a:bodyPr>
+          <a:lstStyle/>
+          <a:p>
+            <a:pPr algn="ctr" defTabSz="1219170" fontAlgn="base">
+              <a:lnSpc>
+                <a:spcPct val="90000"/>
+              </a:lnSpc>
+              <a:spcBef>
+                <a:spcPct val="0"/>
+              </a:spcBef>
+              <a:spcAft>
+                <a:spcPct val="0"/>
+              </a:spcAft>
+            </a:pPr>
+            <a:r>
+              <a:rPr lang="en-US" sz="1200" dirty="0">
+                <a:solidFill>
+                  <a:schemeClr val="bg1"/>
+                </a:solidFill>
+              </a:rPr>
+              <a:t>4</a:t>
+            </a:r>
+            <a:endParaRPr lang="en-US" sz="667" dirty="0">
+              <a:solidFill>
+                <a:schemeClr val="bg1"/>
+              </a:solidFill>
+            </a:endParaRPr>
+          </a:p>
+        </p:txBody>
+      </p:sp>
+      <p:sp>
+        <p:nvSpPr>
+          <p:cNvPr id="21" name="Rounded Rectangle 20">
+            <a:extLst>
+              <a:ext uri="{FF2B5EF4-FFF2-40B4-BE49-F238E27FC236}">
+                <a16:creationId xmlns:a16="http://schemas.microsoft.com/office/drawing/2014/main" id="{349815D9-A544-C740-A98E-A4307CE7F984}"/>
+              </a:ext>
+            </a:extLst>
+          </p:cNvPr>
+          <p:cNvSpPr/>
+          <p:nvPr/>
+        </p:nvSpPr>
+        <p:spPr bwMode="auto">
+          <a:xfrm>
+            <a:off x="4958720" y="4437992"/>
+            <a:ext cx="245561" cy="731512"/>
+          </a:xfrm>
+          <a:prstGeom prst="roundRect">
+            <a:avLst/>
+          </a:prstGeom>
+          <a:solidFill>
+            <a:schemeClr val="bg2"/>
+          </a:solidFill>
+          <a:ln>
+            <a:solidFill>
+              <a:schemeClr val="bg1"/>
+            </a:solidFill>
+            <a:prstDash val="solid"/>
+            <a:headEnd type="none" w="med" len="med"/>
+            <a:tailEnd type="none" w="med" len="med"/>
+          </a:ln>
+          <a:effectLst/>
+        </p:spPr>
+        <p:style>
+          <a:lnRef idx="1">
+            <a:schemeClr val="accent5"/>
+          </a:lnRef>
+          <a:fillRef idx="3">
+            <a:schemeClr val="accent5"/>
+          </a:fillRef>
+          <a:effectRef idx="2">
+            <a:schemeClr val="accent5"/>
+          </a:effectRef>
+          <a:fontRef idx="minor">
+            <a:schemeClr val="lt1"/>
+          </a:fontRef>
+        </p:style>
+        <p:txBody>
+          <a:bodyPr vert="horz" wrap="square" lIns="0" tIns="0" rIns="0" bIns="0" numCol="1" rtlCol="0" anchor="ctr" anchorCtr="0" compatLnSpc="1">
+            <a:prstTxWarp prst="textNoShape">
+              <a:avLst/>
+            </a:prstTxWarp>
+            <a:noAutofit/>
+          </a:bodyPr>
+          <a:lstStyle/>
+          <a:p>
+            <a:pPr algn="ctr" defTabSz="1219170" fontAlgn="base">
+              <a:lnSpc>
+                <a:spcPct val="90000"/>
+              </a:lnSpc>
+              <a:spcBef>
+                <a:spcPct val="0"/>
+              </a:spcBef>
+              <a:spcAft>
+                <a:spcPct val="0"/>
+              </a:spcAft>
+            </a:pPr>
+            <a:r>
+              <a:rPr lang="en-US" sz="1200" dirty="0">
+                <a:solidFill>
+                  <a:schemeClr val="bg1"/>
+                </a:solidFill>
+              </a:rPr>
+              <a:t>5</a:t>
+            </a:r>
+            <a:endParaRPr lang="en-US" sz="667" dirty="0">
+              <a:solidFill>
+                <a:schemeClr val="bg1"/>
+              </a:solidFill>
+            </a:endParaRPr>
+          </a:p>
+        </p:txBody>
+      </p:sp>
+      <p:sp>
+        <p:nvSpPr>
+          <p:cNvPr id="22" name="AutoShape 4">
+            <a:extLst>
+              <a:ext uri="{FF2B5EF4-FFF2-40B4-BE49-F238E27FC236}">
+                <a16:creationId xmlns:a16="http://schemas.microsoft.com/office/drawing/2014/main" id="{D20B6BF8-2A57-924F-AB42-129B1DC6DBE6}"/>
+              </a:ext>
+            </a:extLst>
+          </p:cNvPr>
+          <p:cNvSpPr>
+            <a:spLocks noChangeArrowheads="1"/>
+          </p:cNvSpPr>
+          <p:nvPr/>
+        </p:nvSpPr>
+        <p:spPr bwMode="auto">
+          <a:xfrm>
+            <a:off x="2881464" y="4145695"/>
+            <a:ext cx="3513917" cy="1348479"/>
+          </a:xfrm>
+          <a:prstGeom prst="roundRect">
+            <a:avLst>
+              <a:gd name="adj" fmla="val 7117"/>
+            </a:avLst>
+          </a:prstGeom>
+          <a:noFill/>
+          <a:ln w="12700">
+            <a:solidFill>
+              <a:schemeClr val="accent3"/>
+            </a:solidFill>
+            <a:prstDash val="dash"/>
+            <a:round/>
+            <a:headEnd/>
+            <a:tailEnd/>
+          </a:ln>
+        </p:spPr>
+        <p:txBody>
+          <a:bodyPr lIns="0" tIns="0" rIns="0" bIns="0" anchor="b" anchorCtr="1"/>
+          <a:lstStyle/>
+          <a:p>
+            <a:pPr algn="ctr"/>
+            <a:endParaRPr lang="en-US" sz="1333" dirty="0"/>
+          </a:p>
+        </p:txBody>
+      </p:sp>
+      <p:sp>
+        <p:nvSpPr>
+          <p:cNvPr id="23" name="TextBox 22">
+            <a:extLst>
+              <a:ext uri="{FF2B5EF4-FFF2-40B4-BE49-F238E27FC236}">
+                <a16:creationId xmlns:a16="http://schemas.microsoft.com/office/drawing/2014/main" id="{87606592-A07A-924B-B639-76FB8A14520F}"/>
+              </a:ext>
+            </a:extLst>
+          </p:cNvPr>
+          <p:cNvSpPr txBox="1"/>
+          <p:nvPr/>
+        </p:nvSpPr>
+        <p:spPr>
+          <a:xfrm>
+            <a:off x="3682530" y="5209508"/>
+            <a:ext cx="1369862" cy="276999"/>
+          </a:xfrm>
+          <a:prstGeom prst="rect">
+            <a:avLst/>
+          </a:prstGeom>
+          <a:noFill/>
+        </p:spPr>
+        <p:txBody>
+          <a:bodyPr wrap="none" rtlCol="0">
+            <a:spAutoFit/>
+          </a:bodyPr>
+          <a:lstStyle/>
+          <a:p>
+            <a:r>
+              <a:rPr lang="en-US" sz="1200" dirty="0">
+                <a:solidFill>
+                  <a:schemeClr val="accent1">
+                    <a:lumMod val="25000"/>
+                  </a:schemeClr>
+                </a:solidFill>
+              </a:rPr>
+              <a:t>reeferTelemetries</a:t>
+            </a:r>
+          </a:p>
+        </p:txBody>
+      </p:sp>
+      <p:pic>
+        <p:nvPicPr>
+          <p:cNvPr id="24" name="Picture 23">
+            <a:extLst>
+              <a:ext uri="{FF2B5EF4-FFF2-40B4-BE49-F238E27FC236}">
+                <a16:creationId xmlns:a16="http://schemas.microsoft.com/office/drawing/2014/main" id="{B400E287-8B40-BE4C-B680-D40ED448B4E5}"/>
+              </a:ext>
+            </a:extLst>
+          </p:cNvPr>
+          <p:cNvPicPr>
+            <a:picLocks noChangeAspect="1"/>
+          </p:cNvPicPr>
+          <p:nvPr/>
+        </p:nvPicPr>
+        <p:blipFill>
+          <a:blip r:embed="rId3">
+            <a:extLst>
+              <a:ext uri="{28A0092B-C50C-407E-A947-70E740481C1C}">
+                <a14:useLocalDpi xmlns:a14="http://schemas.microsoft.com/office/drawing/2010/main" val="0"/>
+              </a:ext>
+            </a:extLst>
+          </a:blip>
+          <a:stretch>
+            <a:fillRect/>
+          </a:stretch>
+        </p:blipFill>
+        <p:spPr>
+          <a:xfrm>
+            <a:off x="2713993" y="5032053"/>
+            <a:ext cx="523018" cy="690721"/>
+          </a:xfrm>
+          <a:prstGeom prst="rect">
+            <a:avLst/>
+          </a:prstGeom>
+        </p:spPr>
+      </p:pic>
+      <p:pic>
+        <p:nvPicPr>
+          <p:cNvPr id="27" name="Picture 40">
+            <a:extLst>
+              <a:ext uri="{FF2B5EF4-FFF2-40B4-BE49-F238E27FC236}">
+                <a16:creationId xmlns:a16="http://schemas.microsoft.com/office/drawing/2014/main" id="{82D37B93-A674-6248-A0F6-C3053BF17E01}"/>
+              </a:ext>
+            </a:extLst>
+          </p:cNvPr>
+          <p:cNvPicPr>
+            <a:picLocks noChangeAspect="1"/>
+          </p:cNvPicPr>
+          <p:nvPr/>
+        </p:nvPicPr>
+        <p:blipFill>
+          <a:blip r:embed="rId4">
             <a:extLst>
               <a:ext uri="{28A0092B-C50C-407E-A947-70E740481C1C}">
                 <a14:useLocalDpi xmlns:a14="http://schemas.microsoft.com/office/drawing/2010/main" val="0"/>
@@ -17795,7 +18798,7 @@
         </p:blipFill>
         <p:spPr bwMode="auto">
           <a:xfrm>
-            <a:off x="116601" y="2734597"/>
+            <a:off x="-13004" y="5016111"/>
             <a:ext cx="1099134" cy="407338"/>
           </a:xfrm>
           <a:prstGeom prst="rect">
@@ -17828,29 +18831,32 @@
       </p:pic>
       <p:cxnSp>
         <p:nvCxnSpPr>
-          <p:cNvPr id="46" name="Elbow Connector 45">
+          <p:cNvPr id="28" name="Elbow Connector 27">
             <a:extLst>
               <a:ext uri="{FF2B5EF4-FFF2-40B4-BE49-F238E27FC236}">
-                <a16:creationId xmlns:a16="http://schemas.microsoft.com/office/drawing/2014/main" id="{B815F1F6-8EC9-A547-951A-6A6BA26A1B3E}"/>
+                <a16:creationId xmlns:a16="http://schemas.microsoft.com/office/drawing/2014/main" id="{C8FBC103-4DDC-FD42-8D32-2C65F09E2B19}"/>
               </a:ext>
             </a:extLst>
           </p:cNvPr>
           <p:cNvCxnSpPr>
             <a:cxnSpLocks/>
-            <a:stCxn id="9" idx="3"/>
-            <a:endCxn id="59" idx="1"/>
+            <a:stCxn id="15" idx="3"/>
+            <a:endCxn id="21" idx="2"/>
           </p:cNvCxnSpPr>
           <p:nvPr/>
         </p:nvCxnSpPr>
         <p:spPr>
           <a:xfrm>
-            <a:off x="2465614" y="2073727"/>
-            <a:ext cx="2093194" cy="516747"/>
-          </a:xfrm>
-          <a:prstGeom prst="bentConnector2">
-            <a:avLst/>
-          </a:prstGeom>
-          <a:ln>
+            <a:off x="2347079" y="4444393"/>
+            <a:ext cx="2734422" cy="725111"/>
+          </a:xfrm>
+          <a:prstGeom prst="bentConnector4">
+            <a:avLst>
+              <a:gd name="adj1" fmla="val 37228"/>
+              <a:gd name="adj2" fmla="val 243619"/>
+            </a:avLst>
+          </a:prstGeom>
+          <a:ln w="12700">
             <a:solidFill>
               <a:schemeClr val="accent6"/>
             </a:solidFill>
@@ -17875,33 +18881,33 @@
       </p:cxnSp>
       <p:cxnSp>
         <p:nvCxnSpPr>
-          <p:cNvPr id="71" name="Elbow Connector 70">
+          <p:cNvPr id="33" name="Elbow Connector 32">
             <a:extLst>
               <a:ext uri="{FF2B5EF4-FFF2-40B4-BE49-F238E27FC236}">
-                <a16:creationId xmlns:a16="http://schemas.microsoft.com/office/drawing/2014/main" id="{9B3950A4-1025-DB48-B886-5945ADD35206}"/>
+                <a16:creationId xmlns:a16="http://schemas.microsoft.com/office/drawing/2014/main" id="{A018039D-49E7-3C49-94D4-1BE530DE331F}"/>
               </a:ext>
             </a:extLst>
           </p:cNvPr>
           <p:cNvCxnSpPr>
             <a:cxnSpLocks/>
-            <a:stCxn id="45" idx="1"/>
-            <a:endCxn id="59" idx="4"/>
+            <a:stCxn id="20" idx="0"/>
+            <a:endCxn id="59" idx="3"/>
           </p:cNvCxnSpPr>
           <p:nvPr/>
         </p:nvCxnSpPr>
         <p:spPr>
-          <a:xfrm rot="10800000" flipV="1">
-            <a:off x="5157329" y="2100404"/>
-            <a:ext cx="1320870" cy="837862"/>
+          <a:xfrm rot="16200000" flipV="1">
+            <a:off x="4128790" y="3716076"/>
+            <a:ext cx="1151934" cy="291897"/>
           </a:xfrm>
           <a:prstGeom prst="bentConnector3">
             <a:avLst>
               <a:gd name="adj1" fmla="val 50000"/>
             </a:avLst>
           </a:prstGeom>
-          <a:ln>
+          <a:ln w="12700">
             <a:solidFill>
-              <a:srgbClr val="7030A0"/>
+              <a:srgbClr val="009643"/>
             </a:solidFill>
             <a:tailEnd type="triangle"/>
           </a:ln>
@@ -17924,10 +18930,10 @@
       </p:cxnSp>
       <p:sp>
         <p:nvSpPr>
-          <p:cNvPr id="45" name="Rounded Rectangle 44">
+          <p:cNvPr id="32" name="Rectangle 31">
             <a:extLst>
               <a:ext uri="{FF2B5EF4-FFF2-40B4-BE49-F238E27FC236}">
-                <a16:creationId xmlns:a16="http://schemas.microsoft.com/office/drawing/2014/main" id="{F495E1A9-5EC6-5446-ACF5-3911A287BB83}"/>
+                <a16:creationId xmlns:a16="http://schemas.microsoft.com/office/drawing/2014/main" id="{80B1BE04-8E41-6B41-9861-E9BB4FE73060}"/>
               </a:ext>
             </a:extLst>
           </p:cNvPr>
@@ -17936,108 +18942,10 @@
         </p:nvSpPr>
         <p:spPr>
           <a:xfrm>
-            <a:off x="6478199" y="1913633"/>
-            <a:ext cx="1749097" cy="373542"/>
-          </a:xfrm>
-          <a:prstGeom prst="roundRect">
-            <a:avLst>
-              <a:gd name="adj" fmla="val 9717"/>
-            </a:avLst>
-          </a:prstGeom>
-          <a:noFill/>
-          <a:ln w="12700">
-            <a:solidFill>
-              <a:schemeClr val="tx2">
-                <a:lumMod val="50000"/>
-              </a:schemeClr>
-            </a:solidFill>
-          </a:ln>
-          <a:effectLst/>
-        </p:spPr>
-        <p:style>
-          <a:lnRef idx="1">
-            <a:schemeClr val="dk1"/>
-          </a:lnRef>
-          <a:fillRef idx="2">
-            <a:schemeClr val="dk1"/>
-          </a:fillRef>
-          <a:effectRef idx="1">
-            <a:schemeClr val="dk1"/>
-          </a:effectRef>
-          <a:fontRef idx="minor">
-            <a:schemeClr val="dk1"/>
-          </a:fontRef>
-        </p:style>
-        <p:txBody>
-          <a:bodyPr rot="0" spcFirstLastPara="0" vertOverflow="overflow" horzOverflow="overflow" vert="horz" wrap="square" lIns="0" tIns="0" rIns="0" bIns="0" numCol="1" spcCol="0" rtlCol="0" fromWordArt="0" anchor="t" anchorCtr="0" forceAA="0" compatLnSpc="1">
-            <a:prstTxWarp prst="textNoShape">
-              <a:avLst/>
-            </a:prstTxWarp>
-            <a:noAutofit/>
-          </a:bodyPr>
-          <a:lstStyle/>
-          <a:p>
-            <a:r>
-              <a:rPr lang="en-US" sz="1200" baseline="0" dirty="0">
-                <a:solidFill>
-                  <a:schemeClr val="tx1"/>
-                </a:solidFill>
-                <a:latin typeface="IBM Plex Sans" panose="020B0503050203000203" pitchFamily="34" charset="77"/>
-                <a:cs typeface="Arial"/>
-              </a:rPr>
-              <a:t>Pandas DF</a:t>
-            </a:r>
-          </a:p>
-        </p:txBody>
-      </p:sp>
-      <p:pic>
-        <p:nvPicPr>
-          <p:cNvPr id="13" name="Picture 12">
-            <a:extLst>
-              <a:ext uri="{FF2B5EF4-FFF2-40B4-BE49-F238E27FC236}">
-                <a16:creationId xmlns:a16="http://schemas.microsoft.com/office/drawing/2014/main" id="{B81AAF60-BF23-E149-AC44-3DFB94494F2F}"/>
-              </a:ext>
-            </a:extLst>
-          </p:cNvPr>
-          <p:cNvPicPr>
-            <a:picLocks noChangeAspect="1"/>
-          </p:cNvPicPr>
-          <p:nvPr/>
-        </p:nvPicPr>
-        <p:blipFill>
-          <a:blip r:embed="rId3"/>
-          <a:stretch>
-            <a:fillRect/>
-          </a:stretch>
-        </p:blipFill>
-        <p:spPr>
-          <a:xfrm>
-            <a:off x="3492393" y="3041219"/>
-            <a:ext cx="638156" cy="680700"/>
+            <a:off x="3779270" y="3571943"/>
+            <a:ext cx="1651745" cy="415825"/>
           </a:xfrm>
           <a:prstGeom prst="rect">
-            <a:avLst/>
-          </a:prstGeom>
-        </p:spPr>
-      </p:pic>
-      <p:sp>
-        <p:nvSpPr>
-          <p:cNvPr id="59" name="Can 58">
-            <a:extLst>
-              <a:ext uri="{FF2B5EF4-FFF2-40B4-BE49-F238E27FC236}">
-                <a16:creationId xmlns:a16="http://schemas.microsoft.com/office/drawing/2014/main" id="{BF8D5F17-7886-6A49-A326-AB3283F367DA}"/>
-              </a:ext>
-            </a:extLst>
-          </p:cNvPr>
-          <p:cNvSpPr/>
-          <p:nvPr/>
-        </p:nvSpPr>
-        <p:spPr>
-          <a:xfrm>
-            <a:off x="3960287" y="2590474"/>
-            <a:ext cx="1197042" cy="695584"/>
-          </a:xfrm>
-          <a:prstGeom prst="can">
             <a:avLst/>
           </a:prstGeom>
           <a:solidFill>
@@ -18048,6 +18956,13 @@
           <a:ln>
             <a:noFill/>
           </a:ln>
+          <a:effectLst>
+            <a:outerShdw blurRad="50800" dist="38100" dir="5400000" algn="t" rotWithShape="0">
+              <a:prstClr val="black">
+                <a:alpha val="40000"/>
+              </a:prstClr>
+            </a:outerShdw>
+          </a:effectLst>
         </p:spPr>
         <p:style>
           <a:lnRef idx="2">
@@ -18071,8 +18986,315 @@
           <a:p>
             <a:pPr algn="ctr"/>
             <a:r>
+              <a:rPr lang="en-US" sz="1200" dirty="0"/>
+              <a:t>Long term persist stream</a:t>
+            </a:r>
+          </a:p>
+        </p:txBody>
+      </p:sp>
+      <p:sp>
+        <p:nvSpPr>
+          <p:cNvPr id="36" name="Can 35">
+            <a:extLst>
+              <a:ext uri="{FF2B5EF4-FFF2-40B4-BE49-F238E27FC236}">
+                <a16:creationId xmlns:a16="http://schemas.microsoft.com/office/drawing/2014/main" id="{838848AC-1D94-3D4E-9D79-D790EC064067}"/>
+              </a:ext>
+            </a:extLst>
+          </p:cNvPr>
+          <p:cNvSpPr/>
+          <p:nvPr/>
+        </p:nvSpPr>
+        <p:spPr>
+          <a:xfrm>
+            <a:off x="7108359" y="3489256"/>
+            <a:ext cx="895875" cy="695584"/>
+          </a:xfrm>
+          <a:prstGeom prst="can">
+            <a:avLst/>
+          </a:prstGeom>
+          <a:solidFill>
+            <a:schemeClr val="accent5">
+              <a:lumMod val="75000"/>
+            </a:schemeClr>
+          </a:solidFill>
+          <a:ln>
+            <a:noFill/>
+          </a:ln>
+        </p:spPr>
+        <p:style>
+          <a:lnRef idx="2">
+            <a:schemeClr val="accent1">
+              <a:shade val="50000"/>
+            </a:schemeClr>
+          </a:lnRef>
+          <a:fillRef idx="1">
+            <a:schemeClr val="accent1"/>
+          </a:fillRef>
+          <a:effectRef idx="0">
+            <a:schemeClr val="accent1"/>
+          </a:effectRef>
+          <a:fontRef idx="minor">
+            <a:schemeClr val="lt1"/>
+          </a:fontRef>
+        </p:style>
+        <p:txBody>
+          <a:bodyPr rtlCol="0" anchor="ctr"/>
+          <a:lstStyle/>
+          <a:p>
+            <a:pPr algn="ctr"/>
+            <a:r>
               <a:rPr lang="en-US" sz="1000" dirty="0"/>
-              <a:t>Reefer telemetries</a:t>
+              <a:t>Reefers Inventory</a:t>
+            </a:r>
+          </a:p>
+        </p:txBody>
+      </p:sp>
+      <p:sp>
+        <p:nvSpPr>
+          <p:cNvPr id="37" name="Can 36">
+            <a:extLst>
+              <a:ext uri="{FF2B5EF4-FFF2-40B4-BE49-F238E27FC236}">
+                <a16:creationId xmlns:a16="http://schemas.microsoft.com/office/drawing/2014/main" id="{8940F223-93A3-4947-A9E2-589C2FC0914F}"/>
+              </a:ext>
+            </a:extLst>
+          </p:cNvPr>
+          <p:cNvSpPr/>
+          <p:nvPr/>
+        </p:nvSpPr>
+        <p:spPr>
+          <a:xfrm>
+            <a:off x="8116630" y="3489256"/>
+            <a:ext cx="895875" cy="695584"/>
+          </a:xfrm>
+          <a:prstGeom prst="can">
+            <a:avLst/>
+          </a:prstGeom>
+          <a:solidFill>
+            <a:schemeClr val="accent5">
+              <a:lumMod val="75000"/>
+            </a:schemeClr>
+          </a:solidFill>
+          <a:ln>
+            <a:noFill/>
+          </a:ln>
+        </p:spPr>
+        <p:style>
+          <a:lnRef idx="2">
+            <a:schemeClr val="accent1">
+              <a:shade val="50000"/>
+            </a:schemeClr>
+          </a:lnRef>
+          <a:fillRef idx="1">
+            <a:schemeClr val="accent1"/>
+          </a:fillRef>
+          <a:effectRef idx="0">
+            <a:schemeClr val="accent1"/>
+          </a:effectRef>
+          <a:fontRef idx="minor">
+            <a:schemeClr val="lt1"/>
+          </a:fontRef>
+        </p:style>
+        <p:txBody>
+          <a:bodyPr rtlCol="0" anchor="ctr"/>
+          <a:lstStyle/>
+          <a:p>
+            <a:pPr algn="ctr"/>
+            <a:r>
+              <a:rPr lang="en-US" sz="1000" dirty="0"/>
+              <a:t>Products</a:t>
+            </a:r>
+          </a:p>
+        </p:txBody>
+      </p:sp>
+      <p:pic>
+        <p:nvPicPr>
+          <p:cNvPr id="38" name="Picture 37">
+            <a:extLst>
+              <a:ext uri="{FF2B5EF4-FFF2-40B4-BE49-F238E27FC236}">
+                <a16:creationId xmlns:a16="http://schemas.microsoft.com/office/drawing/2014/main" id="{3E12A240-C94D-F342-A515-AC9667796B7B}"/>
+              </a:ext>
+            </a:extLst>
+          </p:cNvPr>
+          <p:cNvPicPr>
+            <a:picLocks noChangeAspect="1"/>
+          </p:cNvPicPr>
+          <p:nvPr/>
+        </p:nvPicPr>
+        <p:blipFill>
+          <a:blip r:embed="rId5"/>
+          <a:stretch>
+            <a:fillRect/>
+          </a:stretch>
+        </p:blipFill>
+        <p:spPr>
+          <a:xfrm>
+            <a:off x="8941639" y="3913511"/>
+            <a:ext cx="638156" cy="680700"/>
+          </a:xfrm>
+          <a:prstGeom prst="rect">
+            <a:avLst/>
+          </a:prstGeom>
+        </p:spPr>
+      </p:pic>
+      <p:cxnSp>
+        <p:nvCxnSpPr>
+          <p:cNvPr id="39" name="Elbow Connector 38">
+            <a:extLst>
+              <a:ext uri="{FF2B5EF4-FFF2-40B4-BE49-F238E27FC236}">
+                <a16:creationId xmlns:a16="http://schemas.microsoft.com/office/drawing/2014/main" id="{2ADAE8E9-E8A0-C04F-AD33-82E1C5F42DB8}"/>
+              </a:ext>
+            </a:extLst>
+          </p:cNvPr>
+          <p:cNvCxnSpPr>
+            <a:cxnSpLocks/>
+            <a:stCxn id="45" idx="2"/>
+          </p:cNvCxnSpPr>
+          <p:nvPr/>
+        </p:nvCxnSpPr>
+        <p:spPr>
+          <a:xfrm rot="16200000" flipH="1">
+            <a:off x="7119144" y="2520778"/>
+            <a:ext cx="1151867" cy="684659"/>
+          </a:xfrm>
+          <a:prstGeom prst="bentConnector3">
+            <a:avLst>
+              <a:gd name="adj1" fmla="val 50000"/>
+            </a:avLst>
+          </a:prstGeom>
+          <a:ln w="12700">
+            <a:solidFill>
+              <a:srgbClr val="7030A0"/>
+            </a:solidFill>
+            <a:headEnd type="triangle"/>
+            <a:tailEnd type="none"/>
+          </a:ln>
+          <a:effectLst/>
+        </p:spPr>
+        <p:style>
+          <a:lnRef idx="2">
+            <a:schemeClr val="accent1"/>
+          </a:lnRef>
+          <a:fillRef idx="0">
+            <a:schemeClr val="accent1"/>
+          </a:fillRef>
+          <a:effectRef idx="1">
+            <a:schemeClr val="accent1"/>
+          </a:effectRef>
+          <a:fontRef idx="minor">
+            <a:schemeClr val="tx1"/>
+          </a:fontRef>
+        </p:style>
+      </p:cxnSp>
+      <p:sp>
+        <p:nvSpPr>
+          <p:cNvPr id="42" name="Oval 41">
+            <a:extLst>
+              <a:ext uri="{FF2B5EF4-FFF2-40B4-BE49-F238E27FC236}">
+                <a16:creationId xmlns:a16="http://schemas.microsoft.com/office/drawing/2014/main" id="{EF41234A-880A-8244-AA87-8EE3CA4327BE}"/>
+              </a:ext>
+            </a:extLst>
+          </p:cNvPr>
+          <p:cNvSpPr/>
+          <p:nvPr/>
+        </p:nvSpPr>
+        <p:spPr>
+          <a:xfrm>
+            <a:off x="246098" y="1544377"/>
+            <a:ext cx="290465" cy="369256"/>
+          </a:xfrm>
+          <a:prstGeom prst="ellipse">
+            <a:avLst/>
+          </a:prstGeom>
+          <a:solidFill>
+            <a:schemeClr val="tx2">
+              <a:lumMod val="75000"/>
+            </a:schemeClr>
+          </a:solidFill>
+          <a:ln>
+            <a:noFill/>
+          </a:ln>
+        </p:spPr>
+        <p:style>
+          <a:lnRef idx="2">
+            <a:schemeClr val="accent1">
+              <a:shade val="50000"/>
+            </a:schemeClr>
+          </a:lnRef>
+          <a:fillRef idx="1">
+            <a:schemeClr val="accent1"/>
+          </a:fillRef>
+          <a:effectRef idx="0">
+            <a:schemeClr val="accent1"/>
+          </a:effectRef>
+          <a:fontRef idx="minor">
+            <a:schemeClr val="lt1"/>
+          </a:fontRef>
+        </p:style>
+        <p:txBody>
+          <a:bodyPr rtlCol="0" anchor="ctr"/>
+          <a:lstStyle/>
+          <a:p>
+            <a:pPr algn="ctr"/>
+            <a:r>
+              <a:rPr lang="en-US" sz="1400" dirty="0"/>
+              <a:t>1</a:t>
+            </a:r>
+          </a:p>
+        </p:txBody>
+      </p:sp>
+      <p:sp>
+        <p:nvSpPr>
+          <p:cNvPr id="43" name="Oval 42">
+            <a:extLst>
+              <a:ext uri="{FF2B5EF4-FFF2-40B4-BE49-F238E27FC236}">
+                <a16:creationId xmlns:a16="http://schemas.microsoft.com/office/drawing/2014/main" id="{18795C1C-9E4F-AA4C-9D51-61F797DA92E3}"/>
+              </a:ext>
+            </a:extLst>
+          </p:cNvPr>
+          <p:cNvSpPr/>
+          <p:nvPr/>
+        </p:nvSpPr>
+        <p:spPr>
+          <a:xfrm>
+            <a:off x="795665" y="5454503"/>
+            <a:ext cx="290465" cy="369256"/>
+          </a:xfrm>
+          <a:prstGeom prst="ellipse">
+            <a:avLst/>
+          </a:prstGeom>
+          <a:solidFill>
+            <a:schemeClr val="tx2">
+              <a:lumMod val="75000"/>
+            </a:schemeClr>
+          </a:solidFill>
+          <a:ln>
+            <a:noFill/>
+          </a:ln>
+        </p:spPr>
+        <p:style>
+          <a:lnRef idx="2">
+            <a:schemeClr val="accent1">
+              <a:shade val="50000"/>
+            </a:schemeClr>
+          </a:lnRef>
+          <a:fillRef idx="1">
+            <a:schemeClr val="accent1"/>
+          </a:fillRef>
+          <a:effectRef idx="0">
+            <a:schemeClr val="accent1"/>
+          </a:effectRef>
+          <a:fontRef idx="minor">
+            <a:schemeClr val="lt1"/>
+          </a:fontRef>
+        </p:style>
+        <p:txBody>
+          <a:bodyPr rtlCol="0" anchor="ctr"/>
+          <a:lstStyle/>
+          <a:p>
+            <a:pPr algn="ctr"/>
+            <a:r>
+              <a:rPr lang="en-US" sz="1400" dirty="0"/>
+              <a:t>2</a:t>
             </a:r>
           </a:p>
         </p:txBody>
@@ -19424,6 +20646,36 @@
           </a:p>
         </p:txBody>
       </p:sp>
+      <p:pic>
+        <p:nvPicPr>
+          <p:cNvPr id="26" name="Picture 25">
+            <a:extLst>
+              <a:ext uri="{FF2B5EF4-FFF2-40B4-BE49-F238E27FC236}">
+                <a16:creationId xmlns:a16="http://schemas.microsoft.com/office/drawing/2014/main" id="{509913A5-E445-C54D-8C8A-64EA88153B4B}"/>
+              </a:ext>
+            </a:extLst>
+          </p:cNvPr>
+          <p:cNvPicPr>
+            <a:picLocks noChangeAspect="1"/>
+          </p:cNvPicPr>
+          <p:nvPr/>
+        </p:nvPicPr>
+        <p:blipFill>
+          <a:blip r:embed="rId4"/>
+          <a:stretch>
+            <a:fillRect/>
+          </a:stretch>
+        </p:blipFill>
+        <p:spPr>
+          <a:xfrm>
+            <a:off x="8048469" y="4322790"/>
+            <a:ext cx="638156" cy="680700"/>
+          </a:xfrm>
+          <a:prstGeom prst="rect">
+            <a:avLst/>
+          </a:prstGeom>
+        </p:spPr>
+      </p:pic>
     </p:spTree>
     <p:extLst>
       <p:ext uri="{BB962C8B-B14F-4D97-AF65-F5344CB8AC3E}">

</xml_diff>

<commit_message>
Deployed e0ccc19 with MkDocs version: 1.0.4
</commit_message>
<xml_diff>
--- a/diagrams.pptx
+++ b/diagrams.pptx
@@ -6,18 +6,19 @@
     <p:sldMasterId id="2147484308" r:id="rId2"/>
   </p:sldMasterIdLst>
   <p:notesMasterIdLst>
-    <p:notesMasterId r:id="rId12"/>
+    <p:notesMasterId r:id="rId13"/>
   </p:notesMasterIdLst>
   <p:sldIdLst>
     <p:sldId id="141168470" r:id="rId3"/>
     <p:sldId id="141168471" r:id="rId4"/>
     <p:sldId id="141168473" r:id="rId5"/>
     <p:sldId id="141168474" r:id="rId6"/>
-    <p:sldId id="2783" r:id="rId7"/>
-    <p:sldId id="2801" r:id="rId8"/>
-    <p:sldId id="141168472" r:id="rId9"/>
-    <p:sldId id="2799" r:id="rId10"/>
-    <p:sldId id="2800" r:id="rId11"/>
+    <p:sldId id="141168475" r:id="rId7"/>
+    <p:sldId id="2783" r:id="rId8"/>
+    <p:sldId id="2801" r:id="rId9"/>
+    <p:sldId id="141168472" r:id="rId10"/>
+    <p:sldId id="2799" r:id="rId11"/>
+    <p:sldId id="2800" r:id="rId12"/>
   </p:sldIdLst>
   <p:sldSz cx="12192000" cy="6858000"/>
   <p:notesSz cx="7086600" cy="9372600"/>
@@ -280,7 +281,7 @@
               <a:pPr>
                 <a:defRPr/>
               </a:pPr>
-              <a:t>12/11/19</a:t>
+              <a:t>12/12/19</a:t>
             </a:fld>
             <a:endParaRPr lang="en-US" dirty="0"/>
           </a:p>
@@ -729,7 +730,7 @@
                 <a:tabLst/>
                 <a:defRPr/>
               </a:pPr>
-              <a:t>5</a:t>
+              <a:t>6</a:t>
             </a:fld>
             <a:endParaRPr kumimoji="0" lang="en-US" sz="1200" b="0" i="0" u="none" strike="noStrike" kern="1200" cap="none" spc="0" normalizeH="0" baseline="0" noProof="0">
               <a:ln>
@@ -841,7 +842,7 @@
               <a:pPr>
                 <a:defRPr/>
               </a:pPr>
-              <a:t>6</a:t>
+              <a:t>7</a:t>
             </a:fld>
             <a:endParaRPr lang="en-US" altLang="en-US" dirty="0"/>
           </a:p>
@@ -940,7 +941,7 @@
               <a:pPr>
                 <a:defRPr/>
               </a:pPr>
-              <a:t>7</a:t>
+              <a:t>8</a:t>
             </a:fld>
             <a:endParaRPr lang="en-US" altLang="en-US" dirty="0"/>
           </a:p>
@@ -8593,6 +8594,1383 @@
 </p:sld>
 </file>
 
+<file path=ppt/slides/slide10.xml><?xml version="1.0" encoding="utf-8"?>
+<p:sld xmlns:a="http://schemas.openxmlformats.org/drawingml/2006/main" xmlns:r="http://schemas.openxmlformats.org/officeDocument/2006/relationships" xmlns:p="http://schemas.openxmlformats.org/presentationml/2006/main">
+  <p:cSld>
+    <p:spTree>
+      <p:nvGrpSpPr>
+        <p:cNvPr id="1" name=""/>
+        <p:cNvGrpSpPr/>
+        <p:nvPr/>
+      </p:nvGrpSpPr>
+      <p:grpSpPr>
+        <a:xfrm>
+          <a:off x="0" y="0"/>
+          <a:ext cx="0" cy="0"/>
+          <a:chOff x="0" y="0"/>
+          <a:chExt cx="0" cy="0"/>
+        </a:xfrm>
+      </p:grpSpPr>
+      <p:sp>
+        <p:nvSpPr>
+          <p:cNvPr id="2" name="Title 1">
+            <a:extLst>
+              <a:ext uri="{FF2B5EF4-FFF2-40B4-BE49-F238E27FC236}">
+                <a16:creationId xmlns:a16="http://schemas.microsoft.com/office/drawing/2014/main" id="{83D72B5A-D2BF-0F41-AB02-0E3504265F76}"/>
+              </a:ext>
+            </a:extLst>
+          </p:cNvPr>
+          <p:cNvSpPr>
+            <a:spLocks noGrp="1"/>
+          </p:cNvSpPr>
+          <p:nvPr>
+            <p:ph type="title"/>
+          </p:nvPr>
+        </p:nvSpPr>
+        <p:spPr>
+          <a:xfrm>
+            <a:off x="288633" y="208582"/>
+            <a:ext cx="10515600" cy="521140"/>
+          </a:xfrm>
+        </p:spPr>
+        <p:txBody>
+          <a:bodyPr>
+            <a:normAutofit/>
+          </a:bodyPr>
+          <a:lstStyle/>
+          <a:p>
+            <a:r>
+              <a:rPr lang="en-US" sz="2400" dirty="0"/>
+              <a:t>Event Stream As Event Store for ML</a:t>
+            </a:r>
+          </a:p>
+        </p:txBody>
+      </p:sp>
+      <p:sp>
+        <p:nvSpPr>
+          <p:cNvPr id="4" name="Slide Number Placeholder 3">
+            <a:extLst>
+              <a:ext uri="{FF2B5EF4-FFF2-40B4-BE49-F238E27FC236}">
+                <a16:creationId xmlns:a16="http://schemas.microsoft.com/office/drawing/2014/main" id="{B1D66A27-027F-EA4A-B9BD-D02849496229}"/>
+              </a:ext>
+            </a:extLst>
+          </p:cNvPr>
+          <p:cNvSpPr>
+            <a:spLocks noGrp="1"/>
+          </p:cNvSpPr>
+          <p:nvPr>
+            <p:ph type="sldNum" sz="quarter" idx="12"/>
+          </p:nvPr>
+        </p:nvSpPr>
+        <p:spPr/>
+        <p:txBody>
+          <a:bodyPr/>
+          <a:lstStyle/>
+          <a:p>
+            <a:fld id="{C565C23E-6D76-459C-BC14-A9049E4EE889}" type="slidenum">
+              <a:rPr lang="en-US" smtClean="0"/>
+              <a:t>10</a:t>
+            </a:fld>
+            <a:endParaRPr lang="en-US"/>
+          </a:p>
+        </p:txBody>
+      </p:sp>
+      <p:sp>
+        <p:nvSpPr>
+          <p:cNvPr id="6" name="Rectangle 5">
+            <a:extLst>
+              <a:ext uri="{FF2B5EF4-FFF2-40B4-BE49-F238E27FC236}">
+                <a16:creationId xmlns:a16="http://schemas.microsoft.com/office/drawing/2014/main" id="{B53C0033-8D9E-604C-9B28-5FDD36C6C800}"/>
+              </a:ext>
+            </a:extLst>
+          </p:cNvPr>
+          <p:cNvSpPr/>
+          <p:nvPr/>
+        </p:nvSpPr>
+        <p:spPr>
+          <a:xfrm>
+            <a:off x="6118016" y="1168380"/>
+            <a:ext cx="3362160" cy="1973555"/>
+          </a:xfrm>
+          <a:prstGeom prst="rect">
+            <a:avLst/>
+          </a:prstGeom>
+          <a:noFill/>
+          <a:ln>
+            <a:prstDash val="dash"/>
+          </a:ln>
+        </p:spPr>
+        <p:style>
+          <a:lnRef idx="2">
+            <a:schemeClr val="accent1">
+              <a:shade val="50000"/>
+            </a:schemeClr>
+          </a:lnRef>
+          <a:fillRef idx="1">
+            <a:schemeClr val="accent1"/>
+          </a:fillRef>
+          <a:effectRef idx="0">
+            <a:schemeClr val="accent1"/>
+          </a:effectRef>
+          <a:fontRef idx="minor">
+            <a:schemeClr val="lt1"/>
+          </a:fontRef>
+        </p:style>
+        <p:txBody>
+          <a:bodyPr rtlCol="0" anchor="b"/>
+          <a:lstStyle/>
+          <a:p>
+            <a:pPr algn="ctr"/>
+            <a:r>
+              <a:rPr lang="en-US" sz="1200" dirty="0">
+                <a:solidFill>
+                  <a:schemeClr val="tx1"/>
+                </a:solidFill>
+              </a:rPr>
+              <a:t>ML Environment</a:t>
+            </a:r>
+          </a:p>
+        </p:txBody>
+      </p:sp>
+      <p:sp>
+        <p:nvSpPr>
+          <p:cNvPr id="8" name="Rectangle 7">
+            <a:extLst>
+              <a:ext uri="{FF2B5EF4-FFF2-40B4-BE49-F238E27FC236}">
+                <a16:creationId xmlns:a16="http://schemas.microsoft.com/office/drawing/2014/main" id="{FB63688E-FF28-D746-AC3D-3D2EFBDE0655}"/>
+              </a:ext>
+            </a:extLst>
+          </p:cNvPr>
+          <p:cNvSpPr/>
+          <p:nvPr/>
+        </p:nvSpPr>
+        <p:spPr>
+          <a:xfrm>
+            <a:off x="642258" y="1282632"/>
+            <a:ext cx="2008413" cy="1655634"/>
+          </a:xfrm>
+          <a:prstGeom prst="rect">
+            <a:avLst/>
+          </a:prstGeom>
+          <a:noFill/>
+          <a:ln>
+            <a:solidFill>
+              <a:schemeClr val="accent3"/>
+            </a:solidFill>
+            <a:prstDash val="dash"/>
+          </a:ln>
+        </p:spPr>
+        <p:style>
+          <a:lnRef idx="2">
+            <a:schemeClr val="accent1">
+              <a:shade val="50000"/>
+            </a:schemeClr>
+          </a:lnRef>
+          <a:fillRef idx="1">
+            <a:schemeClr val="accent1"/>
+          </a:fillRef>
+          <a:effectRef idx="0">
+            <a:schemeClr val="accent1"/>
+          </a:effectRef>
+          <a:fontRef idx="minor">
+            <a:schemeClr val="lt1"/>
+          </a:fontRef>
+        </p:style>
+        <p:txBody>
+          <a:bodyPr rtlCol="0" anchor="b"/>
+          <a:lstStyle/>
+          <a:p>
+            <a:pPr algn="ctr"/>
+            <a:r>
+              <a:rPr lang="en-US" sz="1200" dirty="0">
+                <a:solidFill>
+                  <a:schemeClr val="tx1"/>
+                </a:solidFill>
+              </a:rPr>
+              <a:t>Python</a:t>
+            </a:r>
+          </a:p>
+        </p:txBody>
+      </p:sp>
+      <p:sp>
+        <p:nvSpPr>
+          <p:cNvPr id="9" name="Rectangle 8">
+            <a:extLst>
+              <a:ext uri="{FF2B5EF4-FFF2-40B4-BE49-F238E27FC236}">
+                <a16:creationId xmlns:a16="http://schemas.microsoft.com/office/drawing/2014/main" id="{F1EEF6CD-0322-394A-87BF-5379FE8EE999}"/>
+              </a:ext>
+            </a:extLst>
+          </p:cNvPr>
+          <p:cNvSpPr/>
+          <p:nvPr/>
+        </p:nvSpPr>
+        <p:spPr>
+          <a:xfrm>
+            <a:off x="762000" y="1616527"/>
+            <a:ext cx="1703614" cy="914400"/>
+          </a:xfrm>
+          <a:prstGeom prst="rect">
+            <a:avLst/>
+          </a:prstGeom>
+          <a:solidFill>
+            <a:schemeClr val="accent5">
+              <a:lumMod val="75000"/>
+            </a:schemeClr>
+          </a:solidFill>
+        </p:spPr>
+        <p:style>
+          <a:lnRef idx="2">
+            <a:schemeClr val="accent1">
+              <a:shade val="50000"/>
+            </a:schemeClr>
+          </a:lnRef>
+          <a:fillRef idx="1">
+            <a:schemeClr val="accent1"/>
+          </a:fillRef>
+          <a:effectRef idx="0">
+            <a:schemeClr val="accent1"/>
+          </a:effectRef>
+          <a:fontRef idx="minor">
+            <a:schemeClr val="lt1"/>
+          </a:fontRef>
+        </p:style>
+        <p:txBody>
+          <a:bodyPr rtlCol="0" anchor="ctr"/>
+          <a:lstStyle/>
+          <a:p>
+            <a:pPr algn="ctr"/>
+            <a:r>
+              <a:rPr lang="en-US" sz="1400" dirty="0"/>
+              <a:t>Simulator</a:t>
+            </a:r>
+          </a:p>
+        </p:txBody>
+      </p:sp>
+      <p:sp>
+        <p:nvSpPr>
+          <p:cNvPr id="10" name="Rounded Rectangle 9">
+            <a:extLst>
+              <a:ext uri="{FF2B5EF4-FFF2-40B4-BE49-F238E27FC236}">
+                <a16:creationId xmlns:a16="http://schemas.microsoft.com/office/drawing/2014/main" id="{0BA597E7-00D6-7F44-9C30-03D1F5A01FB4}"/>
+              </a:ext>
+            </a:extLst>
+          </p:cNvPr>
+          <p:cNvSpPr/>
+          <p:nvPr/>
+        </p:nvSpPr>
+        <p:spPr bwMode="auto">
+          <a:xfrm>
+            <a:off x="2766994" y="4217859"/>
+            <a:ext cx="245561" cy="731512"/>
+          </a:xfrm>
+          <a:prstGeom prst="roundRect">
+            <a:avLst/>
+          </a:prstGeom>
+          <a:solidFill>
+            <a:schemeClr val="bg2"/>
+          </a:solidFill>
+          <a:ln>
+            <a:solidFill>
+              <a:schemeClr val="bg1"/>
+            </a:solidFill>
+            <a:prstDash val="solid"/>
+            <a:headEnd type="none" w="med" len="med"/>
+            <a:tailEnd type="none" w="med" len="med"/>
+          </a:ln>
+          <a:effectLst/>
+        </p:spPr>
+        <p:style>
+          <a:lnRef idx="1">
+            <a:schemeClr val="accent5"/>
+          </a:lnRef>
+          <a:fillRef idx="3">
+            <a:schemeClr val="accent5"/>
+          </a:fillRef>
+          <a:effectRef idx="2">
+            <a:schemeClr val="accent5"/>
+          </a:effectRef>
+          <a:fontRef idx="minor">
+            <a:schemeClr val="lt1"/>
+          </a:fontRef>
+        </p:style>
+        <p:txBody>
+          <a:bodyPr vert="horz" wrap="square" lIns="0" tIns="0" rIns="0" bIns="0" numCol="1" rtlCol="0" anchor="ctr" anchorCtr="0" compatLnSpc="1">
+            <a:prstTxWarp prst="textNoShape">
+              <a:avLst/>
+            </a:prstTxWarp>
+            <a:noAutofit/>
+          </a:bodyPr>
+          <a:lstStyle/>
+          <a:p>
+            <a:pPr algn="ctr" defTabSz="1219170" fontAlgn="base">
+              <a:lnSpc>
+                <a:spcPct val="90000"/>
+              </a:lnSpc>
+              <a:spcBef>
+                <a:spcPct val="0"/>
+              </a:spcBef>
+              <a:spcAft>
+                <a:spcPct val="0"/>
+              </a:spcAft>
+            </a:pPr>
+            <a:r>
+              <a:rPr lang="en-US" sz="1200" dirty="0">
+                <a:solidFill>
+                  <a:schemeClr val="bg1"/>
+                </a:solidFill>
+              </a:rPr>
+              <a:t>0</a:t>
+            </a:r>
+            <a:endParaRPr lang="en-US" sz="667" dirty="0">
+              <a:solidFill>
+                <a:schemeClr val="bg1"/>
+              </a:solidFill>
+            </a:endParaRPr>
+          </a:p>
+        </p:txBody>
+      </p:sp>
+      <p:sp>
+        <p:nvSpPr>
+          <p:cNvPr id="11" name="Rounded Rectangle 10">
+            <a:extLst>
+              <a:ext uri="{FF2B5EF4-FFF2-40B4-BE49-F238E27FC236}">
+                <a16:creationId xmlns:a16="http://schemas.microsoft.com/office/drawing/2014/main" id="{3F8CBAEE-0098-D148-A196-E5AD2B6787B8}"/>
+              </a:ext>
+            </a:extLst>
+          </p:cNvPr>
+          <p:cNvSpPr/>
+          <p:nvPr/>
+        </p:nvSpPr>
+        <p:spPr bwMode="auto">
+          <a:xfrm>
+            <a:off x="3010831" y="4217859"/>
+            <a:ext cx="245561" cy="731512"/>
+          </a:xfrm>
+          <a:prstGeom prst="roundRect">
+            <a:avLst/>
+          </a:prstGeom>
+          <a:solidFill>
+            <a:schemeClr val="bg2"/>
+          </a:solidFill>
+          <a:ln>
+            <a:solidFill>
+              <a:schemeClr val="bg1"/>
+            </a:solidFill>
+            <a:prstDash val="solid"/>
+            <a:headEnd type="none" w="med" len="med"/>
+            <a:tailEnd type="none" w="med" len="med"/>
+          </a:ln>
+          <a:effectLst/>
+        </p:spPr>
+        <p:style>
+          <a:lnRef idx="1">
+            <a:schemeClr val="accent5"/>
+          </a:lnRef>
+          <a:fillRef idx="3">
+            <a:schemeClr val="accent5"/>
+          </a:fillRef>
+          <a:effectRef idx="2">
+            <a:schemeClr val="accent5"/>
+          </a:effectRef>
+          <a:fontRef idx="minor">
+            <a:schemeClr val="lt1"/>
+          </a:fontRef>
+        </p:style>
+        <p:txBody>
+          <a:bodyPr vert="horz" wrap="square" lIns="0" tIns="0" rIns="0" bIns="0" numCol="1" rtlCol="0" anchor="ctr" anchorCtr="0" compatLnSpc="1">
+            <a:prstTxWarp prst="textNoShape">
+              <a:avLst/>
+            </a:prstTxWarp>
+            <a:noAutofit/>
+          </a:bodyPr>
+          <a:lstStyle/>
+          <a:p>
+            <a:pPr algn="ctr" defTabSz="1219170" fontAlgn="base">
+              <a:lnSpc>
+                <a:spcPct val="90000"/>
+              </a:lnSpc>
+              <a:spcBef>
+                <a:spcPct val="0"/>
+              </a:spcBef>
+              <a:spcAft>
+                <a:spcPct val="0"/>
+              </a:spcAft>
+            </a:pPr>
+            <a:r>
+              <a:rPr lang="en-US" sz="1200" dirty="0">
+                <a:solidFill>
+                  <a:schemeClr val="bg1"/>
+                </a:solidFill>
+              </a:rPr>
+              <a:t>1</a:t>
+            </a:r>
+            <a:endParaRPr lang="en-US" sz="667" dirty="0">
+              <a:solidFill>
+                <a:schemeClr val="bg1"/>
+              </a:solidFill>
+            </a:endParaRPr>
+          </a:p>
+        </p:txBody>
+      </p:sp>
+      <p:sp>
+        <p:nvSpPr>
+          <p:cNvPr id="12" name="Rounded Rectangle 11">
+            <a:extLst>
+              <a:ext uri="{FF2B5EF4-FFF2-40B4-BE49-F238E27FC236}">
+                <a16:creationId xmlns:a16="http://schemas.microsoft.com/office/drawing/2014/main" id="{F2989703-2F49-5647-B6D8-F7993E04EAE4}"/>
+              </a:ext>
+            </a:extLst>
+          </p:cNvPr>
+          <p:cNvSpPr/>
+          <p:nvPr/>
+        </p:nvSpPr>
+        <p:spPr bwMode="auto">
+          <a:xfrm>
+            <a:off x="3256393" y="4217859"/>
+            <a:ext cx="245561" cy="731512"/>
+          </a:xfrm>
+          <a:prstGeom prst="roundRect">
+            <a:avLst/>
+          </a:prstGeom>
+          <a:solidFill>
+            <a:schemeClr val="bg2"/>
+          </a:solidFill>
+          <a:ln>
+            <a:solidFill>
+              <a:schemeClr val="bg1"/>
+            </a:solidFill>
+            <a:prstDash val="solid"/>
+            <a:headEnd type="none" w="med" len="med"/>
+            <a:tailEnd type="none" w="med" len="med"/>
+          </a:ln>
+          <a:effectLst/>
+        </p:spPr>
+        <p:style>
+          <a:lnRef idx="1">
+            <a:schemeClr val="accent5"/>
+          </a:lnRef>
+          <a:fillRef idx="3">
+            <a:schemeClr val="accent5"/>
+          </a:fillRef>
+          <a:effectRef idx="2">
+            <a:schemeClr val="accent5"/>
+          </a:effectRef>
+          <a:fontRef idx="minor">
+            <a:schemeClr val="lt1"/>
+          </a:fontRef>
+        </p:style>
+        <p:txBody>
+          <a:bodyPr vert="horz" wrap="square" lIns="0" tIns="0" rIns="0" bIns="0" numCol="1" rtlCol="0" anchor="ctr" anchorCtr="0" compatLnSpc="1">
+            <a:prstTxWarp prst="textNoShape">
+              <a:avLst/>
+            </a:prstTxWarp>
+            <a:noAutofit/>
+          </a:bodyPr>
+          <a:lstStyle/>
+          <a:p>
+            <a:pPr algn="ctr" defTabSz="1219170" fontAlgn="base">
+              <a:lnSpc>
+                <a:spcPct val="90000"/>
+              </a:lnSpc>
+              <a:spcBef>
+                <a:spcPct val="0"/>
+              </a:spcBef>
+              <a:spcAft>
+                <a:spcPct val="0"/>
+              </a:spcAft>
+            </a:pPr>
+            <a:r>
+              <a:rPr lang="en-US" sz="1200" dirty="0">
+                <a:solidFill>
+                  <a:schemeClr val="bg1"/>
+                </a:solidFill>
+              </a:rPr>
+              <a:t>2</a:t>
+            </a:r>
+            <a:endParaRPr lang="en-US" sz="667" dirty="0">
+              <a:solidFill>
+                <a:schemeClr val="bg1"/>
+              </a:solidFill>
+            </a:endParaRPr>
+          </a:p>
+        </p:txBody>
+      </p:sp>
+      <p:sp>
+        <p:nvSpPr>
+          <p:cNvPr id="13" name="Rounded Rectangle 12">
+            <a:extLst>
+              <a:ext uri="{FF2B5EF4-FFF2-40B4-BE49-F238E27FC236}">
+                <a16:creationId xmlns:a16="http://schemas.microsoft.com/office/drawing/2014/main" id="{54F04F52-1698-E54E-8D5D-3991A0424611}"/>
+              </a:ext>
+            </a:extLst>
+          </p:cNvPr>
+          <p:cNvSpPr/>
+          <p:nvPr/>
+        </p:nvSpPr>
+        <p:spPr bwMode="auto">
+          <a:xfrm>
+            <a:off x="3500230" y="4217859"/>
+            <a:ext cx="245561" cy="731512"/>
+          </a:xfrm>
+          <a:prstGeom prst="roundRect">
+            <a:avLst/>
+          </a:prstGeom>
+          <a:solidFill>
+            <a:schemeClr val="bg2"/>
+          </a:solidFill>
+          <a:ln>
+            <a:solidFill>
+              <a:schemeClr val="bg1"/>
+            </a:solidFill>
+            <a:prstDash val="solid"/>
+            <a:headEnd type="none" w="med" len="med"/>
+            <a:tailEnd type="none" w="med" len="med"/>
+          </a:ln>
+          <a:effectLst/>
+        </p:spPr>
+        <p:style>
+          <a:lnRef idx="1">
+            <a:schemeClr val="accent5"/>
+          </a:lnRef>
+          <a:fillRef idx="3">
+            <a:schemeClr val="accent5"/>
+          </a:fillRef>
+          <a:effectRef idx="2">
+            <a:schemeClr val="accent5"/>
+          </a:effectRef>
+          <a:fontRef idx="minor">
+            <a:schemeClr val="lt1"/>
+          </a:fontRef>
+        </p:style>
+        <p:txBody>
+          <a:bodyPr vert="horz" wrap="square" lIns="0" tIns="0" rIns="0" bIns="0" numCol="1" rtlCol="0" anchor="ctr" anchorCtr="0" compatLnSpc="1">
+            <a:prstTxWarp prst="textNoShape">
+              <a:avLst/>
+            </a:prstTxWarp>
+            <a:noAutofit/>
+          </a:bodyPr>
+          <a:lstStyle/>
+          <a:p>
+            <a:pPr algn="ctr" defTabSz="1219170" fontAlgn="base">
+              <a:lnSpc>
+                <a:spcPct val="90000"/>
+              </a:lnSpc>
+              <a:spcBef>
+                <a:spcPct val="0"/>
+              </a:spcBef>
+              <a:spcAft>
+                <a:spcPct val="0"/>
+              </a:spcAft>
+            </a:pPr>
+            <a:r>
+              <a:rPr lang="en-US" sz="1200" dirty="0">
+                <a:solidFill>
+                  <a:schemeClr val="bg1"/>
+                </a:solidFill>
+              </a:rPr>
+              <a:t>3</a:t>
+            </a:r>
+            <a:endParaRPr lang="en-US" sz="667" dirty="0">
+              <a:solidFill>
+                <a:schemeClr val="bg1"/>
+              </a:solidFill>
+            </a:endParaRPr>
+          </a:p>
+        </p:txBody>
+      </p:sp>
+      <p:sp>
+        <p:nvSpPr>
+          <p:cNvPr id="14" name="Rounded Rectangle 13">
+            <a:extLst>
+              <a:ext uri="{FF2B5EF4-FFF2-40B4-BE49-F238E27FC236}">
+                <a16:creationId xmlns:a16="http://schemas.microsoft.com/office/drawing/2014/main" id="{3890F22B-7831-CC45-9E84-2F465C403BBE}"/>
+              </a:ext>
+            </a:extLst>
+          </p:cNvPr>
+          <p:cNvSpPr/>
+          <p:nvPr/>
+        </p:nvSpPr>
+        <p:spPr bwMode="auto">
+          <a:xfrm>
+            <a:off x="3745791" y="4217859"/>
+            <a:ext cx="245561" cy="731512"/>
+          </a:xfrm>
+          <a:prstGeom prst="roundRect">
+            <a:avLst/>
+          </a:prstGeom>
+          <a:solidFill>
+            <a:schemeClr val="bg2"/>
+          </a:solidFill>
+          <a:ln>
+            <a:solidFill>
+              <a:schemeClr val="bg1"/>
+            </a:solidFill>
+            <a:prstDash val="solid"/>
+            <a:headEnd type="none" w="med" len="med"/>
+            <a:tailEnd type="none" w="med" len="med"/>
+          </a:ln>
+          <a:effectLst/>
+        </p:spPr>
+        <p:style>
+          <a:lnRef idx="1">
+            <a:schemeClr val="accent5"/>
+          </a:lnRef>
+          <a:fillRef idx="3">
+            <a:schemeClr val="accent5"/>
+          </a:fillRef>
+          <a:effectRef idx="2">
+            <a:schemeClr val="accent5"/>
+          </a:effectRef>
+          <a:fontRef idx="minor">
+            <a:schemeClr val="lt1"/>
+          </a:fontRef>
+        </p:style>
+        <p:txBody>
+          <a:bodyPr vert="horz" wrap="square" lIns="0" tIns="0" rIns="0" bIns="0" numCol="1" rtlCol="0" anchor="ctr" anchorCtr="0" compatLnSpc="1">
+            <a:prstTxWarp prst="textNoShape">
+              <a:avLst/>
+            </a:prstTxWarp>
+            <a:noAutofit/>
+          </a:bodyPr>
+          <a:lstStyle/>
+          <a:p>
+            <a:pPr algn="ctr" defTabSz="1219170" fontAlgn="base">
+              <a:lnSpc>
+                <a:spcPct val="90000"/>
+              </a:lnSpc>
+              <a:spcBef>
+                <a:spcPct val="0"/>
+              </a:spcBef>
+              <a:spcAft>
+                <a:spcPct val="0"/>
+              </a:spcAft>
+            </a:pPr>
+            <a:r>
+              <a:rPr lang="en-US" sz="1200" dirty="0">
+                <a:solidFill>
+                  <a:schemeClr val="bg1"/>
+                </a:solidFill>
+              </a:rPr>
+              <a:t>4</a:t>
+            </a:r>
+            <a:endParaRPr lang="en-US" sz="667" dirty="0">
+              <a:solidFill>
+                <a:schemeClr val="bg1"/>
+              </a:solidFill>
+            </a:endParaRPr>
+          </a:p>
+        </p:txBody>
+      </p:sp>
+      <p:sp>
+        <p:nvSpPr>
+          <p:cNvPr id="15" name="Rounded Rectangle 14">
+            <a:extLst>
+              <a:ext uri="{FF2B5EF4-FFF2-40B4-BE49-F238E27FC236}">
+                <a16:creationId xmlns:a16="http://schemas.microsoft.com/office/drawing/2014/main" id="{EED12008-2192-5048-99A3-CAFBD4DFB3A8}"/>
+              </a:ext>
+            </a:extLst>
+          </p:cNvPr>
+          <p:cNvSpPr/>
+          <p:nvPr/>
+        </p:nvSpPr>
+        <p:spPr bwMode="auto">
+          <a:xfrm>
+            <a:off x="3976587" y="4217859"/>
+            <a:ext cx="245561" cy="731512"/>
+          </a:xfrm>
+          <a:prstGeom prst="roundRect">
+            <a:avLst/>
+          </a:prstGeom>
+          <a:solidFill>
+            <a:schemeClr val="bg2"/>
+          </a:solidFill>
+          <a:ln>
+            <a:solidFill>
+              <a:schemeClr val="bg1"/>
+            </a:solidFill>
+            <a:prstDash val="solid"/>
+            <a:headEnd type="none" w="med" len="med"/>
+            <a:tailEnd type="none" w="med" len="med"/>
+          </a:ln>
+          <a:effectLst/>
+        </p:spPr>
+        <p:style>
+          <a:lnRef idx="1">
+            <a:schemeClr val="accent5"/>
+          </a:lnRef>
+          <a:fillRef idx="3">
+            <a:schemeClr val="accent5"/>
+          </a:fillRef>
+          <a:effectRef idx="2">
+            <a:schemeClr val="accent5"/>
+          </a:effectRef>
+          <a:fontRef idx="minor">
+            <a:schemeClr val="lt1"/>
+          </a:fontRef>
+        </p:style>
+        <p:txBody>
+          <a:bodyPr vert="horz" wrap="square" lIns="0" tIns="0" rIns="0" bIns="0" numCol="1" rtlCol="0" anchor="ctr" anchorCtr="0" compatLnSpc="1">
+            <a:prstTxWarp prst="textNoShape">
+              <a:avLst/>
+            </a:prstTxWarp>
+            <a:noAutofit/>
+          </a:bodyPr>
+          <a:lstStyle/>
+          <a:p>
+            <a:pPr algn="ctr" defTabSz="1219170" fontAlgn="base">
+              <a:lnSpc>
+                <a:spcPct val="90000"/>
+              </a:lnSpc>
+              <a:spcBef>
+                <a:spcPct val="0"/>
+              </a:spcBef>
+              <a:spcAft>
+                <a:spcPct val="0"/>
+              </a:spcAft>
+            </a:pPr>
+            <a:r>
+              <a:rPr lang="en-US" sz="1200" dirty="0">
+                <a:solidFill>
+                  <a:schemeClr val="bg1"/>
+                </a:solidFill>
+              </a:rPr>
+              <a:t>5</a:t>
+            </a:r>
+            <a:endParaRPr lang="en-US" sz="667" dirty="0">
+              <a:solidFill>
+                <a:schemeClr val="bg1"/>
+              </a:solidFill>
+            </a:endParaRPr>
+          </a:p>
+        </p:txBody>
+      </p:sp>
+      <p:sp>
+        <p:nvSpPr>
+          <p:cNvPr id="18" name="AutoShape 4">
+            <a:extLst>
+              <a:ext uri="{FF2B5EF4-FFF2-40B4-BE49-F238E27FC236}">
+                <a16:creationId xmlns:a16="http://schemas.microsoft.com/office/drawing/2014/main" id="{CDC99AA8-3A32-6E4A-99DE-489E3056BAE3}"/>
+              </a:ext>
+            </a:extLst>
+          </p:cNvPr>
+          <p:cNvSpPr>
+            <a:spLocks noChangeArrowheads="1"/>
+          </p:cNvSpPr>
+          <p:nvPr/>
+        </p:nvSpPr>
+        <p:spPr bwMode="auto">
+          <a:xfrm>
+            <a:off x="1899331" y="3925562"/>
+            <a:ext cx="3513917" cy="1348479"/>
+          </a:xfrm>
+          <a:prstGeom prst="roundRect">
+            <a:avLst>
+              <a:gd name="adj" fmla="val 7117"/>
+            </a:avLst>
+          </a:prstGeom>
+          <a:noFill/>
+          <a:ln w="12700">
+            <a:solidFill>
+              <a:schemeClr val="accent3"/>
+            </a:solidFill>
+            <a:prstDash val="dash"/>
+            <a:round/>
+            <a:headEnd/>
+            <a:tailEnd/>
+          </a:ln>
+        </p:spPr>
+        <p:txBody>
+          <a:bodyPr lIns="0" tIns="0" rIns="0" bIns="0" anchor="b" anchorCtr="1"/>
+          <a:lstStyle/>
+          <a:p>
+            <a:pPr algn="ctr"/>
+            <a:endParaRPr lang="en-US" sz="1333" dirty="0"/>
+          </a:p>
+        </p:txBody>
+      </p:sp>
+      <p:sp>
+        <p:nvSpPr>
+          <p:cNvPr id="20" name="TextBox 19">
+            <a:extLst>
+              <a:ext uri="{FF2B5EF4-FFF2-40B4-BE49-F238E27FC236}">
+                <a16:creationId xmlns:a16="http://schemas.microsoft.com/office/drawing/2014/main" id="{DBB9557F-8237-544F-8483-B618ED14A2EB}"/>
+              </a:ext>
+            </a:extLst>
+          </p:cNvPr>
+          <p:cNvSpPr txBox="1"/>
+          <p:nvPr/>
+        </p:nvSpPr>
+        <p:spPr>
+          <a:xfrm>
+            <a:off x="2700397" y="4904710"/>
+            <a:ext cx="1967270" cy="369332"/>
+          </a:xfrm>
+          <a:prstGeom prst="rect">
+            <a:avLst/>
+          </a:prstGeom>
+          <a:noFill/>
+        </p:spPr>
+        <p:txBody>
+          <a:bodyPr wrap="none" rtlCol="0">
+            <a:spAutoFit/>
+          </a:bodyPr>
+          <a:lstStyle/>
+          <a:p>
+            <a:r>
+              <a:rPr lang="en-US" dirty="0">
+                <a:solidFill>
+                  <a:schemeClr val="accent1">
+                    <a:lumMod val="25000"/>
+                  </a:schemeClr>
+                </a:solidFill>
+              </a:rPr>
+              <a:t>reeferTelemetries</a:t>
+            </a:r>
+          </a:p>
+        </p:txBody>
+      </p:sp>
+      <p:pic>
+        <p:nvPicPr>
+          <p:cNvPr id="22" name="Picture 21">
+            <a:extLst>
+              <a:ext uri="{FF2B5EF4-FFF2-40B4-BE49-F238E27FC236}">
+                <a16:creationId xmlns:a16="http://schemas.microsoft.com/office/drawing/2014/main" id="{1B16228E-748D-5644-91F6-79288C7462BE}"/>
+              </a:ext>
+            </a:extLst>
+          </p:cNvPr>
+          <p:cNvPicPr>
+            <a:picLocks noChangeAspect="1"/>
+          </p:cNvPicPr>
+          <p:nvPr/>
+        </p:nvPicPr>
+        <p:blipFill>
+          <a:blip r:embed="rId2">
+            <a:extLst>
+              <a:ext uri="{28A0092B-C50C-407E-A947-70E740481C1C}">
+                <a14:useLocalDpi xmlns:a14="http://schemas.microsoft.com/office/drawing/2010/main" val="0"/>
+              </a:ext>
+            </a:extLst>
+          </a:blip>
+          <a:stretch>
+            <a:fillRect/>
+          </a:stretch>
+        </p:blipFill>
+        <p:spPr>
+          <a:xfrm>
+            <a:off x="1904609" y="3930860"/>
+            <a:ext cx="523018" cy="690721"/>
+          </a:xfrm>
+          <a:prstGeom prst="rect">
+            <a:avLst/>
+          </a:prstGeom>
+        </p:spPr>
+      </p:pic>
+      <p:pic>
+        <p:nvPicPr>
+          <p:cNvPr id="24" name="Picture 40">
+            <a:extLst>
+              <a:ext uri="{FF2B5EF4-FFF2-40B4-BE49-F238E27FC236}">
+                <a16:creationId xmlns:a16="http://schemas.microsoft.com/office/drawing/2014/main" id="{E8EEB410-07EC-D848-92F0-6380D4A64C59}"/>
+              </a:ext>
+            </a:extLst>
+          </p:cNvPr>
+          <p:cNvPicPr>
+            <a:picLocks noChangeAspect="1"/>
+          </p:cNvPicPr>
+          <p:nvPr/>
+        </p:nvPicPr>
+        <p:blipFill>
+          <a:blip r:embed="rId3">
+            <a:extLst>
+              <a:ext uri="{28A0092B-C50C-407E-A947-70E740481C1C}">
+                <a14:useLocalDpi xmlns:a14="http://schemas.microsoft.com/office/drawing/2010/main" val="0"/>
+              </a:ext>
+            </a:extLst>
+          </a:blip>
+          <a:srcRect/>
+          <a:stretch>
+            <a:fillRect/>
+          </a:stretch>
+        </p:blipFill>
+        <p:spPr bwMode="auto">
+          <a:xfrm>
+            <a:off x="1366480" y="5093585"/>
+            <a:ext cx="1099134" cy="407338"/>
+          </a:xfrm>
+          <a:prstGeom prst="rect">
+            <a:avLst/>
+          </a:prstGeom>
+          <a:noFill/>
+          <a:ln>
+            <a:noFill/>
+          </a:ln>
+          <a:extLst>
+            <a:ext uri="{909E8E84-426E-40DD-AFC4-6F175D3DCCD1}">
+              <a14:hiddenFill xmlns:a14="http://schemas.microsoft.com/office/drawing/2010/main">
+                <a:solidFill>
+                  <a:srgbClr val="FFFFFF"/>
+                </a:solidFill>
+              </a14:hiddenFill>
+            </a:ext>
+            <a:ext uri="{91240B29-F687-4F45-9708-019B960494DF}">
+              <a14:hiddenLine xmlns:a14="http://schemas.microsoft.com/office/drawing/2010/main" w="9525">
+                <a:solidFill>
+                  <a:srgbClr val="000000"/>
+                </a:solidFill>
+                <a:miter lim="800000"/>
+                <a:headEnd/>
+                <a:tailEnd/>
+              </a14:hiddenLine>
+            </a:ext>
+          </a:extLst>
+        </p:spPr>
+      </p:pic>
+      <p:pic>
+        <p:nvPicPr>
+          <p:cNvPr id="25" name="Picture 40">
+            <a:extLst>
+              <a:ext uri="{FF2B5EF4-FFF2-40B4-BE49-F238E27FC236}">
+                <a16:creationId xmlns:a16="http://schemas.microsoft.com/office/drawing/2014/main" id="{6CF0C2DA-CD62-0F4A-B6D7-15B98EF785FA}"/>
+              </a:ext>
+            </a:extLst>
+          </p:cNvPr>
+          <p:cNvPicPr>
+            <a:picLocks noChangeAspect="1"/>
+          </p:cNvPicPr>
+          <p:nvPr/>
+        </p:nvPicPr>
+        <p:blipFill>
+          <a:blip r:embed="rId3">
+            <a:extLst>
+              <a:ext uri="{28A0092B-C50C-407E-A947-70E740481C1C}">
+                <a14:useLocalDpi xmlns:a14="http://schemas.microsoft.com/office/drawing/2010/main" val="0"/>
+              </a:ext>
+            </a:extLst>
+          </a:blip>
+          <a:srcRect/>
+          <a:stretch>
+            <a:fillRect/>
+          </a:stretch>
+        </p:blipFill>
+        <p:spPr bwMode="auto">
+          <a:xfrm>
+            <a:off x="116601" y="2734597"/>
+            <a:ext cx="1099134" cy="407338"/>
+          </a:xfrm>
+          <a:prstGeom prst="rect">
+            <a:avLst/>
+          </a:prstGeom>
+          <a:noFill/>
+          <a:ln>
+            <a:noFill/>
+          </a:ln>
+          <a:extLst>
+            <a:ext uri="{909E8E84-426E-40DD-AFC4-6F175D3DCCD1}">
+              <a14:hiddenFill xmlns:a14="http://schemas.microsoft.com/office/drawing/2010/main">
+                <a:solidFill>
+                  <a:srgbClr val="FFFFFF"/>
+                </a:solidFill>
+              </a14:hiddenFill>
+            </a:ext>
+            <a:ext uri="{91240B29-F687-4F45-9708-019B960494DF}">
+              <a14:hiddenLine xmlns:a14="http://schemas.microsoft.com/office/drawing/2010/main" w="9525">
+                <a:solidFill>
+                  <a:srgbClr val="000000"/>
+                </a:solidFill>
+                <a:miter lim="800000"/>
+                <a:headEnd/>
+                <a:tailEnd/>
+              </a14:hiddenLine>
+            </a:ext>
+          </a:extLst>
+        </p:spPr>
+      </p:pic>
+      <p:sp>
+        <p:nvSpPr>
+          <p:cNvPr id="27" name="Rounded Rectangle 26">
+            <a:extLst>
+              <a:ext uri="{FF2B5EF4-FFF2-40B4-BE49-F238E27FC236}">
+                <a16:creationId xmlns:a16="http://schemas.microsoft.com/office/drawing/2014/main" id="{E472D71D-D4D6-9743-8082-F5CD0C08D2B8}"/>
+              </a:ext>
+            </a:extLst>
+          </p:cNvPr>
+          <p:cNvSpPr/>
+          <p:nvPr/>
+        </p:nvSpPr>
+        <p:spPr>
+          <a:xfrm>
+            <a:off x="6455197" y="1357868"/>
+            <a:ext cx="1749097" cy="373542"/>
+          </a:xfrm>
+          <a:prstGeom prst="roundRect">
+            <a:avLst>
+              <a:gd name="adj" fmla="val 9717"/>
+            </a:avLst>
+          </a:prstGeom>
+          <a:noFill/>
+          <a:ln w="12700">
+            <a:solidFill>
+              <a:schemeClr val="tx2">
+                <a:lumMod val="50000"/>
+              </a:schemeClr>
+            </a:solidFill>
+          </a:ln>
+          <a:effectLst/>
+        </p:spPr>
+        <p:style>
+          <a:lnRef idx="1">
+            <a:schemeClr val="dk1"/>
+          </a:lnRef>
+          <a:fillRef idx="2">
+            <a:schemeClr val="dk1"/>
+          </a:fillRef>
+          <a:effectRef idx="1">
+            <a:schemeClr val="dk1"/>
+          </a:effectRef>
+          <a:fontRef idx="minor">
+            <a:schemeClr val="dk1"/>
+          </a:fontRef>
+        </p:style>
+        <p:txBody>
+          <a:bodyPr rot="0" spcFirstLastPara="0" vertOverflow="overflow" horzOverflow="overflow" vert="horz" wrap="square" lIns="0" tIns="0" rIns="0" bIns="0" numCol="1" spcCol="0" rtlCol="0" fromWordArt="0" anchor="t" anchorCtr="0" forceAA="0" compatLnSpc="1">
+            <a:prstTxWarp prst="textNoShape">
+              <a:avLst/>
+            </a:prstTxWarp>
+            <a:noAutofit/>
+          </a:bodyPr>
+          <a:lstStyle/>
+          <a:p>
+            <a:r>
+              <a:rPr lang="en-US" sz="1200" baseline="0" dirty="0">
+                <a:solidFill>
+                  <a:schemeClr val="tx1"/>
+                </a:solidFill>
+                <a:latin typeface="IBM Plex Sans" panose="020B0503050203000203" pitchFamily="34" charset="77"/>
+                <a:cs typeface="Arial"/>
+              </a:rPr>
+              <a:t>Kafka Consumer</a:t>
+            </a:r>
+          </a:p>
+        </p:txBody>
+      </p:sp>
+      <p:cxnSp>
+        <p:nvCxnSpPr>
+          <p:cNvPr id="46" name="Elbow Connector 45">
+            <a:extLst>
+              <a:ext uri="{FF2B5EF4-FFF2-40B4-BE49-F238E27FC236}">
+                <a16:creationId xmlns:a16="http://schemas.microsoft.com/office/drawing/2014/main" id="{B815F1F6-8EC9-A547-951A-6A6BA26A1B3E}"/>
+              </a:ext>
+            </a:extLst>
+          </p:cNvPr>
+          <p:cNvCxnSpPr>
+            <a:stCxn id="9" idx="3"/>
+            <a:endCxn id="15" idx="0"/>
+          </p:cNvCxnSpPr>
+          <p:nvPr/>
+        </p:nvCxnSpPr>
+        <p:spPr>
+          <a:xfrm>
+            <a:off x="2465614" y="2073727"/>
+            <a:ext cx="1633754" cy="2144132"/>
+          </a:xfrm>
+          <a:prstGeom prst="bentConnector2">
+            <a:avLst/>
+          </a:prstGeom>
+          <a:ln>
+            <a:solidFill>
+              <a:schemeClr val="accent6"/>
+            </a:solidFill>
+            <a:tailEnd type="triangle"/>
+          </a:ln>
+          <a:effectLst/>
+        </p:spPr>
+        <p:style>
+          <a:lnRef idx="2">
+            <a:schemeClr val="accent1"/>
+          </a:lnRef>
+          <a:fillRef idx="0">
+            <a:schemeClr val="accent1"/>
+          </a:fillRef>
+          <a:effectRef idx="1">
+            <a:schemeClr val="accent1"/>
+          </a:effectRef>
+          <a:fontRef idx="minor">
+            <a:schemeClr val="tx1"/>
+          </a:fontRef>
+        </p:style>
+      </p:cxnSp>
+      <p:sp>
+        <p:nvSpPr>
+          <p:cNvPr id="59" name="Can 58">
+            <a:extLst>
+              <a:ext uri="{FF2B5EF4-FFF2-40B4-BE49-F238E27FC236}">
+                <a16:creationId xmlns:a16="http://schemas.microsoft.com/office/drawing/2014/main" id="{BF8D5F17-7886-6A49-A326-AB3283F367DA}"/>
+              </a:ext>
+            </a:extLst>
+          </p:cNvPr>
+          <p:cNvSpPr/>
+          <p:nvPr/>
+        </p:nvSpPr>
+        <p:spPr>
+          <a:xfrm>
+            <a:off x="6215189" y="3898535"/>
+            <a:ext cx="895875" cy="695584"/>
+          </a:xfrm>
+          <a:prstGeom prst="can">
+            <a:avLst/>
+          </a:prstGeom>
+          <a:solidFill>
+            <a:schemeClr val="accent5">
+              <a:lumMod val="75000"/>
+            </a:schemeClr>
+          </a:solidFill>
+          <a:ln>
+            <a:noFill/>
+          </a:ln>
+        </p:spPr>
+        <p:style>
+          <a:lnRef idx="2">
+            <a:schemeClr val="accent1">
+              <a:shade val="50000"/>
+            </a:schemeClr>
+          </a:lnRef>
+          <a:fillRef idx="1">
+            <a:schemeClr val="accent1"/>
+          </a:fillRef>
+          <a:effectRef idx="0">
+            <a:schemeClr val="accent1"/>
+          </a:effectRef>
+          <a:fontRef idx="minor">
+            <a:schemeClr val="lt1"/>
+          </a:fontRef>
+        </p:style>
+        <p:txBody>
+          <a:bodyPr rtlCol="0" anchor="ctr"/>
+          <a:lstStyle/>
+          <a:p>
+            <a:pPr algn="ctr"/>
+            <a:r>
+              <a:rPr lang="en-US" sz="1000" dirty="0"/>
+              <a:t>Reefers Inventory</a:t>
+            </a:r>
+          </a:p>
+        </p:txBody>
+      </p:sp>
+      <p:cxnSp>
+        <p:nvCxnSpPr>
+          <p:cNvPr id="71" name="Elbow Connector 70">
+            <a:extLst>
+              <a:ext uri="{FF2B5EF4-FFF2-40B4-BE49-F238E27FC236}">
+                <a16:creationId xmlns:a16="http://schemas.microsoft.com/office/drawing/2014/main" id="{9B3950A4-1025-DB48-B886-5945ADD35206}"/>
+              </a:ext>
+            </a:extLst>
+          </p:cNvPr>
+          <p:cNvCxnSpPr>
+            <a:cxnSpLocks/>
+            <a:stCxn id="27" idx="1"/>
+            <a:endCxn id="10" idx="0"/>
+          </p:cNvCxnSpPr>
+          <p:nvPr/>
+        </p:nvCxnSpPr>
+        <p:spPr>
+          <a:xfrm rot="10800000" flipV="1">
+            <a:off x="2889775" y="1544639"/>
+            <a:ext cx="3565422" cy="2673220"/>
+          </a:xfrm>
+          <a:prstGeom prst="bentConnector2">
+            <a:avLst/>
+          </a:prstGeom>
+          <a:ln>
+            <a:solidFill>
+              <a:srgbClr val="7030A0"/>
+            </a:solidFill>
+            <a:tailEnd type="triangle"/>
+          </a:ln>
+          <a:effectLst/>
+        </p:spPr>
+        <p:style>
+          <a:lnRef idx="2">
+            <a:schemeClr val="accent1"/>
+          </a:lnRef>
+          <a:fillRef idx="0">
+            <a:schemeClr val="accent1"/>
+          </a:fillRef>
+          <a:effectRef idx="1">
+            <a:schemeClr val="accent1"/>
+          </a:effectRef>
+          <a:fontRef idx="minor">
+            <a:schemeClr val="tx1"/>
+          </a:fontRef>
+        </p:style>
+      </p:cxnSp>
+      <p:sp>
+        <p:nvSpPr>
+          <p:cNvPr id="45" name="Rounded Rectangle 44">
+            <a:extLst>
+              <a:ext uri="{FF2B5EF4-FFF2-40B4-BE49-F238E27FC236}">
+                <a16:creationId xmlns:a16="http://schemas.microsoft.com/office/drawing/2014/main" id="{F495E1A9-5EC6-5446-ACF5-3911A287BB83}"/>
+              </a:ext>
+            </a:extLst>
+          </p:cNvPr>
+          <p:cNvSpPr/>
+          <p:nvPr/>
+        </p:nvSpPr>
+        <p:spPr>
+          <a:xfrm>
+            <a:off x="6478199" y="1913633"/>
+            <a:ext cx="1749097" cy="373542"/>
+          </a:xfrm>
+          <a:prstGeom prst="roundRect">
+            <a:avLst>
+              <a:gd name="adj" fmla="val 9717"/>
+            </a:avLst>
+          </a:prstGeom>
+          <a:noFill/>
+          <a:ln w="12700">
+            <a:solidFill>
+              <a:schemeClr val="tx2">
+                <a:lumMod val="50000"/>
+              </a:schemeClr>
+            </a:solidFill>
+          </a:ln>
+          <a:effectLst/>
+        </p:spPr>
+        <p:style>
+          <a:lnRef idx="1">
+            <a:schemeClr val="dk1"/>
+          </a:lnRef>
+          <a:fillRef idx="2">
+            <a:schemeClr val="dk1"/>
+          </a:fillRef>
+          <a:effectRef idx="1">
+            <a:schemeClr val="dk1"/>
+          </a:effectRef>
+          <a:fontRef idx="minor">
+            <a:schemeClr val="dk1"/>
+          </a:fontRef>
+        </p:style>
+        <p:txBody>
+          <a:bodyPr rot="0" spcFirstLastPara="0" vertOverflow="overflow" horzOverflow="overflow" vert="horz" wrap="square" lIns="0" tIns="0" rIns="0" bIns="0" numCol="1" spcCol="0" rtlCol="0" fromWordArt="0" anchor="t" anchorCtr="0" forceAA="0" compatLnSpc="1">
+            <a:prstTxWarp prst="textNoShape">
+              <a:avLst/>
+            </a:prstTxWarp>
+            <a:noAutofit/>
+          </a:bodyPr>
+          <a:lstStyle/>
+          <a:p>
+            <a:r>
+              <a:rPr lang="en-US" sz="1200" baseline="0" dirty="0">
+                <a:solidFill>
+                  <a:schemeClr val="tx1"/>
+                </a:solidFill>
+                <a:latin typeface="IBM Plex Sans" panose="020B0503050203000203" pitchFamily="34" charset="77"/>
+                <a:cs typeface="Arial"/>
+              </a:rPr>
+              <a:t>Pandas DF</a:t>
+            </a:r>
+          </a:p>
+        </p:txBody>
+      </p:sp>
+      <p:sp>
+        <p:nvSpPr>
+          <p:cNvPr id="23" name="Can 22">
+            <a:extLst>
+              <a:ext uri="{FF2B5EF4-FFF2-40B4-BE49-F238E27FC236}">
+                <a16:creationId xmlns:a16="http://schemas.microsoft.com/office/drawing/2014/main" id="{E1EF536B-5978-0D45-B1D4-059E49B20183}"/>
+              </a:ext>
+            </a:extLst>
+          </p:cNvPr>
+          <p:cNvSpPr/>
+          <p:nvPr/>
+        </p:nvSpPr>
+        <p:spPr>
+          <a:xfrm>
+            <a:off x="7223460" y="3898535"/>
+            <a:ext cx="895875" cy="695584"/>
+          </a:xfrm>
+          <a:prstGeom prst="can">
+            <a:avLst/>
+          </a:prstGeom>
+          <a:solidFill>
+            <a:schemeClr val="accent5">
+              <a:lumMod val="75000"/>
+            </a:schemeClr>
+          </a:solidFill>
+          <a:ln>
+            <a:noFill/>
+          </a:ln>
+        </p:spPr>
+        <p:style>
+          <a:lnRef idx="2">
+            <a:schemeClr val="accent1">
+              <a:shade val="50000"/>
+            </a:schemeClr>
+          </a:lnRef>
+          <a:fillRef idx="1">
+            <a:schemeClr val="accent1"/>
+          </a:fillRef>
+          <a:effectRef idx="0">
+            <a:schemeClr val="accent1"/>
+          </a:effectRef>
+          <a:fontRef idx="minor">
+            <a:schemeClr val="lt1"/>
+          </a:fontRef>
+        </p:style>
+        <p:txBody>
+          <a:bodyPr rtlCol="0" anchor="ctr"/>
+          <a:lstStyle/>
+          <a:p>
+            <a:pPr algn="ctr"/>
+            <a:r>
+              <a:rPr lang="en-US" sz="1000" dirty="0"/>
+              <a:t>Products</a:t>
+            </a:r>
+          </a:p>
+        </p:txBody>
+      </p:sp>
+      <p:pic>
+        <p:nvPicPr>
+          <p:cNvPr id="26" name="Picture 25">
+            <a:extLst>
+              <a:ext uri="{FF2B5EF4-FFF2-40B4-BE49-F238E27FC236}">
+                <a16:creationId xmlns:a16="http://schemas.microsoft.com/office/drawing/2014/main" id="{509913A5-E445-C54D-8C8A-64EA88153B4B}"/>
+              </a:ext>
+            </a:extLst>
+          </p:cNvPr>
+          <p:cNvPicPr>
+            <a:picLocks noChangeAspect="1"/>
+          </p:cNvPicPr>
+          <p:nvPr/>
+        </p:nvPicPr>
+        <p:blipFill>
+          <a:blip r:embed="rId4"/>
+          <a:stretch>
+            <a:fillRect/>
+          </a:stretch>
+        </p:blipFill>
+        <p:spPr>
+          <a:xfrm>
+            <a:off x="8048469" y="4322790"/>
+            <a:ext cx="638156" cy="680700"/>
+          </a:xfrm>
+          <a:prstGeom prst="rect">
+            <a:avLst/>
+          </a:prstGeom>
+        </p:spPr>
+      </p:pic>
+    </p:spTree>
+    <p:extLst>
+      <p:ext uri="{BB962C8B-B14F-4D97-AF65-F5344CB8AC3E}">
+        <p14:creationId xmlns:p14="http://schemas.microsoft.com/office/powerpoint/2010/main" val="187512266"/>
+      </p:ext>
+    </p:extLst>
+  </p:cSld>
+  <p:clrMapOvr>
+    <a:masterClrMapping/>
+  </p:clrMapOvr>
+</p:sld>
+</file>
+
 <file path=ppt/slides/slide2.xml><?xml version="1.0" encoding="utf-8"?>
 <p:sld xmlns:a="http://schemas.openxmlformats.org/drawingml/2006/main" xmlns:r="http://schemas.openxmlformats.org/officeDocument/2006/relationships" xmlns:p="http://schemas.openxmlformats.org/presentationml/2006/main">
   <p:cSld>
@@ -9450,6 +10828,36 @@
           <a:xfrm>
             <a:off x="1123940" y="4575227"/>
             <a:ext cx="1195924" cy="361792"/>
+          </a:xfrm>
+          <a:prstGeom prst="rect">
+            <a:avLst/>
+          </a:prstGeom>
+        </p:spPr>
+      </p:pic>
+      <p:pic>
+        <p:nvPicPr>
+          <p:cNvPr id="24" name="Picture 23">
+            <a:extLst>
+              <a:ext uri="{FF2B5EF4-FFF2-40B4-BE49-F238E27FC236}">
+                <a16:creationId xmlns:a16="http://schemas.microsoft.com/office/drawing/2014/main" id="{D23490B7-7739-3A4D-8CCE-331B3ECBCFB8}"/>
+              </a:ext>
+            </a:extLst>
+          </p:cNvPr>
+          <p:cNvPicPr>
+            <a:picLocks noChangeAspect="1"/>
+          </p:cNvPicPr>
+          <p:nvPr/>
+        </p:nvPicPr>
+        <p:blipFill>
+          <a:blip r:embed="rId10"/>
+          <a:stretch>
+            <a:fillRect/>
+          </a:stretch>
+        </p:blipFill>
+        <p:spPr>
+          <a:xfrm flipV="1">
+            <a:off x="147562" y="1954047"/>
+            <a:ext cx="1344689" cy="880532"/>
           </a:xfrm>
           <a:prstGeom prst="rect">
             <a:avLst/>
@@ -11856,36 +13264,6 @@
           </a:prstGeom>
         </p:spPr>
       </p:pic>
-      <p:pic>
-        <p:nvPicPr>
-          <p:cNvPr id="10" name="Picture 9">
-            <a:extLst>
-              <a:ext uri="{FF2B5EF4-FFF2-40B4-BE49-F238E27FC236}">
-                <a16:creationId xmlns:a16="http://schemas.microsoft.com/office/drawing/2014/main" id="{4FF7CDD6-DEE4-4A47-A599-1E0576D6D906}"/>
-              </a:ext>
-            </a:extLst>
-          </p:cNvPr>
-          <p:cNvPicPr>
-            <a:picLocks noChangeAspect="1"/>
-          </p:cNvPicPr>
-          <p:nvPr/>
-        </p:nvPicPr>
-        <p:blipFill>
-          <a:blip r:embed="rId10"/>
-          <a:stretch>
-            <a:fillRect/>
-          </a:stretch>
-        </p:blipFill>
-        <p:spPr>
-          <a:xfrm>
-            <a:off x="1061125" y="2190079"/>
-            <a:ext cx="1176988" cy="238442"/>
-          </a:xfrm>
-          <a:prstGeom prst="rect">
-            <a:avLst/>
-          </a:prstGeom>
-        </p:spPr>
-      </p:pic>
       <p:sp>
         <p:nvSpPr>
           <p:cNvPr id="16" name="Can 15">
@@ -12096,7 +13474,7 @@
             <p:nvPr/>
           </p:nvPicPr>
           <p:blipFill>
-            <a:blip r:embed="rId11">
+            <a:blip r:embed="rId10">
               <a:extLst>
                 <a:ext uri="{28A0092B-C50C-407E-A947-70E740481C1C}">
                   <a14:useLocalDpi xmlns:a14="http://schemas.microsoft.com/office/drawing/2010/main" val="0"/>
@@ -12518,7 +13896,7 @@
           <p:nvPr/>
         </p:nvPicPr>
         <p:blipFill>
-          <a:blip r:embed="rId12"/>
+          <a:blip r:embed="rId11"/>
           <a:stretch>
             <a:fillRect/>
           </a:stretch>
@@ -12609,7 +13987,7 @@
           <p:nvPr/>
         </p:nvPicPr>
         <p:blipFill>
-          <a:blip r:embed="rId12"/>
+          <a:blip r:embed="rId11"/>
           <a:stretch>
             <a:fillRect/>
           </a:stretch>
@@ -13321,6 +14699,121 @@
 </file>
 
 <file path=ppt/slides/slide5.xml><?xml version="1.0" encoding="utf-8"?>
+<p:sld xmlns:a="http://schemas.openxmlformats.org/drawingml/2006/main" xmlns:r="http://schemas.openxmlformats.org/officeDocument/2006/relationships" xmlns:p="http://schemas.openxmlformats.org/presentationml/2006/main">
+  <p:cSld>
+    <p:spTree>
+      <p:nvGrpSpPr>
+        <p:cNvPr id="1" name=""/>
+        <p:cNvGrpSpPr/>
+        <p:nvPr/>
+      </p:nvGrpSpPr>
+      <p:grpSpPr>
+        <a:xfrm>
+          <a:off x="0" y="0"/>
+          <a:ext cx="0" cy="0"/>
+          <a:chOff x="0" y="0"/>
+          <a:chExt cx="0" cy="0"/>
+        </a:xfrm>
+      </p:grpSpPr>
+      <p:sp>
+        <p:nvSpPr>
+          <p:cNvPr id="2" name="Title 1">
+            <a:extLst>
+              <a:ext uri="{FF2B5EF4-FFF2-40B4-BE49-F238E27FC236}">
+                <a16:creationId xmlns:a16="http://schemas.microsoft.com/office/drawing/2014/main" id="{2B3C093B-DB50-494E-8EB9-A5D4DC4AEF37}"/>
+              </a:ext>
+            </a:extLst>
+          </p:cNvPr>
+          <p:cNvSpPr>
+            <a:spLocks noGrp="1"/>
+          </p:cNvSpPr>
+          <p:nvPr>
+            <p:ph type="title"/>
+          </p:nvPr>
+        </p:nvSpPr>
+        <p:spPr/>
+        <p:txBody>
+          <a:bodyPr/>
+          <a:lstStyle/>
+          <a:p>
+            <a:r>
+              <a:rPr lang="en-US" dirty="0" err="1"/>
+              <a:t>Appsody</a:t>
+            </a:r>
+            <a:endParaRPr lang="en-US" dirty="0"/>
+          </a:p>
+        </p:txBody>
+      </p:sp>
+      <p:sp>
+        <p:nvSpPr>
+          <p:cNvPr id="3" name="Text Placeholder 2">
+            <a:extLst>
+              <a:ext uri="{FF2B5EF4-FFF2-40B4-BE49-F238E27FC236}">
+                <a16:creationId xmlns:a16="http://schemas.microsoft.com/office/drawing/2014/main" id="{61ECDA16-45FC-4F49-AFD3-A46856EC19B8}"/>
+              </a:ext>
+            </a:extLst>
+          </p:cNvPr>
+          <p:cNvSpPr>
+            <a:spLocks noGrp="1"/>
+          </p:cNvSpPr>
+          <p:nvPr>
+            <p:ph type="body" idx="1"/>
+          </p:nvPr>
+        </p:nvSpPr>
+        <p:spPr/>
+        <p:txBody>
+          <a:bodyPr/>
+          <a:lstStyle/>
+          <a:p>
+            <a:endParaRPr lang="en-US"/>
+          </a:p>
+        </p:txBody>
+      </p:sp>
+      <p:sp>
+        <p:nvSpPr>
+          <p:cNvPr id="4" name="Slide Number Placeholder 3">
+            <a:extLst>
+              <a:ext uri="{FF2B5EF4-FFF2-40B4-BE49-F238E27FC236}">
+                <a16:creationId xmlns:a16="http://schemas.microsoft.com/office/drawing/2014/main" id="{FB64EE56-7B66-9840-8080-61D448CD3BDC}"/>
+              </a:ext>
+            </a:extLst>
+          </p:cNvPr>
+          <p:cNvSpPr>
+            <a:spLocks noGrp="1"/>
+          </p:cNvSpPr>
+          <p:nvPr>
+            <p:ph type="sldNum" sz="quarter" idx="2"/>
+          </p:nvPr>
+        </p:nvSpPr>
+        <p:spPr/>
+        <p:txBody>
+          <a:bodyPr/>
+          <a:lstStyle/>
+          <a:p>
+            <a:fld id="{86CB4B4D-7CA3-9044-876B-883B54F8677D}" type="slidenum">
+              <a:rPr lang="en-US" smtClean="0"/>
+              <a:pPr/>
+              <a:t>5</a:t>
+            </a:fld>
+            <a:endParaRPr lang="en-US"/>
+          </a:p>
+        </p:txBody>
+      </p:sp>
+    </p:spTree>
+    <p:extLst>
+      <p:ext uri="{BB962C8B-B14F-4D97-AF65-F5344CB8AC3E}">
+        <p14:creationId xmlns:p14="http://schemas.microsoft.com/office/powerpoint/2010/main" val="2209636817"/>
+      </p:ext>
+    </p:extLst>
+  </p:cSld>
+  <p:clrMapOvr>
+    <a:masterClrMapping/>
+  </p:clrMapOvr>
+  <p:transition spd="med"/>
+</p:sld>
+</file>
+
+<file path=ppt/slides/slide6.xml><?xml version="1.0" encoding="utf-8"?>
 <p:sld xmlns:a="http://schemas.openxmlformats.org/drawingml/2006/main" xmlns:r="http://schemas.openxmlformats.org/officeDocument/2006/relationships" xmlns:p="http://schemas.openxmlformats.org/presentationml/2006/main">
   <p:cSld>
     <p:spTree>
@@ -18245,7 +19738,7 @@
 </p:sld>
 </file>
 
-<file path=ppt/slides/slide6.xml><?xml version="1.0" encoding="utf-8"?>
+<file path=ppt/slides/slide7.xml><?xml version="1.0" encoding="utf-8"?>
 <p:sld xmlns:a="http://schemas.openxmlformats.org/drawingml/2006/main" xmlns:r="http://schemas.openxmlformats.org/officeDocument/2006/relationships" xmlns:p="http://schemas.openxmlformats.org/presentationml/2006/main">
   <p:cSld>
     <p:spTree>
@@ -18475,7 +19968,7 @@
                 </a:solidFill>
               </a:rPr>
               <a:pPr/>
-              <a:t>6</a:t>
+              <a:t>7</a:t>
             </a:fld>
             <a:endParaRPr lang="en-US">
               <a:solidFill>
@@ -21557,7 +23050,7 @@
 </p:sld>
 </file>
 
-<file path=ppt/slides/slide7.xml><?xml version="1.0" encoding="utf-8"?>
+<file path=ppt/slides/slide8.xml><?xml version="1.0" encoding="utf-8"?>
 <p:sld xmlns:a="http://schemas.openxmlformats.org/drawingml/2006/main" xmlns:r="http://schemas.openxmlformats.org/officeDocument/2006/relationships" xmlns:p="http://schemas.openxmlformats.org/presentationml/2006/main">
   <p:cSld>
     <p:spTree>
@@ -21787,7 +23280,7 @@
                 </a:solidFill>
               </a:rPr>
               <a:pPr/>
-              <a:t>7</a:t>
+              <a:t>8</a:t>
             </a:fld>
             <a:endParaRPr lang="en-US">
               <a:solidFill>
@@ -24869,7 +26362,7 @@
 </p:sld>
 </file>
 
-<file path=ppt/slides/slide8.xml><?xml version="1.0" encoding="utf-8"?>
+<file path=ppt/slides/slide9.xml><?xml version="1.0" encoding="utf-8"?>
 <p:sld xmlns:a="http://schemas.openxmlformats.org/drawingml/2006/main" xmlns:r="http://schemas.openxmlformats.org/officeDocument/2006/relationships" xmlns:p="http://schemas.openxmlformats.org/presentationml/2006/main">
   <p:cSld>
     <p:spTree>
@@ -24944,7 +26437,7 @@
           <a:p>
             <a:fld id="{C565C23E-6D76-459C-BC14-A9049E4EE889}" type="slidenum">
               <a:rPr lang="en-US" smtClean="0"/>
-              <a:t>8</a:t>
+              <a:t>9</a:t>
             </a:fld>
             <a:endParaRPr lang="en-US"/>
           </a:p>
@@ -26658,1383 +28151,6 @@
     <p:extLst>
       <p:ext uri="{BB962C8B-B14F-4D97-AF65-F5344CB8AC3E}">
         <p14:creationId xmlns:p14="http://schemas.microsoft.com/office/powerpoint/2010/main" val="3696044975"/>
-      </p:ext>
-    </p:extLst>
-  </p:cSld>
-  <p:clrMapOvr>
-    <a:masterClrMapping/>
-  </p:clrMapOvr>
-</p:sld>
-</file>
-
-<file path=ppt/slides/slide9.xml><?xml version="1.0" encoding="utf-8"?>
-<p:sld xmlns:a="http://schemas.openxmlformats.org/drawingml/2006/main" xmlns:r="http://schemas.openxmlformats.org/officeDocument/2006/relationships" xmlns:p="http://schemas.openxmlformats.org/presentationml/2006/main">
-  <p:cSld>
-    <p:spTree>
-      <p:nvGrpSpPr>
-        <p:cNvPr id="1" name=""/>
-        <p:cNvGrpSpPr/>
-        <p:nvPr/>
-      </p:nvGrpSpPr>
-      <p:grpSpPr>
-        <a:xfrm>
-          <a:off x="0" y="0"/>
-          <a:ext cx="0" cy="0"/>
-          <a:chOff x="0" y="0"/>
-          <a:chExt cx="0" cy="0"/>
-        </a:xfrm>
-      </p:grpSpPr>
-      <p:sp>
-        <p:nvSpPr>
-          <p:cNvPr id="2" name="Title 1">
-            <a:extLst>
-              <a:ext uri="{FF2B5EF4-FFF2-40B4-BE49-F238E27FC236}">
-                <a16:creationId xmlns:a16="http://schemas.microsoft.com/office/drawing/2014/main" id="{83D72B5A-D2BF-0F41-AB02-0E3504265F76}"/>
-              </a:ext>
-            </a:extLst>
-          </p:cNvPr>
-          <p:cNvSpPr>
-            <a:spLocks noGrp="1"/>
-          </p:cNvSpPr>
-          <p:nvPr>
-            <p:ph type="title"/>
-          </p:nvPr>
-        </p:nvSpPr>
-        <p:spPr>
-          <a:xfrm>
-            <a:off x="288633" y="208582"/>
-            <a:ext cx="10515600" cy="521140"/>
-          </a:xfrm>
-        </p:spPr>
-        <p:txBody>
-          <a:bodyPr>
-            <a:normAutofit/>
-          </a:bodyPr>
-          <a:lstStyle/>
-          <a:p>
-            <a:r>
-              <a:rPr lang="en-US" sz="2400" dirty="0"/>
-              <a:t>Event Stream As Event Store for ML</a:t>
-            </a:r>
-          </a:p>
-        </p:txBody>
-      </p:sp>
-      <p:sp>
-        <p:nvSpPr>
-          <p:cNvPr id="4" name="Slide Number Placeholder 3">
-            <a:extLst>
-              <a:ext uri="{FF2B5EF4-FFF2-40B4-BE49-F238E27FC236}">
-                <a16:creationId xmlns:a16="http://schemas.microsoft.com/office/drawing/2014/main" id="{B1D66A27-027F-EA4A-B9BD-D02849496229}"/>
-              </a:ext>
-            </a:extLst>
-          </p:cNvPr>
-          <p:cNvSpPr>
-            <a:spLocks noGrp="1"/>
-          </p:cNvSpPr>
-          <p:nvPr>
-            <p:ph type="sldNum" sz="quarter" idx="12"/>
-          </p:nvPr>
-        </p:nvSpPr>
-        <p:spPr/>
-        <p:txBody>
-          <a:bodyPr/>
-          <a:lstStyle/>
-          <a:p>
-            <a:fld id="{C565C23E-6D76-459C-BC14-A9049E4EE889}" type="slidenum">
-              <a:rPr lang="en-US" smtClean="0"/>
-              <a:t>9</a:t>
-            </a:fld>
-            <a:endParaRPr lang="en-US"/>
-          </a:p>
-        </p:txBody>
-      </p:sp>
-      <p:sp>
-        <p:nvSpPr>
-          <p:cNvPr id="6" name="Rectangle 5">
-            <a:extLst>
-              <a:ext uri="{FF2B5EF4-FFF2-40B4-BE49-F238E27FC236}">
-                <a16:creationId xmlns:a16="http://schemas.microsoft.com/office/drawing/2014/main" id="{B53C0033-8D9E-604C-9B28-5FDD36C6C800}"/>
-              </a:ext>
-            </a:extLst>
-          </p:cNvPr>
-          <p:cNvSpPr/>
-          <p:nvPr/>
-        </p:nvSpPr>
-        <p:spPr>
-          <a:xfrm>
-            <a:off x="6118016" y="1168380"/>
-            <a:ext cx="3362160" cy="1973555"/>
-          </a:xfrm>
-          <a:prstGeom prst="rect">
-            <a:avLst/>
-          </a:prstGeom>
-          <a:noFill/>
-          <a:ln>
-            <a:prstDash val="dash"/>
-          </a:ln>
-        </p:spPr>
-        <p:style>
-          <a:lnRef idx="2">
-            <a:schemeClr val="accent1">
-              <a:shade val="50000"/>
-            </a:schemeClr>
-          </a:lnRef>
-          <a:fillRef idx="1">
-            <a:schemeClr val="accent1"/>
-          </a:fillRef>
-          <a:effectRef idx="0">
-            <a:schemeClr val="accent1"/>
-          </a:effectRef>
-          <a:fontRef idx="minor">
-            <a:schemeClr val="lt1"/>
-          </a:fontRef>
-        </p:style>
-        <p:txBody>
-          <a:bodyPr rtlCol="0" anchor="b"/>
-          <a:lstStyle/>
-          <a:p>
-            <a:pPr algn="ctr"/>
-            <a:r>
-              <a:rPr lang="en-US" sz="1200" dirty="0">
-                <a:solidFill>
-                  <a:schemeClr val="tx1"/>
-                </a:solidFill>
-              </a:rPr>
-              <a:t>ML Environment</a:t>
-            </a:r>
-          </a:p>
-        </p:txBody>
-      </p:sp>
-      <p:sp>
-        <p:nvSpPr>
-          <p:cNvPr id="8" name="Rectangle 7">
-            <a:extLst>
-              <a:ext uri="{FF2B5EF4-FFF2-40B4-BE49-F238E27FC236}">
-                <a16:creationId xmlns:a16="http://schemas.microsoft.com/office/drawing/2014/main" id="{FB63688E-FF28-D746-AC3D-3D2EFBDE0655}"/>
-              </a:ext>
-            </a:extLst>
-          </p:cNvPr>
-          <p:cNvSpPr/>
-          <p:nvPr/>
-        </p:nvSpPr>
-        <p:spPr>
-          <a:xfrm>
-            <a:off x="642258" y="1282632"/>
-            <a:ext cx="2008413" cy="1655634"/>
-          </a:xfrm>
-          <a:prstGeom prst="rect">
-            <a:avLst/>
-          </a:prstGeom>
-          <a:noFill/>
-          <a:ln>
-            <a:solidFill>
-              <a:schemeClr val="accent3"/>
-            </a:solidFill>
-            <a:prstDash val="dash"/>
-          </a:ln>
-        </p:spPr>
-        <p:style>
-          <a:lnRef idx="2">
-            <a:schemeClr val="accent1">
-              <a:shade val="50000"/>
-            </a:schemeClr>
-          </a:lnRef>
-          <a:fillRef idx="1">
-            <a:schemeClr val="accent1"/>
-          </a:fillRef>
-          <a:effectRef idx="0">
-            <a:schemeClr val="accent1"/>
-          </a:effectRef>
-          <a:fontRef idx="minor">
-            <a:schemeClr val="lt1"/>
-          </a:fontRef>
-        </p:style>
-        <p:txBody>
-          <a:bodyPr rtlCol="0" anchor="b"/>
-          <a:lstStyle/>
-          <a:p>
-            <a:pPr algn="ctr"/>
-            <a:r>
-              <a:rPr lang="en-US" sz="1200" dirty="0">
-                <a:solidFill>
-                  <a:schemeClr val="tx1"/>
-                </a:solidFill>
-              </a:rPr>
-              <a:t>Python</a:t>
-            </a:r>
-          </a:p>
-        </p:txBody>
-      </p:sp>
-      <p:sp>
-        <p:nvSpPr>
-          <p:cNvPr id="9" name="Rectangle 8">
-            <a:extLst>
-              <a:ext uri="{FF2B5EF4-FFF2-40B4-BE49-F238E27FC236}">
-                <a16:creationId xmlns:a16="http://schemas.microsoft.com/office/drawing/2014/main" id="{F1EEF6CD-0322-394A-87BF-5379FE8EE999}"/>
-              </a:ext>
-            </a:extLst>
-          </p:cNvPr>
-          <p:cNvSpPr/>
-          <p:nvPr/>
-        </p:nvSpPr>
-        <p:spPr>
-          <a:xfrm>
-            <a:off x="762000" y="1616527"/>
-            <a:ext cx="1703614" cy="914400"/>
-          </a:xfrm>
-          <a:prstGeom prst="rect">
-            <a:avLst/>
-          </a:prstGeom>
-          <a:solidFill>
-            <a:schemeClr val="accent5">
-              <a:lumMod val="75000"/>
-            </a:schemeClr>
-          </a:solidFill>
-        </p:spPr>
-        <p:style>
-          <a:lnRef idx="2">
-            <a:schemeClr val="accent1">
-              <a:shade val="50000"/>
-            </a:schemeClr>
-          </a:lnRef>
-          <a:fillRef idx="1">
-            <a:schemeClr val="accent1"/>
-          </a:fillRef>
-          <a:effectRef idx="0">
-            <a:schemeClr val="accent1"/>
-          </a:effectRef>
-          <a:fontRef idx="minor">
-            <a:schemeClr val="lt1"/>
-          </a:fontRef>
-        </p:style>
-        <p:txBody>
-          <a:bodyPr rtlCol="0" anchor="ctr"/>
-          <a:lstStyle/>
-          <a:p>
-            <a:pPr algn="ctr"/>
-            <a:r>
-              <a:rPr lang="en-US" sz="1400" dirty="0"/>
-              <a:t>Simulator</a:t>
-            </a:r>
-          </a:p>
-        </p:txBody>
-      </p:sp>
-      <p:sp>
-        <p:nvSpPr>
-          <p:cNvPr id="10" name="Rounded Rectangle 9">
-            <a:extLst>
-              <a:ext uri="{FF2B5EF4-FFF2-40B4-BE49-F238E27FC236}">
-                <a16:creationId xmlns:a16="http://schemas.microsoft.com/office/drawing/2014/main" id="{0BA597E7-00D6-7F44-9C30-03D1F5A01FB4}"/>
-              </a:ext>
-            </a:extLst>
-          </p:cNvPr>
-          <p:cNvSpPr/>
-          <p:nvPr/>
-        </p:nvSpPr>
-        <p:spPr bwMode="auto">
-          <a:xfrm>
-            <a:off x="2766994" y="4217859"/>
-            <a:ext cx="245561" cy="731512"/>
-          </a:xfrm>
-          <a:prstGeom prst="roundRect">
-            <a:avLst/>
-          </a:prstGeom>
-          <a:solidFill>
-            <a:schemeClr val="bg2"/>
-          </a:solidFill>
-          <a:ln>
-            <a:solidFill>
-              <a:schemeClr val="bg1"/>
-            </a:solidFill>
-            <a:prstDash val="solid"/>
-            <a:headEnd type="none" w="med" len="med"/>
-            <a:tailEnd type="none" w="med" len="med"/>
-          </a:ln>
-          <a:effectLst/>
-        </p:spPr>
-        <p:style>
-          <a:lnRef idx="1">
-            <a:schemeClr val="accent5"/>
-          </a:lnRef>
-          <a:fillRef idx="3">
-            <a:schemeClr val="accent5"/>
-          </a:fillRef>
-          <a:effectRef idx="2">
-            <a:schemeClr val="accent5"/>
-          </a:effectRef>
-          <a:fontRef idx="minor">
-            <a:schemeClr val="lt1"/>
-          </a:fontRef>
-        </p:style>
-        <p:txBody>
-          <a:bodyPr vert="horz" wrap="square" lIns="0" tIns="0" rIns="0" bIns="0" numCol="1" rtlCol="0" anchor="ctr" anchorCtr="0" compatLnSpc="1">
-            <a:prstTxWarp prst="textNoShape">
-              <a:avLst/>
-            </a:prstTxWarp>
-            <a:noAutofit/>
-          </a:bodyPr>
-          <a:lstStyle/>
-          <a:p>
-            <a:pPr algn="ctr" defTabSz="1219170" fontAlgn="base">
-              <a:lnSpc>
-                <a:spcPct val="90000"/>
-              </a:lnSpc>
-              <a:spcBef>
-                <a:spcPct val="0"/>
-              </a:spcBef>
-              <a:spcAft>
-                <a:spcPct val="0"/>
-              </a:spcAft>
-            </a:pPr>
-            <a:r>
-              <a:rPr lang="en-US" sz="1200" dirty="0">
-                <a:solidFill>
-                  <a:schemeClr val="bg1"/>
-                </a:solidFill>
-              </a:rPr>
-              <a:t>0</a:t>
-            </a:r>
-            <a:endParaRPr lang="en-US" sz="667" dirty="0">
-              <a:solidFill>
-                <a:schemeClr val="bg1"/>
-              </a:solidFill>
-            </a:endParaRPr>
-          </a:p>
-        </p:txBody>
-      </p:sp>
-      <p:sp>
-        <p:nvSpPr>
-          <p:cNvPr id="11" name="Rounded Rectangle 10">
-            <a:extLst>
-              <a:ext uri="{FF2B5EF4-FFF2-40B4-BE49-F238E27FC236}">
-                <a16:creationId xmlns:a16="http://schemas.microsoft.com/office/drawing/2014/main" id="{3F8CBAEE-0098-D148-A196-E5AD2B6787B8}"/>
-              </a:ext>
-            </a:extLst>
-          </p:cNvPr>
-          <p:cNvSpPr/>
-          <p:nvPr/>
-        </p:nvSpPr>
-        <p:spPr bwMode="auto">
-          <a:xfrm>
-            <a:off x="3010831" y="4217859"/>
-            <a:ext cx="245561" cy="731512"/>
-          </a:xfrm>
-          <a:prstGeom prst="roundRect">
-            <a:avLst/>
-          </a:prstGeom>
-          <a:solidFill>
-            <a:schemeClr val="bg2"/>
-          </a:solidFill>
-          <a:ln>
-            <a:solidFill>
-              <a:schemeClr val="bg1"/>
-            </a:solidFill>
-            <a:prstDash val="solid"/>
-            <a:headEnd type="none" w="med" len="med"/>
-            <a:tailEnd type="none" w="med" len="med"/>
-          </a:ln>
-          <a:effectLst/>
-        </p:spPr>
-        <p:style>
-          <a:lnRef idx="1">
-            <a:schemeClr val="accent5"/>
-          </a:lnRef>
-          <a:fillRef idx="3">
-            <a:schemeClr val="accent5"/>
-          </a:fillRef>
-          <a:effectRef idx="2">
-            <a:schemeClr val="accent5"/>
-          </a:effectRef>
-          <a:fontRef idx="minor">
-            <a:schemeClr val="lt1"/>
-          </a:fontRef>
-        </p:style>
-        <p:txBody>
-          <a:bodyPr vert="horz" wrap="square" lIns="0" tIns="0" rIns="0" bIns="0" numCol="1" rtlCol="0" anchor="ctr" anchorCtr="0" compatLnSpc="1">
-            <a:prstTxWarp prst="textNoShape">
-              <a:avLst/>
-            </a:prstTxWarp>
-            <a:noAutofit/>
-          </a:bodyPr>
-          <a:lstStyle/>
-          <a:p>
-            <a:pPr algn="ctr" defTabSz="1219170" fontAlgn="base">
-              <a:lnSpc>
-                <a:spcPct val="90000"/>
-              </a:lnSpc>
-              <a:spcBef>
-                <a:spcPct val="0"/>
-              </a:spcBef>
-              <a:spcAft>
-                <a:spcPct val="0"/>
-              </a:spcAft>
-            </a:pPr>
-            <a:r>
-              <a:rPr lang="en-US" sz="1200" dirty="0">
-                <a:solidFill>
-                  <a:schemeClr val="bg1"/>
-                </a:solidFill>
-              </a:rPr>
-              <a:t>1</a:t>
-            </a:r>
-            <a:endParaRPr lang="en-US" sz="667" dirty="0">
-              <a:solidFill>
-                <a:schemeClr val="bg1"/>
-              </a:solidFill>
-            </a:endParaRPr>
-          </a:p>
-        </p:txBody>
-      </p:sp>
-      <p:sp>
-        <p:nvSpPr>
-          <p:cNvPr id="12" name="Rounded Rectangle 11">
-            <a:extLst>
-              <a:ext uri="{FF2B5EF4-FFF2-40B4-BE49-F238E27FC236}">
-                <a16:creationId xmlns:a16="http://schemas.microsoft.com/office/drawing/2014/main" id="{F2989703-2F49-5647-B6D8-F7993E04EAE4}"/>
-              </a:ext>
-            </a:extLst>
-          </p:cNvPr>
-          <p:cNvSpPr/>
-          <p:nvPr/>
-        </p:nvSpPr>
-        <p:spPr bwMode="auto">
-          <a:xfrm>
-            <a:off x="3256393" y="4217859"/>
-            <a:ext cx="245561" cy="731512"/>
-          </a:xfrm>
-          <a:prstGeom prst="roundRect">
-            <a:avLst/>
-          </a:prstGeom>
-          <a:solidFill>
-            <a:schemeClr val="bg2"/>
-          </a:solidFill>
-          <a:ln>
-            <a:solidFill>
-              <a:schemeClr val="bg1"/>
-            </a:solidFill>
-            <a:prstDash val="solid"/>
-            <a:headEnd type="none" w="med" len="med"/>
-            <a:tailEnd type="none" w="med" len="med"/>
-          </a:ln>
-          <a:effectLst/>
-        </p:spPr>
-        <p:style>
-          <a:lnRef idx="1">
-            <a:schemeClr val="accent5"/>
-          </a:lnRef>
-          <a:fillRef idx="3">
-            <a:schemeClr val="accent5"/>
-          </a:fillRef>
-          <a:effectRef idx="2">
-            <a:schemeClr val="accent5"/>
-          </a:effectRef>
-          <a:fontRef idx="minor">
-            <a:schemeClr val="lt1"/>
-          </a:fontRef>
-        </p:style>
-        <p:txBody>
-          <a:bodyPr vert="horz" wrap="square" lIns="0" tIns="0" rIns="0" bIns="0" numCol="1" rtlCol="0" anchor="ctr" anchorCtr="0" compatLnSpc="1">
-            <a:prstTxWarp prst="textNoShape">
-              <a:avLst/>
-            </a:prstTxWarp>
-            <a:noAutofit/>
-          </a:bodyPr>
-          <a:lstStyle/>
-          <a:p>
-            <a:pPr algn="ctr" defTabSz="1219170" fontAlgn="base">
-              <a:lnSpc>
-                <a:spcPct val="90000"/>
-              </a:lnSpc>
-              <a:spcBef>
-                <a:spcPct val="0"/>
-              </a:spcBef>
-              <a:spcAft>
-                <a:spcPct val="0"/>
-              </a:spcAft>
-            </a:pPr>
-            <a:r>
-              <a:rPr lang="en-US" sz="1200" dirty="0">
-                <a:solidFill>
-                  <a:schemeClr val="bg1"/>
-                </a:solidFill>
-              </a:rPr>
-              <a:t>2</a:t>
-            </a:r>
-            <a:endParaRPr lang="en-US" sz="667" dirty="0">
-              <a:solidFill>
-                <a:schemeClr val="bg1"/>
-              </a:solidFill>
-            </a:endParaRPr>
-          </a:p>
-        </p:txBody>
-      </p:sp>
-      <p:sp>
-        <p:nvSpPr>
-          <p:cNvPr id="13" name="Rounded Rectangle 12">
-            <a:extLst>
-              <a:ext uri="{FF2B5EF4-FFF2-40B4-BE49-F238E27FC236}">
-                <a16:creationId xmlns:a16="http://schemas.microsoft.com/office/drawing/2014/main" id="{54F04F52-1698-E54E-8D5D-3991A0424611}"/>
-              </a:ext>
-            </a:extLst>
-          </p:cNvPr>
-          <p:cNvSpPr/>
-          <p:nvPr/>
-        </p:nvSpPr>
-        <p:spPr bwMode="auto">
-          <a:xfrm>
-            <a:off x="3500230" y="4217859"/>
-            <a:ext cx="245561" cy="731512"/>
-          </a:xfrm>
-          <a:prstGeom prst="roundRect">
-            <a:avLst/>
-          </a:prstGeom>
-          <a:solidFill>
-            <a:schemeClr val="bg2"/>
-          </a:solidFill>
-          <a:ln>
-            <a:solidFill>
-              <a:schemeClr val="bg1"/>
-            </a:solidFill>
-            <a:prstDash val="solid"/>
-            <a:headEnd type="none" w="med" len="med"/>
-            <a:tailEnd type="none" w="med" len="med"/>
-          </a:ln>
-          <a:effectLst/>
-        </p:spPr>
-        <p:style>
-          <a:lnRef idx="1">
-            <a:schemeClr val="accent5"/>
-          </a:lnRef>
-          <a:fillRef idx="3">
-            <a:schemeClr val="accent5"/>
-          </a:fillRef>
-          <a:effectRef idx="2">
-            <a:schemeClr val="accent5"/>
-          </a:effectRef>
-          <a:fontRef idx="minor">
-            <a:schemeClr val="lt1"/>
-          </a:fontRef>
-        </p:style>
-        <p:txBody>
-          <a:bodyPr vert="horz" wrap="square" lIns="0" tIns="0" rIns="0" bIns="0" numCol="1" rtlCol="0" anchor="ctr" anchorCtr="0" compatLnSpc="1">
-            <a:prstTxWarp prst="textNoShape">
-              <a:avLst/>
-            </a:prstTxWarp>
-            <a:noAutofit/>
-          </a:bodyPr>
-          <a:lstStyle/>
-          <a:p>
-            <a:pPr algn="ctr" defTabSz="1219170" fontAlgn="base">
-              <a:lnSpc>
-                <a:spcPct val="90000"/>
-              </a:lnSpc>
-              <a:spcBef>
-                <a:spcPct val="0"/>
-              </a:spcBef>
-              <a:spcAft>
-                <a:spcPct val="0"/>
-              </a:spcAft>
-            </a:pPr>
-            <a:r>
-              <a:rPr lang="en-US" sz="1200" dirty="0">
-                <a:solidFill>
-                  <a:schemeClr val="bg1"/>
-                </a:solidFill>
-              </a:rPr>
-              <a:t>3</a:t>
-            </a:r>
-            <a:endParaRPr lang="en-US" sz="667" dirty="0">
-              <a:solidFill>
-                <a:schemeClr val="bg1"/>
-              </a:solidFill>
-            </a:endParaRPr>
-          </a:p>
-        </p:txBody>
-      </p:sp>
-      <p:sp>
-        <p:nvSpPr>
-          <p:cNvPr id="14" name="Rounded Rectangle 13">
-            <a:extLst>
-              <a:ext uri="{FF2B5EF4-FFF2-40B4-BE49-F238E27FC236}">
-                <a16:creationId xmlns:a16="http://schemas.microsoft.com/office/drawing/2014/main" id="{3890F22B-7831-CC45-9E84-2F465C403BBE}"/>
-              </a:ext>
-            </a:extLst>
-          </p:cNvPr>
-          <p:cNvSpPr/>
-          <p:nvPr/>
-        </p:nvSpPr>
-        <p:spPr bwMode="auto">
-          <a:xfrm>
-            <a:off x="3745791" y="4217859"/>
-            <a:ext cx="245561" cy="731512"/>
-          </a:xfrm>
-          <a:prstGeom prst="roundRect">
-            <a:avLst/>
-          </a:prstGeom>
-          <a:solidFill>
-            <a:schemeClr val="bg2"/>
-          </a:solidFill>
-          <a:ln>
-            <a:solidFill>
-              <a:schemeClr val="bg1"/>
-            </a:solidFill>
-            <a:prstDash val="solid"/>
-            <a:headEnd type="none" w="med" len="med"/>
-            <a:tailEnd type="none" w="med" len="med"/>
-          </a:ln>
-          <a:effectLst/>
-        </p:spPr>
-        <p:style>
-          <a:lnRef idx="1">
-            <a:schemeClr val="accent5"/>
-          </a:lnRef>
-          <a:fillRef idx="3">
-            <a:schemeClr val="accent5"/>
-          </a:fillRef>
-          <a:effectRef idx="2">
-            <a:schemeClr val="accent5"/>
-          </a:effectRef>
-          <a:fontRef idx="minor">
-            <a:schemeClr val="lt1"/>
-          </a:fontRef>
-        </p:style>
-        <p:txBody>
-          <a:bodyPr vert="horz" wrap="square" lIns="0" tIns="0" rIns="0" bIns="0" numCol="1" rtlCol="0" anchor="ctr" anchorCtr="0" compatLnSpc="1">
-            <a:prstTxWarp prst="textNoShape">
-              <a:avLst/>
-            </a:prstTxWarp>
-            <a:noAutofit/>
-          </a:bodyPr>
-          <a:lstStyle/>
-          <a:p>
-            <a:pPr algn="ctr" defTabSz="1219170" fontAlgn="base">
-              <a:lnSpc>
-                <a:spcPct val="90000"/>
-              </a:lnSpc>
-              <a:spcBef>
-                <a:spcPct val="0"/>
-              </a:spcBef>
-              <a:spcAft>
-                <a:spcPct val="0"/>
-              </a:spcAft>
-            </a:pPr>
-            <a:r>
-              <a:rPr lang="en-US" sz="1200" dirty="0">
-                <a:solidFill>
-                  <a:schemeClr val="bg1"/>
-                </a:solidFill>
-              </a:rPr>
-              <a:t>4</a:t>
-            </a:r>
-            <a:endParaRPr lang="en-US" sz="667" dirty="0">
-              <a:solidFill>
-                <a:schemeClr val="bg1"/>
-              </a:solidFill>
-            </a:endParaRPr>
-          </a:p>
-        </p:txBody>
-      </p:sp>
-      <p:sp>
-        <p:nvSpPr>
-          <p:cNvPr id="15" name="Rounded Rectangle 14">
-            <a:extLst>
-              <a:ext uri="{FF2B5EF4-FFF2-40B4-BE49-F238E27FC236}">
-                <a16:creationId xmlns:a16="http://schemas.microsoft.com/office/drawing/2014/main" id="{EED12008-2192-5048-99A3-CAFBD4DFB3A8}"/>
-              </a:ext>
-            </a:extLst>
-          </p:cNvPr>
-          <p:cNvSpPr/>
-          <p:nvPr/>
-        </p:nvSpPr>
-        <p:spPr bwMode="auto">
-          <a:xfrm>
-            <a:off x="3976587" y="4217859"/>
-            <a:ext cx="245561" cy="731512"/>
-          </a:xfrm>
-          <a:prstGeom prst="roundRect">
-            <a:avLst/>
-          </a:prstGeom>
-          <a:solidFill>
-            <a:schemeClr val="bg2"/>
-          </a:solidFill>
-          <a:ln>
-            <a:solidFill>
-              <a:schemeClr val="bg1"/>
-            </a:solidFill>
-            <a:prstDash val="solid"/>
-            <a:headEnd type="none" w="med" len="med"/>
-            <a:tailEnd type="none" w="med" len="med"/>
-          </a:ln>
-          <a:effectLst/>
-        </p:spPr>
-        <p:style>
-          <a:lnRef idx="1">
-            <a:schemeClr val="accent5"/>
-          </a:lnRef>
-          <a:fillRef idx="3">
-            <a:schemeClr val="accent5"/>
-          </a:fillRef>
-          <a:effectRef idx="2">
-            <a:schemeClr val="accent5"/>
-          </a:effectRef>
-          <a:fontRef idx="minor">
-            <a:schemeClr val="lt1"/>
-          </a:fontRef>
-        </p:style>
-        <p:txBody>
-          <a:bodyPr vert="horz" wrap="square" lIns="0" tIns="0" rIns="0" bIns="0" numCol="1" rtlCol="0" anchor="ctr" anchorCtr="0" compatLnSpc="1">
-            <a:prstTxWarp prst="textNoShape">
-              <a:avLst/>
-            </a:prstTxWarp>
-            <a:noAutofit/>
-          </a:bodyPr>
-          <a:lstStyle/>
-          <a:p>
-            <a:pPr algn="ctr" defTabSz="1219170" fontAlgn="base">
-              <a:lnSpc>
-                <a:spcPct val="90000"/>
-              </a:lnSpc>
-              <a:spcBef>
-                <a:spcPct val="0"/>
-              </a:spcBef>
-              <a:spcAft>
-                <a:spcPct val="0"/>
-              </a:spcAft>
-            </a:pPr>
-            <a:r>
-              <a:rPr lang="en-US" sz="1200" dirty="0">
-                <a:solidFill>
-                  <a:schemeClr val="bg1"/>
-                </a:solidFill>
-              </a:rPr>
-              <a:t>5</a:t>
-            </a:r>
-            <a:endParaRPr lang="en-US" sz="667" dirty="0">
-              <a:solidFill>
-                <a:schemeClr val="bg1"/>
-              </a:solidFill>
-            </a:endParaRPr>
-          </a:p>
-        </p:txBody>
-      </p:sp>
-      <p:sp>
-        <p:nvSpPr>
-          <p:cNvPr id="18" name="AutoShape 4">
-            <a:extLst>
-              <a:ext uri="{FF2B5EF4-FFF2-40B4-BE49-F238E27FC236}">
-                <a16:creationId xmlns:a16="http://schemas.microsoft.com/office/drawing/2014/main" id="{CDC99AA8-3A32-6E4A-99DE-489E3056BAE3}"/>
-              </a:ext>
-            </a:extLst>
-          </p:cNvPr>
-          <p:cNvSpPr>
-            <a:spLocks noChangeArrowheads="1"/>
-          </p:cNvSpPr>
-          <p:nvPr/>
-        </p:nvSpPr>
-        <p:spPr bwMode="auto">
-          <a:xfrm>
-            <a:off x="1899331" y="3925562"/>
-            <a:ext cx="3513917" cy="1348479"/>
-          </a:xfrm>
-          <a:prstGeom prst="roundRect">
-            <a:avLst>
-              <a:gd name="adj" fmla="val 7117"/>
-            </a:avLst>
-          </a:prstGeom>
-          <a:noFill/>
-          <a:ln w="12700">
-            <a:solidFill>
-              <a:schemeClr val="accent3"/>
-            </a:solidFill>
-            <a:prstDash val="dash"/>
-            <a:round/>
-            <a:headEnd/>
-            <a:tailEnd/>
-          </a:ln>
-        </p:spPr>
-        <p:txBody>
-          <a:bodyPr lIns="0" tIns="0" rIns="0" bIns="0" anchor="b" anchorCtr="1"/>
-          <a:lstStyle/>
-          <a:p>
-            <a:pPr algn="ctr"/>
-            <a:endParaRPr lang="en-US" sz="1333" dirty="0"/>
-          </a:p>
-        </p:txBody>
-      </p:sp>
-      <p:sp>
-        <p:nvSpPr>
-          <p:cNvPr id="20" name="TextBox 19">
-            <a:extLst>
-              <a:ext uri="{FF2B5EF4-FFF2-40B4-BE49-F238E27FC236}">
-                <a16:creationId xmlns:a16="http://schemas.microsoft.com/office/drawing/2014/main" id="{DBB9557F-8237-544F-8483-B618ED14A2EB}"/>
-              </a:ext>
-            </a:extLst>
-          </p:cNvPr>
-          <p:cNvSpPr txBox="1"/>
-          <p:nvPr/>
-        </p:nvSpPr>
-        <p:spPr>
-          <a:xfrm>
-            <a:off x="2700397" y="4904710"/>
-            <a:ext cx="1967270" cy="369332"/>
-          </a:xfrm>
-          <a:prstGeom prst="rect">
-            <a:avLst/>
-          </a:prstGeom>
-          <a:noFill/>
-        </p:spPr>
-        <p:txBody>
-          <a:bodyPr wrap="none" rtlCol="0">
-            <a:spAutoFit/>
-          </a:bodyPr>
-          <a:lstStyle/>
-          <a:p>
-            <a:r>
-              <a:rPr lang="en-US" dirty="0">
-                <a:solidFill>
-                  <a:schemeClr val="accent1">
-                    <a:lumMod val="25000"/>
-                  </a:schemeClr>
-                </a:solidFill>
-              </a:rPr>
-              <a:t>reeferTelemetries</a:t>
-            </a:r>
-          </a:p>
-        </p:txBody>
-      </p:sp>
-      <p:pic>
-        <p:nvPicPr>
-          <p:cNvPr id="22" name="Picture 21">
-            <a:extLst>
-              <a:ext uri="{FF2B5EF4-FFF2-40B4-BE49-F238E27FC236}">
-                <a16:creationId xmlns:a16="http://schemas.microsoft.com/office/drawing/2014/main" id="{1B16228E-748D-5644-91F6-79288C7462BE}"/>
-              </a:ext>
-            </a:extLst>
-          </p:cNvPr>
-          <p:cNvPicPr>
-            <a:picLocks noChangeAspect="1"/>
-          </p:cNvPicPr>
-          <p:nvPr/>
-        </p:nvPicPr>
-        <p:blipFill>
-          <a:blip r:embed="rId2">
-            <a:extLst>
-              <a:ext uri="{28A0092B-C50C-407E-A947-70E740481C1C}">
-                <a14:useLocalDpi xmlns:a14="http://schemas.microsoft.com/office/drawing/2010/main" val="0"/>
-              </a:ext>
-            </a:extLst>
-          </a:blip>
-          <a:stretch>
-            <a:fillRect/>
-          </a:stretch>
-        </p:blipFill>
-        <p:spPr>
-          <a:xfrm>
-            <a:off x="1904609" y="3930860"/>
-            <a:ext cx="523018" cy="690721"/>
-          </a:xfrm>
-          <a:prstGeom prst="rect">
-            <a:avLst/>
-          </a:prstGeom>
-        </p:spPr>
-      </p:pic>
-      <p:pic>
-        <p:nvPicPr>
-          <p:cNvPr id="24" name="Picture 40">
-            <a:extLst>
-              <a:ext uri="{FF2B5EF4-FFF2-40B4-BE49-F238E27FC236}">
-                <a16:creationId xmlns:a16="http://schemas.microsoft.com/office/drawing/2014/main" id="{E8EEB410-07EC-D848-92F0-6380D4A64C59}"/>
-              </a:ext>
-            </a:extLst>
-          </p:cNvPr>
-          <p:cNvPicPr>
-            <a:picLocks noChangeAspect="1"/>
-          </p:cNvPicPr>
-          <p:nvPr/>
-        </p:nvPicPr>
-        <p:blipFill>
-          <a:blip r:embed="rId3">
-            <a:extLst>
-              <a:ext uri="{28A0092B-C50C-407E-A947-70E740481C1C}">
-                <a14:useLocalDpi xmlns:a14="http://schemas.microsoft.com/office/drawing/2010/main" val="0"/>
-              </a:ext>
-            </a:extLst>
-          </a:blip>
-          <a:srcRect/>
-          <a:stretch>
-            <a:fillRect/>
-          </a:stretch>
-        </p:blipFill>
-        <p:spPr bwMode="auto">
-          <a:xfrm>
-            <a:off x="1366480" y="5093585"/>
-            <a:ext cx="1099134" cy="407338"/>
-          </a:xfrm>
-          <a:prstGeom prst="rect">
-            <a:avLst/>
-          </a:prstGeom>
-          <a:noFill/>
-          <a:ln>
-            <a:noFill/>
-          </a:ln>
-          <a:extLst>
-            <a:ext uri="{909E8E84-426E-40DD-AFC4-6F175D3DCCD1}">
-              <a14:hiddenFill xmlns:a14="http://schemas.microsoft.com/office/drawing/2010/main">
-                <a:solidFill>
-                  <a:srgbClr val="FFFFFF"/>
-                </a:solidFill>
-              </a14:hiddenFill>
-            </a:ext>
-            <a:ext uri="{91240B29-F687-4F45-9708-019B960494DF}">
-              <a14:hiddenLine xmlns:a14="http://schemas.microsoft.com/office/drawing/2010/main" w="9525">
-                <a:solidFill>
-                  <a:srgbClr val="000000"/>
-                </a:solidFill>
-                <a:miter lim="800000"/>
-                <a:headEnd/>
-                <a:tailEnd/>
-              </a14:hiddenLine>
-            </a:ext>
-          </a:extLst>
-        </p:spPr>
-      </p:pic>
-      <p:pic>
-        <p:nvPicPr>
-          <p:cNvPr id="25" name="Picture 40">
-            <a:extLst>
-              <a:ext uri="{FF2B5EF4-FFF2-40B4-BE49-F238E27FC236}">
-                <a16:creationId xmlns:a16="http://schemas.microsoft.com/office/drawing/2014/main" id="{6CF0C2DA-CD62-0F4A-B6D7-15B98EF785FA}"/>
-              </a:ext>
-            </a:extLst>
-          </p:cNvPr>
-          <p:cNvPicPr>
-            <a:picLocks noChangeAspect="1"/>
-          </p:cNvPicPr>
-          <p:nvPr/>
-        </p:nvPicPr>
-        <p:blipFill>
-          <a:blip r:embed="rId3">
-            <a:extLst>
-              <a:ext uri="{28A0092B-C50C-407E-A947-70E740481C1C}">
-                <a14:useLocalDpi xmlns:a14="http://schemas.microsoft.com/office/drawing/2010/main" val="0"/>
-              </a:ext>
-            </a:extLst>
-          </a:blip>
-          <a:srcRect/>
-          <a:stretch>
-            <a:fillRect/>
-          </a:stretch>
-        </p:blipFill>
-        <p:spPr bwMode="auto">
-          <a:xfrm>
-            <a:off x="116601" y="2734597"/>
-            <a:ext cx="1099134" cy="407338"/>
-          </a:xfrm>
-          <a:prstGeom prst="rect">
-            <a:avLst/>
-          </a:prstGeom>
-          <a:noFill/>
-          <a:ln>
-            <a:noFill/>
-          </a:ln>
-          <a:extLst>
-            <a:ext uri="{909E8E84-426E-40DD-AFC4-6F175D3DCCD1}">
-              <a14:hiddenFill xmlns:a14="http://schemas.microsoft.com/office/drawing/2010/main">
-                <a:solidFill>
-                  <a:srgbClr val="FFFFFF"/>
-                </a:solidFill>
-              </a14:hiddenFill>
-            </a:ext>
-            <a:ext uri="{91240B29-F687-4F45-9708-019B960494DF}">
-              <a14:hiddenLine xmlns:a14="http://schemas.microsoft.com/office/drawing/2010/main" w="9525">
-                <a:solidFill>
-                  <a:srgbClr val="000000"/>
-                </a:solidFill>
-                <a:miter lim="800000"/>
-                <a:headEnd/>
-                <a:tailEnd/>
-              </a14:hiddenLine>
-            </a:ext>
-          </a:extLst>
-        </p:spPr>
-      </p:pic>
-      <p:sp>
-        <p:nvSpPr>
-          <p:cNvPr id="27" name="Rounded Rectangle 26">
-            <a:extLst>
-              <a:ext uri="{FF2B5EF4-FFF2-40B4-BE49-F238E27FC236}">
-                <a16:creationId xmlns:a16="http://schemas.microsoft.com/office/drawing/2014/main" id="{E472D71D-D4D6-9743-8082-F5CD0C08D2B8}"/>
-              </a:ext>
-            </a:extLst>
-          </p:cNvPr>
-          <p:cNvSpPr/>
-          <p:nvPr/>
-        </p:nvSpPr>
-        <p:spPr>
-          <a:xfrm>
-            <a:off x="6455197" y="1357868"/>
-            <a:ext cx="1749097" cy="373542"/>
-          </a:xfrm>
-          <a:prstGeom prst="roundRect">
-            <a:avLst>
-              <a:gd name="adj" fmla="val 9717"/>
-            </a:avLst>
-          </a:prstGeom>
-          <a:noFill/>
-          <a:ln w="12700">
-            <a:solidFill>
-              <a:schemeClr val="tx2">
-                <a:lumMod val="50000"/>
-              </a:schemeClr>
-            </a:solidFill>
-          </a:ln>
-          <a:effectLst/>
-        </p:spPr>
-        <p:style>
-          <a:lnRef idx="1">
-            <a:schemeClr val="dk1"/>
-          </a:lnRef>
-          <a:fillRef idx="2">
-            <a:schemeClr val="dk1"/>
-          </a:fillRef>
-          <a:effectRef idx="1">
-            <a:schemeClr val="dk1"/>
-          </a:effectRef>
-          <a:fontRef idx="minor">
-            <a:schemeClr val="dk1"/>
-          </a:fontRef>
-        </p:style>
-        <p:txBody>
-          <a:bodyPr rot="0" spcFirstLastPara="0" vertOverflow="overflow" horzOverflow="overflow" vert="horz" wrap="square" lIns="0" tIns="0" rIns="0" bIns="0" numCol="1" spcCol="0" rtlCol="0" fromWordArt="0" anchor="t" anchorCtr="0" forceAA="0" compatLnSpc="1">
-            <a:prstTxWarp prst="textNoShape">
-              <a:avLst/>
-            </a:prstTxWarp>
-            <a:noAutofit/>
-          </a:bodyPr>
-          <a:lstStyle/>
-          <a:p>
-            <a:r>
-              <a:rPr lang="en-US" sz="1200" baseline="0" dirty="0">
-                <a:solidFill>
-                  <a:schemeClr val="tx1"/>
-                </a:solidFill>
-                <a:latin typeface="IBM Plex Sans" panose="020B0503050203000203" pitchFamily="34" charset="77"/>
-                <a:cs typeface="Arial"/>
-              </a:rPr>
-              <a:t>Kafka Consumer</a:t>
-            </a:r>
-          </a:p>
-        </p:txBody>
-      </p:sp>
-      <p:cxnSp>
-        <p:nvCxnSpPr>
-          <p:cNvPr id="46" name="Elbow Connector 45">
-            <a:extLst>
-              <a:ext uri="{FF2B5EF4-FFF2-40B4-BE49-F238E27FC236}">
-                <a16:creationId xmlns:a16="http://schemas.microsoft.com/office/drawing/2014/main" id="{B815F1F6-8EC9-A547-951A-6A6BA26A1B3E}"/>
-              </a:ext>
-            </a:extLst>
-          </p:cNvPr>
-          <p:cNvCxnSpPr>
-            <a:stCxn id="9" idx="3"/>
-            <a:endCxn id="15" idx="0"/>
-          </p:cNvCxnSpPr>
-          <p:nvPr/>
-        </p:nvCxnSpPr>
-        <p:spPr>
-          <a:xfrm>
-            <a:off x="2465614" y="2073727"/>
-            <a:ext cx="1633754" cy="2144132"/>
-          </a:xfrm>
-          <a:prstGeom prst="bentConnector2">
-            <a:avLst/>
-          </a:prstGeom>
-          <a:ln>
-            <a:solidFill>
-              <a:schemeClr val="accent6"/>
-            </a:solidFill>
-            <a:tailEnd type="triangle"/>
-          </a:ln>
-          <a:effectLst/>
-        </p:spPr>
-        <p:style>
-          <a:lnRef idx="2">
-            <a:schemeClr val="accent1"/>
-          </a:lnRef>
-          <a:fillRef idx="0">
-            <a:schemeClr val="accent1"/>
-          </a:fillRef>
-          <a:effectRef idx="1">
-            <a:schemeClr val="accent1"/>
-          </a:effectRef>
-          <a:fontRef idx="minor">
-            <a:schemeClr val="tx1"/>
-          </a:fontRef>
-        </p:style>
-      </p:cxnSp>
-      <p:sp>
-        <p:nvSpPr>
-          <p:cNvPr id="59" name="Can 58">
-            <a:extLst>
-              <a:ext uri="{FF2B5EF4-FFF2-40B4-BE49-F238E27FC236}">
-                <a16:creationId xmlns:a16="http://schemas.microsoft.com/office/drawing/2014/main" id="{BF8D5F17-7886-6A49-A326-AB3283F367DA}"/>
-              </a:ext>
-            </a:extLst>
-          </p:cNvPr>
-          <p:cNvSpPr/>
-          <p:nvPr/>
-        </p:nvSpPr>
-        <p:spPr>
-          <a:xfrm>
-            <a:off x="6215189" y="3898535"/>
-            <a:ext cx="895875" cy="695584"/>
-          </a:xfrm>
-          <a:prstGeom prst="can">
-            <a:avLst/>
-          </a:prstGeom>
-          <a:solidFill>
-            <a:schemeClr val="accent5">
-              <a:lumMod val="75000"/>
-            </a:schemeClr>
-          </a:solidFill>
-          <a:ln>
-            <a:noFill/>
-          </a:ln>
-        </p:spPr>
-        <p:style>
-          <a:lnRef idx="2">
-            <a:schemeClr val="accent1">
-              <a:shade val="50000"/>
-            </a:schemeClr>
-          </a:lnRef>
-          <a:fillRef idx="1">
-            <a:schemeClr val="accent1"/>
-          </a:fillRef>
-          <a:effectRef idx="0">
-            <a:schemeClr val="accent1"/>
-          </a:effectRef>
-          <a:fontRef idx="minor">
-            <a:schemeClr val="lt1"/>
-          </a:fontRef>
-        </p:style>
-        <p:txBody>
-          <a:bodyPr rtlCol="0" anchor="ctr"/>
-          <a:lstStyle/>
-          <a:p>
-            <a:pPr algn="ctr"/>
-            <a:r>
-              <a:rPr lang="en-US" sz="1000" dirty="0"/>
-              <a:t>Reefers Inventory</a:t>
-            </a:r>
-          </a:p>
-        </p:txBody>
-      </p:sp>
-      <p:cxnSp>
-        <p:nvCxnSpPr>
-          <p:cNvPr id="71" name="Elbow Connector 70">
-            <a:extLst>
-              <a:ext uri="{FF2B5EF4-FFF2-40B4-BE49-F238E27FC236}">
-                <a16:creationId xmlns:a16="http://schemas.microsoft.com/office/drawing/2014/main" id="{9B3950A4-1025-DB48-B886-5945ADD35206}"/>
-              </a:ext>
-            </a:extLst>
-          </p:cNvPr>
-          <p:cNvCxnSpPr>
-            <a:cxnSpLocks/>
-            <a:stCxn id="27" idx="1"/>
-            <a:endCxn id="10" idx="0"/>
-          </p:cNvCxnSpPr>
-          <p:nvPr/>
-        </p:nvCxnSpPr>
-        <p:spPr>
-          <a:xfrm rot="10800000" flipV="1">
-            <a:off x="2889775" y="1544639"/>
-            <a:ext cx="3565422" cy="2673220"/>
-          </a:xfrm>
-          <a:prstGeom prst="bentConnector2">
-            <a:avLst/>
-          </a:prstGeom>
-          <a:ln>
-            <a:solidFill>
-              <a:srgbClr val="7030A0"/>
-            </a:solidFill>
-            <a:tailEnd type="triangle"/>
-          </a:ln>
-          <a:effectLst/>
-        </p:spPr>
-        <p:style>
-          <a:lnRef idx="2">
-            <a:schemeClr val="accent1"/>
-          </a:lnRef>
-          <a:fillRef idx="0">
-            <a:schemeClr val="accent1"/>
-          </a:fillRef>
-          <a:effectRef idx="1">
-            <a:schemeClr val="accent1"/>
-          </a:effectRef>
-          <a:fontRef idx="minor">
-            <a:schemeClr val="tx1"/>
-          </a:fontRef>
-        </p:style>
-      </p:cxnSp>
-      <p:sp>
-        <p:nvSpPr>
-          <p:cNvPr id="45" name="Rounded Rectangle 44">
-            <a:extLst>
-              <a:ext uri="{FF2B5EF4-FFF2-40B4-BE49-F238E27FC236}">
-                <a16:creationId xmlns:a16="http://schemas.microsoft.com/office/drawing/2014/main" id="{F495E1A9-5EC6-5446-ACF5-3911A287BB83}"/>
-              </a:ext>
-            </a:extLst>
-          </p:cNvPr>
-          <p:cNvSpPr/>
-          <p:nvPr/>
-        </p:nvSpPr>
-        <p:spPr>
-          <a:xfrm>
-            <a:off x="6478199" y="1913633"/>
-            <a:ext cx="1749097" cy="373542"/>
-          </a:xfrm>
-          <a:prstGeom prst="roundRect">
-            <a:avLst>
-              <a:gd name="adj" fmla="val 9717"/>
-            </a:avLst>
-          </a:prstGeom>
-          <a:noFill/>
-          <a:ln w="12700">
-            <a:solidFill>
-              <a:schemeClr val="tx2">
-                <a:lumMod val="50000"/>
-              </a:schemeClr>
-            </a:solidFill>
-          </a:ln>
-          <a:effectLst/>
-        </p:spPr>
-        <p:style>
-          <a:lnRef idx="1">
-            <a:schemeClr val="dk1"/>
-          </a:lnRef>
-          <a:fillRef idx="2">
-            <a:schemeClr val="dk1"/>
-          </a:fillRef>
-          <a:effectRef idx="1">
-            <a:schemeClr val="dk1"/>
-          </a:effectRef>
-          <a:fontRef idx="minor">
-            <a:schemeClr val="dk1"/>
-          </a:fontRef>
-        </p:style>
-        <p:txBody>
-          <a:bodyPr rot="0" spcFirstLastPara="0" vertOverflow="overflow" horzOverflow="overflow" vert="horz" wrap="square" lIns="0" tIns="0" rIns="0" bIns="0" numCol="1" spcCol="0" rtlCol="0" fromWordArt="0" anchor="t" anchorCtr="0" forceAA="0" compatLnSpc="1">
-            <a:prstTxWarp prst="textNoShape">
-              <a:avLst/>
-            </a:prstTxWarp>
-            <a:noAutofit/>
-          </a:bodyPr>
-          <a:lstStyle/>
-          <a:p>
-            <a:r>
-              <a:rPr lang="en-US" sz="1200" baseline="0" dirty="0">
-                <a:solidFill>
-                  <a:schemeClr val="tx1"/>
-                </a:solidFill>
-                <a:latin typeface="IBM Plex Sans" panose="020B0503050203000203" pitchFamily="34" charset="77"/>
-                <a:cs typeface="Arial"/>
-              </a:rPr>
-              <a:t>Pandas DF</a:t>
-            </a:r>
-          </a:p>
-        </p:txBody>
-      </p:sp>
-      <p:sp>
-        <p:nvSpPr>
-          <p:cNvPr id="23" name="Can 22">
-            <a:extLst>
-              <a:ext uri="{FF2B5EF4-FFF2-40B4-BE49-F238E27FC236}">
-                <a16:creationId xmlns:a16="http://schemas.microsoft.com/office/drawing/2014/main" id="{E1EF536B-5978-0D45-B1D4-059E49B20183}"/>
-              </a:ext>
-            </a:extLst>
-          </p:cNvPr>
-          <p:cNvSpPr/>
-          <p:nvPr/>
-        </p:nvSpPr>
-        <p:spPr>
-          <a:xfrm>
-            <a:off x="7223460" y="3898535"/>
-            <a:ext cx="895875" cy="695584"/>
-          </a:xfrm>
-          <a:prstGeom prst="can">
-            <a:avLst/>
-          </a:prstGeom>
-          <a:solidFill>
-            <a:schemeClr val="accent5">
-              <a:lumMod val="75000"/>
-            </a:schemeClr>
-          </a:solidFill>
-          <a:ln>
-            <a:noFill/>
-          </a:ln>
-        </p:spPr>
-        <p:style>
-          <a:lnRef idx="2">
-            <a:schemeClr val="accent1">
-              <a:shade val="50000"/>
-            </a:schemeClr>
-          </a:lnRef>
-          <a:fillRef idx="1">
-            <a:schemeClr val="accent1"/>
-          </a:fillRef>
-          <a:effectRef idx="0">
-            <a:schemeClr val="accent1"/>
-          </a:effectRef>
-          <a:fontRef idx="minor">
-            <a:schemeClr val="lt1"/>
-          </a:fontRef>
-        </p:style>
-        <p:txBody>
-          <a:bodyPr rtlCol="0" anchor="ctr"/>
-          <a:lstStyle/>
-          <a:p>
-            <a:pPr algn="ctr"/>
-            <a:r>
-              <a:rPr lang="en-US" sz="1000" dirty="0"/>
-              <a:t>Products</a:t>
-            </a:r>
-          </a:p>
-        </p:txBody>
-      </p:sp>
-      <p:pic>
-        <p:nvPicPr>
-          <p:cNvPr id="26" name="Picture 25">
-            <a:extLst>
-              <a:ext uri="{FF2B5EF4-FFF2-40B4-BE49-F238E27FC236}">
-                <a16:creationId xmlns:a16="http://schemas.microsoft.com/office/drawing/2014/main" id="{509913A5-E445-C54D-8C8A-64EA88153B4B}"/>
-              </a:ext>
-            </a:extLst>
-          </p:cNvPr>
-          <p:cNvPicPr>
-            <a:picLocks noChangeAspect="1"/>
-          </p:cNvPicPr>
-          <p:nvPr/>
-        </p:nvPicPr>
-        <p:blipFill>
-          <a:blip r:embed="rId4"/>
-          <a:stretch>
-            <a:fillRect/>
-          </a:stretch>
-        </p:blipFill>
-        <p:spPr>
-          <a:xfrm>
-            <a:off x="8048469" y="4322790"/>
-            <a:ext cx="638156" cy="680700"/>
-          </a:xfrm>
-          <a:prstGeom prst="rect">
-            <a:avLst/>
-          </a:prstGeom>
-        </p:spPr>
-      </p:pic>
-    </p:spTree>
-    <p:extLst>
-      <p:ext uri="{BB962C8B-B14F-4D97-AF65-F5344CB8AC3E}">
-        <p14:creationId xmlns:p14="http://schemas.microsoft.com/office/powerpoint/2010/main" val="187512266"/>
       </p:ext>
     </p:extLst>
   </p:cSld>

</xml_diff>